<commit_message>
add some text for full-text-search
</commit_message>
<xml_diff>
--- a/images/Bilder.pptx
+++ b/images/Bilder.pptx
@@ -7,6 +7,7 @@
   <p:sldIdLst>
     <p:sldId id="256" r:id="rId2"/>
     <p:sldId id="257" r:id="rId3"/>
+    <p:sldId id="258" r:id="rId4"/>
   </p:sldIdLst>
   <p:sldSz cx="12192000" cy="6858000"/>
   <p:notesSz cx="6858000" cy="9144000"/>
@@ -105,6 +106,11 @@
       </a:defRPr>
     </a:lvl9pPr>
   </p:defaultTextStyle>
+  <p:extLst>
+    <p:ext uri="{EFAFB233-063F-42B5-8137-9DF3F51BA10A}">
+      <p15:sldGuideLst xmlns:p15="http://schemas.microsoft.com/office/powerpoint/2012/main"/>
+    </p:ext>
+  </p:extLst>
 </p:presentation>
 </file>
 
@@ -255,7 +261,7 @@
           <a:p>
             <a:fld id="{F01BEA2B-4EBC-4FDA-85C9-98F59DD415C0}" type="datetimeFigureOut">
               <a:rPr lang="de-DE" smtClean="0"/>
-              <a:t>05.07.2021</a:t>
+              <a:t>19.07.2021</a:t>
             </a:fld>
             <a:endParaRPr lang="de-DE"/>
           </a:p>
@@ -453,7 +459,7 @@
           <a:p>
             <a:fld id="{F01BEA2B-4EBC-4FDA-85C9-98F59DD415C0}" type="datetimeFigureOut">
               <a:rPr lang="de-DE" smtClean="0"/>
-              <a:t>05.07.2021</a:t>
+              <a:t>19.07.2021</a:t>
             </a:fld>
             <a:endParaRPr lang="de-DE"/>
           </a:p>
@@ -661,7 +667,7 @@
           <a:p>
             <a:fld id="{F01BEA2B-4EBC-4FDA-85C9-98F59DD415C0}" type="datetimeFigureOut">
               <a:rPr lang="de-DE" smtClean="0"/>
-              <a:t>05.07.2021</a:t>
+              <a:t>19.07.2021</a:t>
             </a:fld>
             <a:endParaRPr lang="de-DE"/>
           </a:p>
@@ -859,7 +865,7 @@
           <a:p>
             <a:fld id="{F01BEA2B-4EBC-4FDA-85C9-98F59DD415C0}" type="datetimeFigureOut">
               <a:rPr lang="de-DE" smtClean="0"/>
-              <a:t>05.07.2021</a:t>
+              <a:t>19.07.2021</a:t>
             </a:fld>
             <a:endParaRPr lang="de-DE"/>
           </a:p>
@@ -1134,7 +1140,7 @@
           <a:p>
             <a:fld id="{F01BEA2B-4EBC-4FDA-85C9-98F59DD415C0}" type="datetimeFigureOut">
               <a:rPr lang="de-DE" smtClean="0"/>
-              <a:t>05.07.2021</a:t>
+              <a:t>19.07.2021</a:t>
             </a:fld>
             <a:endParaRPr lang="de-DE"/>
           </a:p>
@@ -1399,7 +1405,7 @@
           <a:p>
             <a:fld id="{F01BEA2B-4EBC-4FDA-85C9-98F59DD415C0}" type="datetimeFigureOut">
               <a:rPr lang="de-DE" smtClean="0"/>
-              <a:t>05.07.2021</a:t>
+              <a:t>19.07.2021</a:t>
             </a:fld>
             <a:endParaRPr lang="de-DE"/>
           </a:p>
@@ -1811,7 +1817,7 @@
           <a:p>
             <a:fld id="{F01BEA2B-4EBC-4FDA-85C9-98F59DD415C0}" type="datetimeFigureOut">
               <a:rPr lang="de-DE" smtClean="0"/>
-              <a:t>05.07.2021</a:t>
+              <a:t>19.07.2021</a:t>
             </a:fld>
             <a:endParaRPr lang="de-DE"/>
           </a:p>
@@ -1952,7 +1958,7 @@
           <a:p>
             <a:fld id="{F01BEA2B-4EBC-4FDA-85C9-98F59DD415C0}" type="datetimeFigureOut">
               <a:rPr lang="de-DE" smtClean="0"/>
-              <a:t>05.07.2021</a:t>
+              <a:t>19.07.2021</a:t>
             </a:fld>
             <a:endParaRPr lang="de-DE"/>
           </a:p>
@@ -2065,7 +2071,7 @@
           <a:p>
             <a:fld id="{F01BEA2B-4EBC-4FDA-85C9-98F59DD415C0}" type="datetimeFigureOut">
               <a:rPr lang="de-DE" smtClean="0"/>
-              <a:t>05.07.2021</a:t>
+              <a:t>19.07.2021</a:t>
             </a:fld>
             <a:endParaRPr lang="de-DE"/>
           </a:p>
@@ -2376,7 +2382,7 @@
           <a:p>
             <a:fld id="{F01BEA2B-4EBC-4FDA-85C9-98F59DD415C0}" type="datetimeFigureOut">
               <a:rPr lang="de-DE" smtClean="0"/>
-              <a:t>05.07.2021</a:t>
+              <a:t>19.07.2021</a:t>
             </a:fld>
             <a:endParaRPr lang="de-DE"/>
           </a:p>
@@ -2664,7 +2670,7 @@
           <a:p>
             <a:fld id="{F01BEA2B-4EBC-4FDA-85C9-98F59DD415C0}" type="datetimeFigureOut">
               <a:rPr lang="de-DE" smtClean="0"/>
-              <a:t>05.07.2021</a:t>
+              <a:t>19.07.2021</a:t>
             </a:fld>
             <a:endParaRPr lang="de-DE"/>
           </a:p>
@@ -2905,7 +2911,7 @@
           <a:p>
             <a:fld id="{F01BEA2B-4EBC-4FDA-85C9-98F59DD415C0}" type="datetimeFigureOut">
               <a:rPr lang="de-DE" smtClean="0"/>
-              <a:t>05.07.2021</a:t>
+              <a:t>19.07.2021</a:t>
             </a:fld>
             <a:endParaRPr lang="de-DE"/>
           </a:p>
@@ -4228,6 +4234,653 @@
 </p:sld>
 </file>
 
+<file path=ppt/slides/slide3.xml><?xml version="1.0" encoding="utf-8"?>
+<p:sld xmlns:a="http://schemas.openxmlformats.org/drawingml/2006/main" xmlns:r="http://schemas.openxmlformats.org/officeDocument/2006/relationships" xmlns:p="http://schemas.openxmlformats.org/presentationml/2006/main">
+  <p:cSld>
+    <p:spTree>
+      <p:nvGrpSpPr>
+        <p:cNvPr id="1" name=""/>
+        <p:cNvGrpSpPr/>
+        <p:nvPr/>
+      </p:nvGrpSpPr>
+      <p:grpSpPr>
+        <a:xfrm>
+          <a:off x="0" y="0"/>
+          <a:ext cx="0" cy="0"/>
+          <a:chOff x="0" y="0"/>
+          <a:chExt cx="0" cy="0"/>
+        </a:xfrm>
+      </p:grpSpPr>
+      <p:grpSp>
+        <p:nvGrpSpPr>
+          <p:cNvPr id="18" name="Gruppieren 17">
+            <a:extLst>
+              <a:ext uri="{FF2B5EF4-FFF2-40B4-BE49-F238E27FC236}">
+                <a16:creationId xmlns:a16="http://schemas.microsoft.com/office/drawing/2014/main" id="{1535D364-0B23-40D8-A643-C7B2E16F768A}"/>
+              </a:ext>
+            </a:extLst>
+          </p:cNvPr>
+          <p:cNvGrpSpPr/>
+          <p:nvPr/>
+        </p:nvGrpSpPr>
+        <p:grpSpPr>
+          <a:xfrm>
+            <a:off x="1491916" y="927675"/>
+            <a:ext cx="7988969" cy="4520228"/>
+            <a:chOff x="1491916" y="927675"/>
+            <a:chExt cx="7988969" cy="4520228"/>
+          </a:xfrm>
+        </p:grpSpPr>
+        <p:sp>
+          <p:nvSpPr>
+            <p:cNvPr id="4" name="Textfeld 3">
+              <a:extLst>
+                <a:ext uri="{FF2B5EF4-FFF2-40B4-BE49-F238E27FC236}">
+                  <a16:creationId xmlns:a16="http://schemas.microsoft.com/office/drawing/2014/main" id="{E2BBFD08-EA50-4D05-9C7C-F90E9DF0206C}"/>
+                </a:ext>
+              </a:extLst>
+            </p:cNvPr>
+            <p:cNvSpPr txBox="1"/>
+            <p:nvPr/>
+          </p:nvSpPr>
+          <p:spPr>
+            <a:xfrm>
+              <a:off x="1491916" y="931247"/>
+              <a:ext cx="3003082" cy="365760"/>
+            </a:xfrm>
+            <a:prstGeom prst="rect">
+              <a:avLst/>
+            </a:prstGeom>
+            <a:noFill/>
+            <a:ln w="19050">
+              <a:solidFill>
+                <a:schemeClr val="tx1"/>
+              </a:solidFill>
+            </a:ln>
+          </p:spPr>
+          <p:txBody>
+            <a:bodyPr wrap="square" rtlCol="0">
+              <a:spAutoFit/>
+            </a:bodyPr>
+            <a:lstStyle/>
+            <a:p>
+              <a:pPr algn="ctr"/>
+              <a:r>
+                <a:rPr lang="de-DE" dirty="0"/>
+                <a:t>Groß- und Kleinschreibung</a:t>
+              </a:r>
+            </a:p>
+          </p:txBody>
+        </p:sp>
+        <p:sp>
+          <p:nvSpPr>
+            <p:cNvPr id="5" name="Textfeld 4">
+              <a:extLst>
+                <a:ext uri="{FF2B5EF4-FFF2-40B4-BE49-F238E27FC236}">
+                  <a16:creationId xmlns:a16="http://schemas.microsoft.com/office/drawing/2014/main" id="{EB480591-0B93-441B-BC13-CBE84B999E21}"/>
+                </a:ext>
+              </a:extLst>
+            </p:cNvPr>
+            <p:cNvSpPr txBox="1"/>
+            <p:nvPr/>
+          </p:nvSpPr>
+          <p:spPr>
+            <a:xfrm>
+              <a:off x="1491916" y="1967162"/>
+              <a:ext cx="3003082" cy="365760"/>
+            </a:xfrm>
+            <a:prstGeom prst="rect">
+              <a:avLst/>
+            </a:prstGeom>
+            <a:noFill/>
+            <a:ln w="19050">
+              <a:solidFill>
+                <a:schemeClr val="tx1"/>
+              </a:solidFill>
+            </a:ln>
+          </p:spPr>
+          <p:txBody>
+            <a:bodyPr wrap="square" rtlCol="0">
+              <a:spAutoFit/>
+            </a:bodyPr>
+            <a:lstStyle/>
+            <a:p>
+              <a:pPr algn="ctr"/>
+              <a:r>
+                <a:rPr lang="de-DE" dirty="0"/>
+                <a:t>Umgang mit Sonderzeichen</a:t>
+              </a:r>
+            </a:p>
+          </p:txBody>
+        </p:sp>
+        <p:sp>
+          <p:nvSpPr>
+            <p:cNvPr id="6" name="Textfeld 5">
+              <a:extLst>
+                <a:ext uri="{FF2B5EF4-FFF2-40B4-BE49-F238E27FC236}">
+                  <a16:creationId xmlns:a16="http://schemas.microsoft.com/office/drawing/2014/main" id="{10BD32BF-8B92-4816-BC92-E26ECEE499FA}"/>
+                </a:ext>
+              </a:extLst>
+            </p:cNvPr>
+            <p:cNvSpPr txBox="1"/>
+            <p:nvPr/>
+          </p:nvSpPr>
+          <p:spPr>
+            <a:xfrm>
+              <a:off x="1491916" y="3005489"/>
+              <a:ext cx="3003082" cy="365760"/>
+            </a:xfrm>
+            <a:prstGeom prst="rect">
+              <a:avLst/>
+            </a:prstGeom>
+            <a:noFill/>
+            <a:ln w="19050">
+              <a:solidFill>
+                <a:schemeClr val="tx1"/>
+              </a:solidFill>
+            </a:ln>
+          </p:spPr>
+          <p:txBody>
+            <a:bodyPr wrap="square" rtlCol="0">
+              <a:spAutoFit/>
+            </a:bodyPr>
+            <a:lstStyle/>
+            <a:p>
+              <a:pPr algn="ctr"/>
+              <a:r>
+                <a:rPr lang="de-DE" dirty="0"/>
+                <a:t>Aufsplitten (Tokenizer)</a:t>
+              </a:r>
+            </a:p>
+          </p:txBody>
+        </p:sp>
+        <p:sp>
+          <p:nvSpPr>
+            <p:cNvPr id="7" name="Textfeld 6">
+              <a:extLst>
+                <a:ext uri="{FF2B5EF4-FFF2-40B4-BE49-F238E27FC236}">
+                  <a16:creationId xmlns:a16="http://schemas.microsoft.com/office/drawing/2014/main" id="{A59BA02B-160E-4B8E-BEF0-3230B84DF586}"/>
+                </a:ext>
+              </a:extLst>
+            </p:cNvPr>
+            <p:cNvSpPr txBox="1"/>
+            <p:nvPr/>
+          </p:nvSpPr>
+          <p:spPr>
+            <a:xfrm>
+              <a:off x="1491916" y="4043816"/>
+              <a:ext cx="3003082" cy="365760"/>
+            </a:xfrm>
+            <a:prstGeom prst="rect">
+              <a:avLst/>
+            </a:prstGeom>
+            <a:noFill/>
+            <a:ln w="19050">
+              <a:solidFill>
+                <a:schemeClr val="tx1"/>
+              </a:solidFill>
+            </a:ln>
+          </p:spPr>
+          <p:txBody>
+            <a:bodyPr wrap="square" rtlCol="0">
+              <a:spAutoFit/>
+            </a:bodyPr>
+            <a:lstStyle/>
+            <a:p>
+              <a:pPr algn="ctr"/>
+              <a:r>
+                <a:rPr lang="de-DE" dirty="0"/>
+                <a:t>Stopwords</a:t>
+              </a:r>
+            </a:p>
+          </p:txBody>
+        </p:sp>
+        <p:sp>
+          <p:nvSpPr>
+            <p:cNvPr id="8" name="Textfeld 7">
+              <a:extLst>
+                <a:ext uri="{FF2B5EF4-FFF2-40B4-BE49-F238E27FC236}">
+                  <a16:creationId xmlns:a16="http://schemas.microsoft.com/office/drawing/2014/main" id="{8E875BD6-F41B-4B2B-8EA2-FD01AC8F213D}"/>
+                </a:ext>
+              </a:extLst>
+            </p:cNvPr>
+            <p:cNvSpPr txBox="1"/>
+            <p:nvPr/>
+          </p:nvSpPr>
+          <p:spPr>
+            <a:xfrm>
+              <a:off x="1491916" y="5082143"/>
+              <a:ext cx="3003082" cy="365760"/>
+            </a:xfrm>
+            <a:prstGeom prst="rect">
+              <a:avLst/>
+            </a:prstGeom>
+            <a:noFill/>
+            <a:ln w="19050">
+              <a:solidFill>
+                <a:schemeClr val="tx1"/>
+              </a:solidFill>
+            </a:ln>
+          </p:spPr>
+          <p:txBody>
+            <a:bodyPr wrap="square" rtlCol="0">
+              <a:spAutoFit/>
+            </a:bodyPr>
+            <a:lstStyle/>
+            <a:p>
+              <a:pPr algn="ctr"/>
+              <a:r>
+                <a:rPr lang="de-DE" dirty="0"/>
+                <a:t>Stemming</a:t>
+              </a:r>
+            </a:p>
+          </p:txBody>
+        </p:sp>
+        <p:sp>
+          <p:nvSpPr>
+            <p:cNvPr id="9" name="Pfeil: nach unten 8">
+              <a:extLst>
+                <a:ext uri="{FF2B5EF4-FFF2-40B4-BE49-F238E27FC236}">
+                  <a16:creationId xmlns:a16="http://schemas.microsoft.com/office/drawing/2014/main" id="{00BD5896-9EA0-4412-9186-2FAAE320DCF9}"/>
+                </a:ext>
+              </a:extLst>
+            </p:cNvPr>
+            <p:cNvSpPr/>
+            <p:nvPr/>
+          </p:nvSpPr>
+          <p:spPr>
+            <a:xfrm>
+              <a:off x="2853891" y="1431758"/>
+              <a:ext cx="279132" cy="387417"/>
+            </a:xfrm>
+            <a:prstGeom prst="downArrow">
+              <a:avLst/>
+            </a:prstGeom>
+            <a:noFill/>
+            <a:ln w="19050">
+              <a:solidFill>
+                <a:schemeClr val="tx1"/>
+              </a:solidFill>
+            </a:ln>
+          </p:spPr>
+          <p:style>
+            <a:lnRef idx="2">
+              <a:schemeClr val="accent1">
+                <a:shade val="50000"/>
+              </a:schemeClr>
+            </a:lnRef>
+            <a:fillRef idx="1">
+              <a:schemeClr val="accent1"/>
+            </a:fillRef>
+            <a:effectRef idx="0">
+              <a:schemeClr val="accent1"/>
+            </a:effectRef>
+            <a:fontRef idx="minor">
+              <a:schemeClr val="lt1"/>
+            </a:fontRef>
+          </p:style>
+          <p:txBody>
+            <a:bodyPr rtlCol="0" anchor="ctr"/>
+            <a:lstStyle/>
+            <a:p>
+              <a:pPr algn="ctr"/>
+              <a:endParaRPr lang="de-DE">
+                <a:noFill/>
+              </a:endParaRPr>
+            </a:p>
+          </p:txBody>
+        </p:sp>
+        <p:sp>
+          <p:nvSpPr>
+            <p:cNvPr id="10" name="Pfeil: nach unten 9">
+              <a:extLst>
+                <a:ext uri="{FF2B5EF4-FFF2-40B4-BE49-F238E27FC236}">
+                  <a16:creationId xmlns:a16="http://schemas.microsoft.com/office/drawing/2014/main" id="{030DCE32-1143-4EA7-863C-CF96F33C1F10}"/>
+                </a:ext>
+              </a:extLst>
+            </p:cNvPr>
+            <p:cNvSpPr/>
+            <p:nvPr/>
+          </p:nvSpPr>
+          <p:spPr>
+            <a:xfrm>
+              <a:off x="2853891" y="2475497"/>
+              <a:ext cx="279132" cy="387417"/>
+            </a:xfrm>
+            <a:prstGeom prst="downArrow">
+              <a:avLst/>
+            </a:prstGeom>
+            <a:noFill/>
+            <a:ln w="19050">
+              <a:solidFill>
+                <a:schemeClr val="tx1"/>
+              </a:solidFill>
+            </a:ln>
+          </p:spPr>
+          <p:style>
+            <a:lnRef idx="2">
+              <a:schemeClr val="accent1">
+                <a:shade val="50000"/>
+              </a:schemeClr>
+            </a:lnRef>
+            <a:fillRef idx="1">
+              <a:schemeClr val="accent1"/>
+            </a:fillRef>
+            <a:effectRef idx="0">
+              <a:schemeClr val="accent1"/>
+            </a:effectRef>
+            <a:fontRef idx="minor">
+              <a:schemeClr val="lt1"/>
+            </a:fontRef>
+          </p:style>
+          <p:txBody>
+            <a:bodyPr rtlCol="0" anchor="ctr"/>
+            <a:lstStyle/>
+            <a:p>
+              <a:pPr algn="ctr"/>
+              <a:endParaRPr lang="de-DE">
+                <a:noFill/>
+              </a:endParaRPr>
+            </a:p>
+          </p:txBody>
+        </p:sp>
+        <p:sp>
+          <p:nvSpPr>
+            <p:cNvPr id="11" name="Pfeil: nach unten 10">
+              <a:extLst>
+                <a:ext uri="{FF2B5EF4-FFF2-40B4-BE49-F238E27FC236}">
+                  <a16:creationId xmlns:a16="http://schemas.microsoft.com/office/drawing/2014/main" id="{B72B65FC-88C9-40D3-91FD-D797BD85740B}"/>
+                </a:ext>
+              </a:extLst>
+            </p:cNvPr>
+            <p:cNvSpPr/>
+            <p:nvPr/>
+          </p:nvSpPr>
+          <p:spPr>
+            <a:xfrm>
+              <a:off x="2858703" y="3513824"/>
+              <a:ext cx="279132" cy="387417"/>
+            </a:xfrm>
+            <a:prstGeom prst="downArrow">
+              <a:avLst/>
+            </a:prstGeom>
+            <a:noFill/>
+            <a:ln w="19050">
+              <a:solidFill>
+                <a:schemeClr val="tx1"/>
+              </a:solidFill>
+            </a:ln>
+          </p:spPr>
+          <p:style>
+            <a:lnRef idx="2">
+              <a:schemeClr val="accent1">
+                <a:shade val="50000"/>
+              </a:schemeClr>
+            </a:lnRef>
+            <a:fillRef idx="1">
+              <a:schemeClr val="accent1"/>
+            </a:fillRef>
+            <a:effectRef idx="0">
+              <a:schemeClr val="accent1"/>
+            </a:effectRef>
+            <a:fontRef idx="minor">
+              <a:schemeClr val="lt1"/>
+            </a:fontRef>
+          </p:style>
+          <p:txBody>
+            <a:bodyPr rtlCol="0" anchor="ctr"/>
+            <a:lstStyle/>
+            <a:p>
+              <a:pPr algn="ctr"/>
+              <a:endParaRPr lang="de-DE">
+                <a:noFill/>
+              </a:endParaRPr>
+            </a:p>
+          </p:txBody>
+        </p:sp>
+        <p:sp>
+          <p:nvSpPr>
+            <p:cNvPr id="12" name="Pfeil: nach unten 11">
+              <a:extLst>
+                <a:ext uri="{FF2B5EF4-FFF2-40B4-BE49-F238E27FC236}">
+                  <a16:creationId xmlns:a16="http://schemas.microsoft.com/office/drawing/2014/main" id="{B64998B2-0A2A-42D4-B31B-405966016700}"/>
+                </a:ext>
+              </a:extLst>
+            </p:cNvPr>
+            <p:cNvSpPr/>
+            <p:nvPr/>
+          </p:nvSpPr>
+          <p:spPr>
+            <a:xfrm>
+              <a:off x="2853891" y="4552151"/>
+              <a:ext cx="279132" cy="387417"/>
+            </a:xfrm>
+            <a:prstGeom prst="downArrow">
+              <a:avLst/>
+            </a:prstGeom>
+            <a:noFill/>
+            <a:ln w="19050">
+              <a:solidFill>
+                <a:schemeClr val="tx1"/>
+              </a:solidFill>
+            </a:ln>
+          </p:spPr>
+          <p:style>
+            <a:lnRef idx="2">
+              <a:schemeClr val="accent1">
+                <a:shade val="50000"/>
+              </a:schemeClr>
+            </a:lnRef>
+            <a:fillRef idx="1">
+              <a:schemeClr val="accent1"/>
+            </a:fillRef>
+            <a:effectRef idx="0">
+              <a:schemeClr val="accent1"/>
+            </a:effectRef>
+            <a:fontRef idx="minor">
+              <a:schemeClr val="lt1"/>
+            </a:fontRef>
+          </p:style>
+          <p:txBody>
+            <a:bodyPr rtlCol="0" anchor="ctr"/>
+            <a:lstStyle/>
+            <a:p>
+              <a:pPr algn="ctr"/>
+              <a:endParaRPr lang="de-DE">
+                <a:noFill/>
+              </a:endParaRPr>
+            </a:p>
+          </p:txBody>
+        </p:sp>
+        <p:sp>
+          <p:nvSpPr>
+            <p:cNvPr id="13" name="Textfeld 12">
+              <a:extLst>
+                <a:ext uri="{FF2B5EF4-FFF2-40B4-BE49-F238E27FC236}">
+                  <a16:creationId xmlns:a16="http://schemas.microsoft.com/office/drawing/2014/main" id="{AF0A4DA0-F88A-404C-BB7C-37F82649FCE6}"/>
+                </a:ext>
+              </a:extLst>
+            </p:cNvPr>
+            <p:cNvSpPr txBox="1"/>
+            <p:nvPr/>
+          </p:nvSpPr>
+          <p:spPr>
+            <a:xfrm>
+              <a:off x="4976260" y="927675"/>
+              <a:ext cx="4416393" cy="369332"/>
+            </a:xfrm>
+            <a:prstGeom prst="rect">
+              <a:avLst/>
+            </a:prstGeom>
+            <a:noFill/>
+          </p:spPr>
+          <p:txBody>
+            <a:bodyPr wrap="square" rtlCol="0">
+              <a:spAutoFit/>
+            </a:bodyPr>
+            <a:lstStyle/>
+            <a:p>
+              <a:r>
+                <a:rPr lang="de-DE" dirty="0"/>
+                <a:t>„blaue herren-hemden levi‘s® in xl“</a:t>
+              </a:r>
+            </a:p>
+          </p:txBody>
+        </p:sp>
+        <p:sp>
+          <p:nvSpPr>
+            <p:cNvPr id="14" name="Textfeld 13">
+              <a:extLst>
+                <a:ext uri="{FF2B5EF4-FFF2-40B4-BE49-F238E27FC236}">
+                  <a16:creationId xmlns:a16="http://schemas.microsoft.com/office/drawing/2014/main" id="{29F70347-CF53-466C-A464-817B556ECF9C}"/>
+                </a:ext>
+              </a:extLst>
+            </p:cNvPr>
+            <p:cNvSpPr txBox="1"/>
+            <p:nvPr/>
+          </p:nvSpPr>
+          <p:spPr>
+            <a:xfrm>
+              <a:off x="4976259" y="1963590"/>
+              <a:ext cx="4416394" cy="369332"/>
+            </a:xfrm>
+            <a:prstGeom prst="rect">
+              <a:avLst/>
+            </a:prstGeom>
+            <a:noFill/>
+          </p:spPr>
+          <p:txBody>
+            <a:bodyPr wrap="square" rtlCol="0">
+              <a:spAutoFit/>
+            </a:bodyPr>
+            <a:lstStyle/>
+            <a:p>
+              <a:r>
+                <a:rPr lang="de-DE" dirty="0"/>
+                <a:t>„blaue herren-hemden levis in xl“</a:t>
+              </a:r>
+            </a:p>
+          </p:txBody>
+        </p:sp>
+        <p:sp>
+          <p:nvSpPr>
+            <p:cNvPr id="15" name="Textfeld 14">
+              <a:extLst>
+                <a:ext uri="{FF2B5EF4-FFF2-40B4-BE49-F238E27FC236}">
+                  <a16:creationId xmlns:a16="http://schemas.microsoft.com/office/drawing/2014/main" id="{09532543-9922-4794-B69B-E74DA42EFC5B}"/>
+                </a:ext>
+              </a:extLst>
+            </p:cNvPr>
+            <p:cNvSpPr txBox="1"/>
+            <p:nvPr/>
+          </p:nvSpPr>
+          <p:spPr>
+            <a:xfrm>
+              <a:off x="4976258" y="3001917"/>
+              <a:ext cx="4504627" cy="369332"/>
+            </a:xfrm>
+            <a:prstGeom prst="rect">
+              <a:avLst/>
+            </a:prstGeom>
+            <a:noFill/>
+          </p:spPr>
+          <p:txBody>
+            <a:bodyPr wrap="square" rtlCol="0">
+              <a:spAutoFit/>
+            </a:bodyPr>
+            <a:lstStyle/>
+            <a:p>
+              <a:r>
+                <a:rPr lang="de-DE" dirty="0"/>
+                <a:t>„blaue“ „herren“ „hemden“ „levis“ „in“ „xl“</a:t>
+              </a:r>
+            </a:p>
+          </p:txBody>
+        </p:sp>
+        <p:sp>
+          <p:nvSpPr>
+            <p:cNvPr id="16" name="Textfeld 15">
+              <a:extLst>
+                <a:ext uri="{FF2B5EF4-FFF2-40B4-BE49-F238E27FC236}">
+                  <a16:creationId xmlns:a16="http://schemas.microsoft.com/office/drawing/2014/main" id="{FE552932-364F-432F-9200-193946B0B604}"/>
+                </a:ext>
+              </a:extLst>
+            </p:cNvPr>
+            <p:cNvSpPr txBox="1"/>
+            <p:nvPr/>
+          </p:nvSpPr>
+          <p:spPr>
+            <a:xfrm>
+              <a:off x="4976257" y="4042030"/>
+              <a:ext cx="4504627" cy="369332"/>
+            </a:xfrm>
+            <a:prstGeom prst="rect">
+              <a:avLst/>
+            </a:prstGeom>
+            <a:noFill/>
+          </p:spPr>
+          <p:txBody>
+            <a:bodyPr wrap="square" rtlCol="0">
+              <a:spAutoFit/>
+            </a:bodyPr>
+            <a:lstStyle/>
+            <a:p>
+              <a:r>
+                <a:rPr lang="de-DE" dirty="0"/>
+                <a:t>„blaue“ „herren“ „hemden“ „levis“ „xl“</a:t>
+              </a:r>
+            </a:p>
+          </p:txBody>
+        </p:sp>
+        <p:sp>
+          <p:nvSpPr>
+            <p:cNvPr id="17" name="Textfeld 16">
+              <a:extLst>
+                <a:ext uri="{FF2B5EF4-FFF2-40B4-BE49-F238E27FC236}">
+                  <a16:creationId xmlns:a16="http://schemas.microsoft.com/office/drawing/2014/main" id="{690896AE-A19E-43F5-BCCE-4913C8B69DE8}"/>
+                </a:ext>
+              </a:extLst>
+            </p:cNvPr>
+            <p:cNvSpPr txBox="1"/>
+            <p:nvPr/>
+          </p:nvSpPr>
+          <p:spPr>
+            <a:xfrm>
+              <a:off x="4976257" y="5076159"/>
+              <a:ext cx="4504627" cy="369332"/>
+            </a:xfrm>
+            <a:prstGeom prst="rect">
+              <a:avLst/>
+            </a:prstGeom>
+            <a:noFill/>
+          </p:spPr>
+          <p:txBody>
+            <a:bodyPr wrap="square" rtlCol="0">
+              <a:spAutoFit/>
+            </a:bodyPr>
+            <a:lstStyle/>
+            <a:p>
+              <a:r>
+                <a:rPr lang="de-DE" dirty="0"/>
+                <a:t>„blau“ „herr“ „hemd“ „levis“ „xl“</a:t>
+              </a:r>
+            </a:p>
+          </p:txBody>
+        </p:sp>
+      </p:grpSp>
+    </p:spTree>
+    <p:extLst>
+      <p:ext uri="{BB962C8B-B14F-4D97-AF65-F5344CB8AC3E}">
+        <p14:creationId xmlns:p14="http://schemas.microsoft.com/office/powerpoint/2010/main" val="710981351"/>
+      </p:ext>
+    </p:extLst>
+  </p:cSld>
+  <p:clrMapOvr>
+    <a:masterClrMapping/>
+  </p:clrMapOvr>
+</p:sld>
+</file>
+
 <file path=ppt/theme/theme1.xml><?xml version="1.0" encoding="utf-8"?>
 <a:theme xmlns:a="http://schemas.openxmlformats.org/drawingml/2006/main" name="Office">
   <a:themeElements>

</xml_diff>

<commit_message>
make some really amazing changes :)
</commit_message>
<xml_diff>
--- a/images/Bilder.pptx
+++ b/images/Bilder.pptx
@@ -5,9 +5,10 @@
     <p:sldMasterId id="2147483648" r:id="rId1"/>
   </p:sldMasterIdLst>
   <p:sldIdLst>
-    <p:sldId id="256" r:id="rId2"/>
-    <p:sldId id="257" r:id="rId3"/>
-    <p:sldId id="258" r:id="rId4"/>
+    <p:sldId id="257" r:id="rId2"/>
+    <p:sldId id="258" r:id="rId3"/>
+    <p:sldId id="259" r:id="rId4"/>
+    <p:sldId id="260" r:id="rId5"/>
   </p:sldIdLst>
   <p:sldSz cx="12192000" cy="6858000"/>
   <p:notesSz cx="6858000" cy="9144000"/>
@@ -3330,86 +3331,6 @@
       </p:grpSpPr>
       <p:sp>
         <p:nvSpPr>
-          <p:cNvPr id="2" name="Titel 1">
-            <a:extLst>
-              <a:ext uri="{FF2B5EF4-FFF2-40B4-BE49-F238E27FC236}">
-                <a16:creationId xmlns:a16="http://schemas.microsoft.com/office/drawing/2014/main" id="{EB651D1F-79EA-4F84-B942-C3658BC7EBD6}"/>
-              </a:ext>
-            </a:extLst>
-          </p:cNvPr>
-          <p:cNvSpPr>
-            <a:spLocks noGrp="1"/>
-          </p:cNvSpPr>
-          <p:nvPr>
-            <p:ph type="ctrTitle"/>
-          </p:nvPr>
-        </p:nvSpPr>
-        <p:spPr/>
-        <p:txBody>
-          <a:bodyPr/>
-          <a:lstStyle/>
-          <a:p>
-            <a:endParaRPr lang="de-DE"/>
-          </a:p>
-        </p:txBody>
-      </p:sp>
-      <p:sp>
-        <p:nvSpPr>
-          <p:cNvPr id="3" name="Untertitel 2">
-            <a:extLst>
-              <a:ext uri="{FF2B5EF4-FFF2-40B4-BE49-F238E27FC236}">
-                <a16:creationId xmlns:a16="http://schemas.microsoft.com/office/drawing/2014/main" id="{E3E62352-ED76-4A98-BE3D-A0AA3DD75D80}"/>
-              </a:ext>
-            </a:extLst>
-          </p:cNvPr>
-          <p:cNvSpPr>
-            <a:spLocks noGrp="1"/>
-          </p:cNvSpPr>
-          <p:nvPr>
-            <p:ph type="subTitle" idx="1"/>
-          </p:nvPr>
-        </p:nvSpPr>
-        <p:spPr/>
-        <p:txBody>
-          <a:bodyPr/>
-          <a:lstStyle/>
-          <a:p>
-            <a:endParaRPr lang="de-DE"/>
-          </a:p>
-        </p:txBody>
-      </p:sp>
-    </p:spTree>
-    <p:extLst>
-      <p:ext uri="{BB962C8B-B14F-4D97-AF65-F5344CB8AC3E}">
-        <p14:creationId xmlns:p14="http://schemas.microsoft.com/office/powerpoint/2010/main" val="1582534802"/>
-      </p:ext>
-    </p:extLst>
-  </p:cSld>
-  <p:clrMapOvr>
-    <a:masterClrMapping/>
-  </p:clrMapOvr>
-</p:sld>
-</file>
-
-<file path=ppt/slides/slide2.xml><?xml version="1.0" encoding="utf-8"?>
-<p:sld xmlns:a="http://schemas.openxmlformats.org/drawingml/2006/main" xmlns:r="http://schemas.openxmlformats.org/officeDocument/2006/relationships" xmlns:p="http://schemas.openxmlformats.org/presentationml/2006/main">
-  <p:cSld>
-    <p:spTree>
-      <p:nvGrpSpPr>
-        <p:cNvPr id="1" name=""/>
-        <p:cNvGrpSpPr/>
-        <p:nvPr/>
-      </p:nvGrpSpPr>
-      <p:grpSpPr>
-        <a:xfrm>
-          <a:off x="0" y="0"/>
-          <a:ext cx="0" cy="0"/>
-          <a:chOff x="0" y="0"/>
-          <a:chExt cx="0" cy="0"/>
-        </a:xfrm>
-      </p:grpSpPr>
-      <p:sp>
-        <p:nvSpPr>
           <p:cNvPr id="4" name="Rechteck 3">
             <a:extLst>
               <a:ext uri="{FF2B5EF4-FFF2-40B4-BE49-F238E27FC236}">
@@ -4234,7 +4155,7 @@
 </p:sld>
 </file>
 
-<file path=ppt/slides/slide3.xml><?xml version="1.0" encoding="utf-8"?>
+<file path=ppt/slides/slide2.xml><?xml version="1.0" encoding="utf-8"?>
 <p:sld xmlns:a="http://schemas.openxmlformats.org/drawingml/2006/main" xmlns:r="http://schemas.openxmlformats.org/officeDocument/2006/relationships" xmlns:p="http://schemas.openxmlformats.org/presentationml/2006/main">
   <p:cSld>
     <p:spTree>
@@ -4952,6 +4873,3899 @@
 </p:sld>
 </file>
 
+<file path=ppt/slides/slide3.xml><?xml version="1.0" encoding="utf-8"?>
+<p:sld xmlns:a="http://schemas.openxmlformats.org/drawingml/2006/main" xmlns:r="http://schemas.openxmlformats.org/officeDocument/2006/relationships" xmlns:p="http://schemas.openxmlformats.org/presentationml/2006/main">
+  <p:cSld>
+    <p:spTree>
+      <p:nvGrpSpPr>
+        <p:cNvPr id="1" name=""/>
+        <p:cNvGrpSpPr/>
+        <p:nvPr/>
+      </p:nvGrpSpPr>
+      <p:grpSpPr>
+        <a:xfrm>
+          <a:off x="0" y="0"/>
+          <a:ext cx="0" cy="0"/>
+          <a:chOff x="0" y="0"/>
+          <a:chExt cx="0" cy="0"/>
+        </a:xfrm>
+      </p:grpSpPr>
+      <p:grpSp>
+        <p:nvGrpSpPr>
+          <p:cNvPr id="56" name="Gruppieren 55">
+            <a:extLst>
+              <a:ext uri="{FF2B5EF4-FFF2-40B4-BE49-F238E27FC236}">
+                <a16:creationId xmlns:a16="http://schemas.microsoft.com/office/drawing/2014/main" id="{60E259BE-A6C2-47CD-B215-858C70024F0F}"/>
+              </a:ext>
+            </a:extLst>
+          </p:cNvPr>
+          <p:cNvGrpSpPr/>
+          <p:nvPr/>
+        </p:nvGrpSpPr>
+        <p:grpSpPr>
+          <a:xfrm>
+            <a:off x="1811440" y="548439"/>
+            <a:ext cx="7479813" cy="5372100"/>
+            <a:chOff x="2678215" y="510339"/>
+            <a:chExt cx="7479813" cy="5372100"/>
+          </a:xfrm>
+        </p:grpSpPr>
+        <p:sp>
+          <p:nvSpPr>
+            <p:cNvPr id="26" name="Rechteck: abgerundete Ecken 25">
+              <a:extLst>
+                <a:ext uri="{FF2B5EF4-FFF2-40B4-BE49-F238E27FC236}">
+                  <a16:creationId xmlns:a16="http://schemas.microsoft.com/office/drawing/2014/main" id="{78FD1322-8CE2-4D68-9220-024521873A48}"/>
+                </a:ext>
+              </a:extLst>
+            </p:cNvPr>
+            <p:cNvSpPr/>
+            <p:nvPr/>
+          </p:nvSpPr>
+          <p:spPr>
+            <a:xfrm>
+              <a:off x="4951875" y="1813259"/>
+              <a:ext cx="595811" cy="364317"/>
+            </a:xfrm>
+            <a:prstGeom prst="roundRect">
+              <a:avLst>
+                <a:gd name="adj" fmla="val 50000"/>
+              </a:avLst>
+            </a:prstGeom>
+            <a:solidFill>
+              <a:schemeClr val="tx1"/>
+            </a:solidFill>
+            <a:ln>
+              <a:noFill/>
+            </a:ln>
+          </p:spPr>
+          <p:style>
+            <a:lnRef idx="2">
+              <a:schemeClr val="accent1">
+                <a:shade val="50000"/>
+              </a:schemeClr>
+            </a:lnRef>
+            <a:fillRef idx="1">
+              <a:schemeClr val="accent1"/>
+            </a:fillRef>
+            <a:effectRef idx="0">
+              <a:schemeClr val="accent1"/>
+            </a:effectRef>
+            <a:fontRef idx="minor">
+              <a:schemeClr val="lt1"/>
+            </a:fontRef>
+          </p:style>
+          <p:txBody>
+            <a:bodyPr rtlCol="0" anchor="ctr"/>
+            <a:lstStyle/>
+            <a:p>
+              <a:pPr algn="ctr"/>
+              <a:endParaRPr lang="de-DE"/>
+            </a:p>
+          </p:txBody>
+        </p:sp>
+        <p:sp>
+          <p:nvSpPr>
+            <p:cNvPr id="4" name="Rechteck 3">
+              <a:extLst>
+                <a:ext uri="{FF2B5EF4-FFF2-40B4-BE49-F238E27FC236}">
+                  <a16:creationId xmlns:a16="http://schemas.microsoft.com/office/drawing/2014/main" id="{DDC46C59-CA02-428F-A1E4-90F704724EC9}"/>
+                </a:ext>
+              </a:extLst>
+            </p:cNvPr>
+            <p:cNvSpPr/>
+            <p:nvPr/>
+          </p:nvSpPr>
+          <p:spPr>
+            <a:xfrm>
+              <a:off x="2838449" y="762007"/>
+              <a:ext cx="2310063" cy="473242"/>
+            </a:xfrm>
+            <a:prstGeom prst="rect">
+              <a:avLst/>
+            </a:prstGeom>
+            <a:solidFill>
+              <a:schemeClr val="bg1">
+                <a:lumMod val="85000"/>
+              </a:schemeClr>
+            </a:solidFill>
+            <a:ln>
+              <a:noFill/>
+            </a:ln>
+          </p:spPr>
+          <p:style>
+            <a:lnRef idx="2">
+              <a:schemeClr val="accent1">
+                <a:shade val="50000"/>
+              </a:schemeClr>
+            </a:lnRef>
+            <a:fillRef idx="1">
+              <a:schemeClr val="accent1"/>
+            </a:fillRef>
+            <a:effectRef idx="0">
+              <a:schemeClr val="accent1"/>
+            </a:effectRef>
+            <a:fontRef idx="minor">
+              <a:schemeClr val="lt1"/>
+            </a:fontRef>
+          </p:style>
+          <p:txBody>
+            <a:bodyPr rtlCol="0" anchor="ctr"/>
+            <a:lstStyle/>
+            <a:p>
+              <a:pPr algn="ctr"/>
+              <a:r>
+                <a:rPr lang="de-DE" dirty="0">
+                  <a:solidFill>
+                    <a:schemeClr val="tx1"/>
+                  </a:solidFill>
+                </a:rPr>
+                <a:t>Query Time</a:t>
+              </a:r>
+            </a:p>
+          </p:txBody>
+        </p:sp>
+        <p:sp>
+          <p:nvSpPr>
+            <p:cNvPr id="5" name="Rechteck 4">
+              <a:extLst>
+                <a:ext uri="{FF2B5EF4-FFF2-40B4-BE49-F238E27FC236}">
+                  <a16:creationId xmlns:a16="http://schemas.microsoft.com/office/drawing/2014/main" id="{0A18165E-22D8-482B-9236-EDFA3F3903B3}"/>
+                </a:ext>
+              </a:extLst>
+            </p:cNvPr>
+            <p:cNvSpPr/>
+            <p:nvPr/>
+          </p:nvSpPr>
+          <p:spPr>
+            <a:xfrm>
+              <a:off x="7291138" y="762007"/>
+              <a:ext cx="2310063" cy="473242"/>
+            </a:xfrm>
+            <a:prstGeom prst="rect">
+              <a:avLst/>
+            </a:prstGeom>
+            <a:solidFill>
+              <a:schemeClr val="bg1">
+                <a:lumMod val="85000"/>
+              </a:schemeClr>
+            </a:solidFill>
+            <a:ln>
+              <a:noFill/>
+            </a:ln>
+          </p:spPr>
+          <p:style>
+            <a:lnRef idx="2">
+              <a:schemeClr val="accent1">
+                <a:shade val="50000"/>
+              </a:schemeClr>
+            </a:lnRef>
+            <a:fillRef idx="1">
+              <a:schemeClr val="accent1"/>
+            </a:fillRef>
+            <a:effectRef idx="0">
+              <a:schemeClr val="accent1"/>
+            </a:effectRef>
+            <a:fontRef idx="minor">
+              <a:schemeClr val="lt1"/>
+            </a:fontRef>
+          </p:style>
+          <p:txBody>
+            <a:bodyPr rtlCol="0" anchor="ctr"/>
+            <a:lstStyle/>
+            <a:p>
+              <a:pPr algn="ctr"/>
+              <a:r>
+                <a:rPr lang="de-DE" dirty="0">
+                  <a:solidFill>
+                    <a:schemeClr val="tx1"/>
+                  </a:solidFill>
+                </a:rPr>
+                <a:t>Index Time</a:t>
+              </a:r>
+            </a:p>
+          </p:txBody>
+        </p:sp>
+        <p:sp>
+          <p:nvSpPr>
+            <p:cNvPr id="6" name="Flussdiagramm: Magnetplattenspeicher 5">
+              <a:extLst>
+                <a:ext uri="{FF2B5EF4-FFF2-40B4-BE49-F238E27FC236}">
+                  <a16:creationId xmlns:a16="http://schemas.microsoft.com/office/drawing/2014/main" id="{7EEA170B-4089-4D97-A1FD-FEEE2150A1A3}"/>
+                </a:ext>
+              </a:extLst>
+            </p:cNvPr>
+            <p:cNvSpPr/>
+            <p:nvPr/>
+          </p:nvSpPr>
+          <p:spPr>
+            <a:xfrm>
+              <a:off x="8171448" y="1594556"/>
+              <a:ext cx="617621" cy="818147"/>
+            </a:xfrm>
+            <a:prstGeom prst="flowChartMagneticDisk">
+              <a:avLst/>
+            </a:prstGeom>
+            <a:solidFill>
+              <a:schemeClr val="bg1">
+                <a:lumMod val="85000"/>
+              </a:schemeClr>
+            </a:solidFill>
+            <a:ln>
+              <a:solidFill>
+                <a:schemeClr val="bg1">
+                  <a:lumMod val="50000"/>
+                </a:schemeClr>
+              </a:solidFill>
+            </a:ln>
+          </p:spPr>
+          <p:style>
+            <a:lnRef idx="2">
+              <a:schemeClr val="accent1">
+                <a:shade val="50000"/>
+              </a:schemeClr>
+            </a:lnRef>
+            <a:fillRef idx="1">
+              <a:schemeClr val="accent1"/>
+            </a:fillRef>
+            <a:effectRef idx="0">
+              <a:schemeClr val="accent1"/>
+            </a:effectRef>
+            <a:fontRef idx="minor">
+              <a:schemeClr val="lt1"/>
+            </a:fontRef>
+          </p:style>
+          <p:txBody>
+            <a:bodyPr rtlCol="0" anchor="ctr"/>
+            <a:lstStyle/>
+            <a:p>
+              <a:pPr algn="ctr"/>
+              <a:endParaRPr lang="de-DE"/>
+            </a:p>
+          </p:txBody>
+        </p:sp>
+        <p:sp>
+          <p:nvSpPr>
+            <p:cNvPr id="7" name="Rechteck 6">
+              <a:extLst>
+                <a:ext uri="{FF2B5EF4-FFF2-40B4-BE49-F238E27FC236}">
+                  <a16:creationId xmlns:a16="http://schemas.microsoft.com/office/drawing/2014/main" id="{80A2E756-CB6D-4ADE-BA49-BD4CD9C18D47}"/>
+                </a:ext>
+              </a:extLst>
+            </p:cNvPr>
+            <p:cNvSpPr/>
+            <p:nvPr/>
+          </p:nvSpPr>
+          <p:spPr>
+            <a:xfrm>
+              <a:off x="3223458" y="3017507"/>
+              <a:ext cx="1331494" cy="304801"/>
+            </a:xfrm>
+            <a:prstGeom prst="rect">
+              <a:avLst/>
+            </a:prstGeom>
+            <a:solidFill>
+              <a:schemeClr val="bg1"/>
+            </a:solidFill>
+            <a:ln>
+              <a:solidFill>
+                <a:schemeClr val="bg1">
+                  <a:lumMod val="85000"/>
+                </a:schemeClr>
+              </a:solidFill>
+            </a:ln>
+          </p:spPr>
+          <p:style>
+            <a:lnRef idx="2">
+              <a:schemeClr val="accent1">
+                <a:shade val="50000"/>
+              </a:schemeClr>
+            </a:lnRef>
+            <a:fillRef idx="1">
+              <a:schemeClr val="accent1"/>
+            </a:fillRef>
+            <a:effectRef idx="0">
+              <a:schemeClr val="accent1"/>
+            </a:effectRef>
+            <a:fontRef idx="minor">
+              <a:schemeClr val="lt1"/>
+            </a:fontRef>
+          </p:style>
+          <p:txBody>
+            <a:bodyPr rtlCol="0" anchor="ctr"/>
+            <a:lstStyle/>
+            <a:p>
+              <a:pPr algn="ctr"/>
+              <a:r>
+                <a:rPr lang="de-DE" sz="1600" dirty="0">
+                  <a:solidFill>
+                    <a:schemeClr val="tx1"/>
+                  </a:solidFill>
+                </a:rPr>
+                <a:t>Analyzer</a:t>
+              </a:r>
+            </a:p>
+          </p:txBody>
+        </p:sp>
+        <p:sp>
+          <p:nvSpPr>
+            <p:cNvPr id="8" name="Rechteck 7">
+              <a:extLst>
+                <a:ext uri="{FF2B5EF4-FFF2-40B4-BE49-F238E27FC236}">
+                  <a16:creationId xmlns:a16="http://schemas.microsoft.com/office/drawing/2014/main" id="{659024FE-EDF4-4355-84AB-365ECBD1D2B4}"/>
+                </a:ext>
+              </a:extLst>
+            </p:cNvPr>
+            <p:cNvSpPr/>
+            <p:nvPr/>
+          </p:nvSpPr>
+          <p:spPr>
+            <a:xfrm>
+              <a:off x="7795206" y="3017507"/>
+              <a:ext cx="1331494" cy="304801"/>
+            </a:xfrm>
+            <a:prstGeom prst="rect">
+              <a:avLst/>
+            </a:prstGeom>
+            <a:solidFill>
+              <a:schemeClr val="bg1"/>
+            </a:solidFill>
+            <a:ln>
+              <a:solidFill>
+                <a:schemeClr val="bg1">
+                  <a:lumMod val="85000"/>
+                </a:schemeClr>
+              </a:solidFill>
+            </a:ln>
+          </p:spPr>
+          <p:style>
+            <a:lnRef idx="2">
+              <a:schemeClr val="accent1">
+                <a:shade val="50000"/>
+              </a:schemeClr>
+            </a:lnRef>
+            <a:fillRef idx="1">
+              <a:schemeClr val="accent1"/>
+            </a:fillRef>
+            <a:effectRef idx="0">
+              <a:schemeClr val="accent1"/>
+            </a:effectRef>
+            <a:fontRef idx="minor">
+              <a:schemeClr val="lt1"/>
+            </a:fontRef>
+          </p:style>
+          <p:txBody>
+            <a:bodyPr rtlCol="0" anchor="ctr"/>
+            <a:lstStyle/>
+            <a:p>
+              <a:pPr algn="ctr"/>
+              <a:r>
+                <a:rPr lang="de-DE" sz="1600" dirty="0">
+                  <a:solidFill>
+                    <a:schemeClr val="tx1"/>
+                  </a:solidFill>
+                </a:rPr>
+                <a:t>Analyzer</a:t>
+              </a:r>
+            </a:p>
+          </p:txBody>
+        </p:sp>
+        <p:sp>
+          <p:nvSpPr>
+            <p:cNvPr id="10" name="Pfeil: nach unten 9">
+              <a:extLst>
+                <a:ext uri="{FF2B5EF4-FFF2-40B4-BE49-F238E27FC236}">
+                  <a16:creationId xmlns:a16="http://schemas.microsoft.com/office/drawing/2014/main" id="{2C16EBCF-2E2B-46FC-91F3-5A93B63C72CF}"/>
+                </a:ext>
+              </a:extLst>
+            </p:cNvPr>
+            <p:cNvSpPr/>
+            <p:nvPr/>
+          </p:nvSpPr>
+          <p:spPr>
+            <a:xfrm>
+              <a:off x="3784931" y="2666999"/>
+              <a:ext cx="208548" cy="264695"/>
+            </a:xfrm>
+            <a:prstGeom prst="downArrow">
+              <a:avLst/>
+            </a:prstGeom>
+            <a:solidFill>
+              <a:schemeClr val="bg1"/>
+            </a:solidFill>
+            <a:ln>
+              <a:solidFill>
+                <a:schemeClr val="bg1">
+                  <a:lumMod val="75000"/>
+                </a:schemeClr>
+              </a:solidFill>
+            </a:ln>
+          </p:spPr>
+          <p:style>
+            <a:lnRef idx="2">
+              <a:schemeClr val="accent1">
+                <a:shade val="50000"/>
+              </a:schemeClr>
+            </a:lnRef>
+            <a:fillRef idx="1">
+              <a:schemeClr val="accent1"/>
+            </a:fillRef>
+            <a:effectRef idx="0">
+              <a:schemeClr val="accent1"/>
+            </a:effectRef>
+            <a:fontRef idx="minor">
+              <a:schemeClr val="lt1"/>
+            </a:fontRef>
+          </p:style>
+          <p:txBody>
+            <a:bodyPr rtlCol="0" anchor="ctr"/>
+            <a:lstStyle/>
+            <a:p>
+              <a:pPr algn="ctr"/>
+              <a:endParaRPr lang="de-DE"/>
+            </a:p>
+          </p:txBody>
+        </p:sp>
+        <p:sp>
+          <p:nvSpPr>
+            <p:cNvPr id="11" name="Pfeil: nach unten 10">
+              <a:extLst>
+                <a:ext uri="{FF2B5EF4-FFF2-40B4-BE49-F238E27FC236}">
+                  <a16:creationId xmlns:a16="http://schemas.microsoft.com/office/drawing/2014/main" id="{FF8A1C6A-3032-4369-89F3-19E1F5A8DE46}"/>
+                </a:ext>
+              </a:extLst>
+            </p:cNvPr>
+            <p:cNvSpPr/>
+            <p:nvPr/>
+          </p:nvSpPr>
+          <p:spPr>
+            <a:xfrm>
+              <a:off x="3784931" y="3479926"/>
+              <a:ext cx="208548" cy="264695"/>
+            </a:xfrm>
+            <a:prstGeom prst="downArrow">
+              <a:avLst/>
+            </a:prstGeom>
+            <a:solidFill>
+              <a:schemeClr val="bg1"/>
+            </a:solidFill>
+            <a:ln>
+              <a:solidFill>
+                <a:schemeClr val="bg1">
+                  <a:lumMod val="75000"/>
+                </a:schemeClr>
+              </a:solidFill>
+            </a:ln>
+          </p:spPr>
+          <p:style>
+            <a:lnRef idx="2">
+              <a:schemeClr val="accent1">
+                <a:shade val="50000"/>
+              </a:schemeClr>
+            </a:lnRef>
+            <a:fillRef idx="1">
+              <a:schemeClr val="accent1"/>
+            </a:fillRef>
+            <a:effectRef idx="0">
+              <a:schemeClr val="accent1"/>
+            </a:effectRef>
+            <a:fontRef idx="minor">
+              <a:schemeClr val="lt1"/>
+            </a:fontRef>
+          </p:style>
+          <p:txBody>
+            <a:bodyPr rtlCol="0" anchor="ctr"/>
+            <a:lstStyle/>
+            <a:p>
+              <a:pPr algn="ctr"/>
+              <a:endParaRPr lang="de-DE"/>
+            </a:p>
+          </p:txBody>
+        </p:sp>
+        <p:sp>
+          <p:nvSpPr>
+            <p:cNvPr id="12" name="Pfeil: nach unten 11">
+              <a:extLst>
+                <a:ext uri="{FF2B5EF4-FFF2-40B4-BE49-F238E27FC236}">
+                  <a16:creationId xmlns:a16="http://schemas.microsoft.com/office/drawing/2014/main" id="{69232CC7-CBDE-42CB-96FD-4C1249EE33E6}"/>
+                </a:ext>
+              </a:extLst>
+            </p:cNvPr>
+            <p:cNvSpPr/>
+            <p:nvPr/>
+          </p:nvSpPr>
+          <p:spPr>
+            <a:xfrm>
+              <a:off x="8341895" y="2672513"/>
+              <a:ext cx="208548" cy="264695"/>
+            </a:xfrm>
+            <a:prstGeom prst="downArrow">
+              <a:avLst/>
+            </a:prstGeom>
+            <a:solidFill>
+              <a:schemeClr val="bg1"/>
+            </a:solidFill>
+            <a:ln>
+              <a:solidFill>
+                <a:schemeClr val="bg1">
+                  <a:lumMod val="75000"/>
+                </a:schemeClr>
+              </a:solidFill>
+            </a:ln>
+          </p:spPr>
+          <p:style>
+            <a:lnRef idx="2">
+              <a:schemeClr val="accent1">
+                <a:shade val="50000"/>
+              </a:schemeClr>
+            </a:lnRef>
+            <a:fillRef idx="1">
+              <a:schemeClr val="accent1"/>
+            </a:fillRef>
+            <a:effectRef idx="0">
+              <a:schemeClr val="accent1"/>
+            </a:effectRef>
+            <a:fontRef idx="minor">
+              <a:schemeClr val="lt1"/>
+            </a:fontRef>
+          </p:style>
+          <p:txBody>
+            <a:bodyPr rtlCol="0" anchor="ctr"/>
+            <a:lstStyle/>
+            <a:p>
+              <a:pPr algn="ctr"/>
+              <a:endParaRPr lang="de-DE"/>
+            </a:p>
+          </p:txBody>
+        </p:sp>
+        <p:sp>
+          <p:nvSpPr>
+            <p:cNvPr id="13" name="Pfeil: nach unten 12">
+              <a:extLst>
+                <a:ext uri="{FF2B5EF4-FFF2-40B4-BE49-F238E27FC236}">
+                  <a16:creationId xmlns:a16="http://schemas.microsoft.com/office/drawing/2014/main" id="{F8694B22-58F9-4685-88E6-545F3C1C0875}"/>
+                </a:ext>
+              </a:extLst>
+            </p:cNvPr>
+            <p:cNvSpPr/>
+            <p:nvPr/>
+          </p:nvSpPr>
+          <p:spPr>
+            <a:xfrm>
+              <a:off x="8356679" y="3476419"/>
+              <a:ext cx="208548" cy="264695"/>
+            </a:xfrm>
+            <a:prstGeom prst="downArrow">
+              <a:avLst/>
+            </a:prstGeom>
+            <a:solidFill>
+              <a:schemeClr val="bg1"/>
+            </a:solidFill>
+            <a:ln>
+              <a:solidFill>
+                <a:schemeClr val="bg1">
+                  <a:lumMod val="75000"/>
+                </a:schemeClr>
+              </a:solidFill>
+            </a:ln>
+          </p:spPr>
+          <p:style>
+            <a:lnRef idx="2">
+              <a:schemeClr val="accent1">
+                <a:shade val="50000"/>
+              </a:schemeClr>
+            </a:lnRef>
+            <a:fillRef idx="1">
+              <a:schemeClr val="accent1"/>
+            </a:fillRef>
+            <a:effectRef idx="0">
+              <a:schemeClr val="accent1"/>
+            </a:effectRef>
+            <a:fontRef idx="minor">
+              <a:schemeClr val="lt1"/>
+            </a:fontRef>
+          </p:style>
+          <p:txBody>
+            <a:bodyPr rtlCol="0" anchor="ctr"/>
+            <a:lstStyle/>
+            <a:p>
+              <a:pPr algn="ctr"/>
+              <a:endParaRPr lang="de-DE"/>
+            </a:p>
+          </p:txBody>
+        </p:sp>
+        <p:sp>
+          <p:nvSpPr>
+            <p:cNvPr id="14" name="Textfeld 13">
+              <a:extLst>
+                <a:ext uri="{FF2B5EF4-FFF2-40B4-BE49-F238E27FC236}">
+                  <a16:creationId xmlns:a16="http://schemas.microsoft.com/office/drawing/2014/main" id="{DF14B5B0-FAE2-4D58-B44F-BBA3294EE675}"/>
+                </a:ext>
+              </a:extLst>
+            </p:cNvPr>
+            <p:cNvSpPr txBox="1"/>
+            <p:nvPr/>
+          </p:nvSpPr>
+          <p:spPr>
+            <a:xfrm>
+              <a:off x="3569997" y="4118321"/>
+              <a:ext cx="866273" cy="307777"/>
+            </a:xfrm>
+            <a:prstGeom prst="rect">
+              <a:avLst/>
+            </a:prstGeom>
+            <a:noFill/>
+          </p:spPr>
+          <p:txBody>
+            <a:bodyPr wrap="square" rtlCol="0">
+              <a:spAutoFit/>
+            </a:bodyPr>
+            <a:lstStyle/>
+            <a:p>
+              <a:r>
+                <a:rPr lang="de-DE" sz="1400" dirty="0"/>
+                <a:t>„blau“</a:t>
+              </a:r>
+            </a:p>
+          </p:txBody>
+        </p:sp>
+        <p:sp>
+          <p:nvSpPr>
+            <p:cNvPr id="15" name="Textfeld 14">
+              <a:extLst>
+                <a:ext uri="{FF2B5EF4-FFF2-40B4-BE49-F238E27FC236}">
+                  <a16:creationId xmlns:a16="http://schemas.microsoft.com/office/drawing/2014/main" id="{9AFEFA15-3F26-42F7-867F-B5C97A0CB947}"/>
+                </a:ext>
+              </a:extLst>
+            </p:cNvPr>
+            <p:cNvSpPr txBox="1"/>
+            <p:nvPr/>
+          </p:nvSpPr>
+          <p:spPr>
+            <a:xfrm>
+              <a:off x="3566735" y="4388147"/>
+              <a:ext cx="866273" cy="307777"/>
+            </a:xfrm>
+            <a:prstGeom prst="rect">
+              <a:avLst/>
+            </a:prstGeom>
+            <a:noFill/>
+          </p:spPr>
+          <p:txBody>
+            <a:bodyPr wrap="square" rtlCol="0">
+              <a:spAutoFit/>
+            </a:bodyPr>
+            <a:lstStyle/>
+            <a:p>
+              <a:r>
+                <a:rPr lang="de-DE" sz="1400" dirty="0"/>
+                <a:t>„herr“</a:t>
+              </a:r>
+            </a:p>
+          </p:txBody>
+        </p:sp>
+        <p:sp>
+          <p:nvSpPr>
+            <p:cNvPr id="16" name="Textfeld 15">
+              <a:extLst>
+                <a:ext uri="{FF2B5EF4-FFF2-40B4-BE49-F238E27FC236}">
+                  <a16:creationId xmlns:a16="http://schemas.microsoft.com/office/drawing/2014/main" id="{7C3B4127-4232-4BCF-B747-574D97FCA728}"/>
+                </a:ext>
+              </a:extLst>
+            </p:cNvPr>
+            <p:cNvSpPr txBox="1"/>
+            <p:nvPr/>
+          </p:nvSpPr>
+          <p:spPr>
+            <a:xfrm>
+              <a:off x="3576640" y="4670687"/>
+              <a:ext cx="866273" cy="307777"/>
+            </a:xfrm>
+            <a:prstGeom prst="rect">
+              <a:avLst/>
+            </a:prstGeom>
+            <a:noFill/>
+          </p:spPr>
+          <p:txBody>
+            <a:bodyPr wrap="square" rtlCol="0">
+              <a:spAutoFit/>
+            </a:bodyPr>
+            <a:lstStyle/>
+            <a:p>
+              <a:r>
+                <a:rPr lang="de-DE" sz="1400" dirty="0"/>
+                <a:t>„hos“</a:t>
+              </a:r>
+            </a:p>
+          </p:txBody>
+        </p:sp>
+        <p:sp>
+          <p:nvSpPr>
+            <p:cNvPr id="17" name="Textfeld 16">
+              <a:extLst>
+                <a:ext uri="{FF2B5EF4-FFF2-40B4-BE49-F238E27FC236}">
+                  <a16:creationId xmlns:a16="http://schemas.microsoft.com/office/drawing/2014/main" id="{CE108506-6EF0-450A-9669-FF1CC0DB5BDB}"/>
+                </a:ext>
+              </a:extLst>
+            </p:cNvPr>
+            <p:cNvSpPr txBox="1"/>
+            <p:nvPr/>
+          </p:nvSpPr>
+          <p:spPr>
+            <a:xfrm>
+              <a:off x="3560342" y="4954791"/>
+              <a:ext cx="866273" cy="307777"/>
+            </a:xfrm>
+            <a:prstGeom prst="rect">
+              <a:avLst/>
+            </a:prstGeom>
+            <a:noFill/>
+          </p:spPr>
+          <p:txBody>
+            <a:bodyPr wrap="square" rtlCol="0">
+              <a:spAutoFit/>
+            </a:bodyPr>
+            <a:lstStyle/>
+            <a:p>
+              <a:r>
+                <a:rPr lang="de-DE" sz="1400" dirty="0"/>
+                <a:t>„levis“</a:t>
+              </a:r>
+            </a:p>
+          </p:txBody>
+        </p:sp>
+        <p:cxnSp>
+          <p:nvCxnSpPr>
+            <p:cNvPr id="19" name="Gerade Verbindung mit Pfeil 18">
+              <a:extLst>
+                <a:ext uri="{FF2B5EF4-FFF2-40B4-BE49-F238E27FC236}">
+                  <a16:creationId xmlns:a16="http://schemas.microsoft.com/office/drawing/2014/main" id="{3A48BAB5-0CA9-41E1-8267-7CF204E5963E}"/>
+                </a:ext>
+              </a:extLst>
+            </p:cNvPr>
+            <p:cNvCxnSpPr/>
+            <p:nvPr/>
+          </p:nvCxnSpPr>
+          <p:spPr>
+            <a:xfrm>
+              <a:off x="5148512" y="4272209"/>
+              <a:ext cx="1812757" cy="0"/>
+            </a:xfrm>
+            <a:prstGeom prst="straightConnector1">
+              <a:avLst/>
+            </a:prstGeom>
+            <a:ln w="19050">
+              <a:solidFill>
+                <a:schemeClr val="tx1"/>
+              </a:solidFill>
+              <a:headEnd type="arrow" w="med" len="med"/>
+              <a:tailEnd type="arrow" w="med" len="med"/>
+            </a:ln>
+          </p:spPr>
+          <p:style>
+            <a:lnRef idx="1">
+              <a:schemeClr val="accent1"/>
+            </a:lnRef>
+            <a:fillRef idx="0">
+              <a:schemeClr val="accent1"/>
+            </a:fillRef>
+            <a:effectRef idx="0">
+              <a:schemeClr val="accent1"/>
+            </a:effectRef>
+            <a:fontRef idx="minor">
+              <a:schemeClr val="tx1"/>
+            </a:fontRef>
+          </p:style>
+        </p:cxnSp>
+        <p:cxnSp>
+          <p:nvCxnSpPr>
+            <p:cNvPr id="20" name="Gerade Verbindung mit Pfeil 19">
+              <a:extLst>
+                <a:ext uri="{FF2B5EF4-FFF2-40B4-BE49-F238E27FC236}">
+                  <a16:creationId xmlns:a16="http://schemas.microsoft.com/office/drawing/2014/main" id="{90D5E827-96FA-44B0-9089-FA7F661CED06}"/>
+                </a:ext>
+              </a:extLst>
+            </p:cNvPr>
+            <p:cNvCxnSpPr/>
+            <p:nvPr/>
+          </p:nvCxnSpPr>
+          <p:spPr>
+            <a:xfrm>
+              <a:off x="5151393" y="4537968"/>
+              <a:ext cx="1812757" cy="0"/>
+            </a:xfrm>
+            <a:prstGeom prst="straightConnector1">
+              <a:avLst/>
+            </a:prstGeom>
+            <a:ln w="19050">
+              <a:solidFill>
+                <a:schemeClr val="tx1"/>
+              </a:solidFill>
+              <a:headEnd type="arrow" w="med" len="med"/>
+              <a:tailEnd type="arrow" w="med" len="med"/>
+            </a:ln>
+          </p:spPr>
+          <p:style>
+            <a:lnRef idx="1">
+              <a:schemeClr val="accent1"/>
+            </a:lnRef>
+            <a:fillRef idx="0">
+              <a:schemeClr val="accent1"/>
+            </a:fillRef>
+            <a:effectRef idx="0">
+              <a:schemeClr val="accent1"/>
+            </a:effectRef>
+            <a:fontRef idx="minor">
+              <a:schemeClr val="tx1"/>
+            </a:fontRef>
+          </p:style>
+        </p:cxnSp>
+        <p:cxnSp>
+          <p:nvCxnSpPr>
+            <p:cNvPr id="21" name="Gerade Verbindung mit Pfeil 20">
+              <a:extLst>
+                <a:ext uri="{FF2B5EF4-FFF2-40B4-BE49-F238E27FC236}">
+                  <a16:creationId xmlns:a16="http://schemas.microsoft.com/office/drawing/2014/main" id="{6B82DA9D-CBCC-49AC-8CA5-6BA217F4B5F1}"/>
+                </a:ext>
+              </a:extLst>
+            </p:cNvPr>
+            <p:cNvCxnSpPr/>
+            <p:nvPr/>
+          </p:nvCxnSpPr>
+          <p:spPr>
+            <a:xfrm>
+              <a:off x="5148511" y="4817517"/>
+              <a:ext cx="1812757" cy="0"/>
+            </a:xfrm>
+            <a:prstGeom prst="straightConnector1">
+              <a:avLst/>
+            </a:prstGeom>
+            <a:ln w="19050">
+              <a:solidFill>
+                <a:schemeClr val="tx1"/>
+              </a:solidFill>
+              <a:headEnd type="arrow" w="med" len="med"/>
+              <a:tailEnd type="arrow" w="med" len="med"/>
+            </a:ln>
+          </p:spPr>
+          <p:style>
+            <a:lnRef idx="1">
+              <a:schemeClr val="accent1"/>
+            </a:lnRef>
+            <a:fillRef idx="0">
+              <a:schemeClr val="accent1"/>
+            </a:fillRef>
+            <a:effectRef idx="0">
+              <a:schemeClr val="accent1"/>
+            </a:effectRef>
+            <a:fontRef idx="minor">
+              <a:schemeClr val="tx1"/>
+            </a:fontRef>
+          </p:style>
+        </p:cxnSp>
+        <p:cxnSp>
+          <p:nvCxnSpPr>
+            <p:cNvPr id="22" name="Gerade Verbindung mit Pfeil 21">
+              <a:extLst>
+                <a:ext uri="{FF2B5EF4-FFF2-40B4-BE49-F238E27FC236}">
+                  <a16:creationId xmlns:a16="http://schemas.microsoft.com/office/drawing/2014/main" id="{C7D3D354-5F5F-4746-B493-D24373ED2AD8}"/>
+                </a:ext>
+              </a:extLst>
+            </p:cNvPr>
+            <p:cNvCxnSpPr/>
+            <p:nvPr/>
+          </p:nvCxnSpPr>
+          <p:spPr>
+            <a:xfrm>
+              <a:off x="5148511" y="5090342"/>
+              <a:ext cx="1812757" cy="0"/>
+            </a:xfrm>
+            <a:prstGeom prst="straightConnector1">
+              <a:avLst/>
+            </a:prstGeom>
+            <a:ln w="19050">
+              <a:solidFill>
+                <a:schemeClr val="tx1"/>
+              </a:solidFill>
+              <a:headEnd type="arrow" w="med" len="med"/>
+              <a:tailEnd type="arrow" w="med" len="med"/>
+            </a:ln>
+          </p:spPr>
+          <p:style>
+            <a:lnRef idx="1">
+              <a:schemeClr val="accent1"/>
+            </a:lnRef>
+            <a:fillRef idx="0">
+              <a:schemeClr val="accent1"/>
+            </a:fillRef>
+            <a:effectRef idx="0">
+              <a:schemeClr val="accent1"/>
+            </a:effectRef>
+            <a:fontRef idx="minor">
+              <a:schemeClr val="tx1"/>
+            </a:fontRef>
+          </p:style>
+        </p:cxnSp>
+        <p:sp>
+          <p:nvSpPr>
+            <p:cNvPr id="25" name="Rechteck: abgerundete Ecken 24">
+              <a:extLst>
+                <a:ext uri="{FF2B5EF4-FFF2-40B4-BE49-F238E27FC236}">
+                  <a16:creationId xmlns:a16="http://schemas.microsoft.com/office/drawing/2014/main" id="{4045F874-1C67-4459-8A0F-1231F8BA428C}"/>
+                </a:ext>
+              </a:extLst>
+            </p:cNvPr>
+            <p:cNvSpPr/>
+            <p:nvPr/>
+          </p:nvSpPr>
+          <p:spPr>
+            <a:xfrm>
+              <a:off x="2678215" y="1809722"/>
+              <a:ext cx="2865335" cy="369332"/>
+            </a:xfrm>
+            <a:prstGeom prst="roundRect">
+              <a:avLst>
+                <a:gd name="adj" fmla="val 50000"/>
+              </a:avLst>
+            </a:prstGeom>
+            <a:noFill/>
+            <a:ln>
+              <a:solidFill>
+                <a:schemeClr val="bg1">
+                  <a:lumMod val="75000"/>
+                </a:schemeClr>
+              </a:solidFill>
+            </a:ln>
+          </p:spPr>
+          <p:style>
+            <a:lnRef idx="2">
+              <a:schemeClr val="accent1">
+                <a:shade val="50000"/>
+              </a:schemeClr>
+            </a:lnRef>
+            <a:fillRef idx="1">
+              <a:schemeClr val="accent1"/>
+            </a:fillRef>
+            <a:effectRef idx="0">
+              <a:schemeClr val="accent1"/>
+            </a:effectRef>
+            <a:fontRef idx="minor">
+              <a:schemeClr val="lt1"/>
+            </a:fontRef>
+          </p:style>
+          <p:txBody>
+            <a:bodyPr rtlCol="0" anchor="ctr"/>
+            <a:lstStyle/>
+            <a:p>
+              <a:pPr algn="ctr"/>
+              <a:endParaRPr lang="de-DE"/>
+            </a:p>
+          </p:txBody>
+        </p:sp>
+        <p:pic>
+          <p:nvPicPr>
+            <p:cNvPr id="28" name="Grafik 27" descr="Lupe mit einfarbiger Füllung">
+              <a:extLst>
+                <a:ext uri="{FF2B5EF4-FFF2-40B4-BE49-F238E27FC236}">
+                  <a16:creationId xmlns:a16="http://schemas.microsoft.com/office/drawing/2014/main" id="{A0E8925A-9136-4514-90C5-541A9E979082}"/>
+                </a:ext>
+              </a:extLst>
+            </p:cNvPr>
+            <p:cNvPicPr>
+              <a:picLocks noChangeAspect="1"/>
+            </p:cNvPicPr>
+            <p:nvPr/>
+          </p:nvPicPr>
+          <p:blipFill>
+            <a:blip r:embed="rId2">
+              <a:extLst>
+                <a:ext uri="{28A0092B-C50C-407E-A947-70E740481C1C}">
+                  <a14:useLocalDpi xmlns:a14="http://schemas.microsoft.com/office/drawing/2010/main" val="0"/>
+                </a:ext>
+                <a:ext uri="{96DAC541-7B7A-43D3-8B79-37D633B846F1}">
+                  <asvg:svgBlip xmlns:asvg="http://schemas.microsoft.com/office/drawing/2016/SVG/main" r:embed="rId3"/>
+                </a:ext>
+              </a:extLst>
+            </a:blip>
+            <a:stretch>
+              <a:fillRect/>
+            </a:stretch>
+          </p:blipFill>
+          <p:spPr>
+            <a:xfrm>
+              <a:off x="5092490" y="1837977"/>
+              <a:ext cx="312821" cy="312821"/>
+            </a:xfrm>
+            <a:prstGeom prst="rect">
+              <a:avLst/>
+            </a:prstGeom>
+          </p:spPr>
+        </p:pic>
+        <p:sp>
+          <p:nvSpPr>
+            <p:cNvPr id="29" name="Textfeld 28">
+              <a:extLst>
+                <a:ext uri="{FF2B5EF4-FFF2-40B4-BE49-F238E27FC236}">
+                  <a16:creationId xmlns:a16="http://schemas.microsoft.com/office/drawing/2014/main" id="{378EABF9-68D8-4C2A-BD85-54896A362DA5}"/>
+                </a:ext>
+              </a:extLst>
+            </p:cNvPr>
+            <p:cNvSpPr txBox="1"/>
+            <p:nvPr/>
+          </p:nvSpPr>
+          <p:spPr>
+            <a:xfrm>
+              <a:off x="2750028" y="1860274"/>
+              <a:ext cx="2477822" cy="307777"/>
+            </a:xfrm>
+            <a:prstGeom prst="rect">
+              <a:avLst/>
+            </a:prstGeom>
+            <a:noFill/>
+          </p:spPr>
+          <p:txBody>
+            <a:bodyPr wrap="square" rtlCol="0" anchor="ctr">
+              <a:spAutoFit/>
+            </a:bodyPr>
+            <a:lstStyle/>
+            <a:p>
+              <a:r>
+                <a:rPr lang="de-DE" sz="1400" dirty="0"/>
+                <a:t>blaue herrenhose levi‘s®</a:t>
+              </a:r>
+            </a:p>
+          </p:txBody>
+        </p:sp>
+        <p:sp>
+          <p:nvSpPr>
+            <p:cNvPr id="30" name="Flussdiagramm: Mehrere Dokumente 29">
+              <a:extLst>
+                <a:ext uri="{FF2B5EF4-FFF2-40B4-BE49-F238E27FC236}">
+                  <a16:creationId xmlns:a16="http://schemas.microsoft.com/office/drawing/2014/main" id="{D9480E90-D50F-4B0F-A5FD-7C3B955C119D}"/>
+                </a:ext>
+              </a:extLst>
+            </p:cNvPr>
+            <p:cNvSpPr/>
+            <p:nvPr/>
+          </p:nvSpPr>
+          <p:spPr>
+            <a:xfrm>
+              <a:off x="9086854" y="1387275"/>
+              <a:ext cx="1071174" cy="1412071"/>
+            </a:xfrm>
+            <a:prstGeom prst="flowChartMultidocument">
+              <a:avLst/>
+            </a:prstGeom>
+            <a:solidFill>
+              <a:schemeClr val="bg1"/>
+            </a:solidFill>
+            <a:ln w="19050">
+              <a:solidFill>
+                <a:schemeClr val="bg1">
+                  <a:lumMod val="50000"/>
+                </a:schemeClr>
+              </a:solidFill>
+            </a:ln>
+          </p:spPr>
+          <p:style>
+            <a:lnRef idx="2">
+              <a:schemeClr val="accent1">
+                <a:shade val="50000"/>
+              </a:schemeClr>
+            </a:lnRef>
+            <a:fillRef idx="1">
+              <a:schemeClr val="accent1"/>
+            </a:fillRef>
+            <a:effectRef idx="0">
+              <a:schemeClr val="accent1"/>
+            </a:effectRef>
+            <a:fontRef idx="minor">
+              <a:schemeClr val="lt1"/>
+            </a:fontRef>
+          </p:style>
+          <p:txBody>
+            <a:bodyPr rtlCol="0" anchor="ctr"/>
+            <a:lstStyle/>
+            <a:p>
+              <a:pPr algn="ctr"/>
+              <a:endParaRPr lang="de-DE"/>
+            </a:p>
+          </p:txBody>
+        </p:sp>
+        <p:sp>
+          <p:nvSpPr>
+            <p:cNvPr id="31" name="Flussdiagramm: Mehrere Dokumente 30">
+              <a:extLst>
+                <a:ext uri="{FF2B5EF4-FFF2-40B4-BE49-F238E27FC236}">
+                  <a16:creationId xmlns:a16="http://schemas.microsoft.com/office/drawing/2014/main" id="{695427EE-595F-4BED-8473-4BD94CBCE0F7}"/>
+                </a:ext>
+              </a:extLst>
+            </p:cNvPr>
+            <p:cNvSpPr/>
+            <p:nvPr/>
+          </p:nvSpPr>
+          <p:spPr>
+            <a:xfrm>
+              <a:off x="6843781" y="1387274"/>
+              <a:ext cx="1071174" cy="1412071"/>
+            </a:xfrm>
+            <a:prstGeom prst="flowChartMultidocument">
+              <a:avLst/>
+            </a:prstGeom>
+            <a:solidFill>
+              <a:schemeClr val="bg1">
+                <a:lumMod val="85000"/>
+              </a:schemeClr>
+            </a:solidFill>
+            <a:ln w="19050">
+              <a:solidFill>
+                <a:schemeClr val="bg1">
+                  <a:lumMod val="50000"/>
+                </a:schemeClr>
+              </a:solidFill>
+            </a:ln>
+          </p:spPr>
+          <p:style>
+            <a:lnRef idx="2">
+              <a:schemeClr val="accent1">
+                <a:shade val="50000"/>
+              </a:schemeClr>
+            </a:lnRef>
+            <a:fillRef idx="1">
+              <a:schemeClr val="accent1"/>
+            </a:fillRef>
+            <a:effectRef idx="0">
+              <a:schemeClr val="accent1"/>
+            </a:effectRef>
+            <a:fontRef idx="minor">
+              <a:schemeClr val="lt1"/>
+            </a:fontRef>
+          </p:style>
+          <p:txBody>
+            <a:bodyPr rtlCol="0" anchor="ctr"/>
+            <a:lstStyle/>
+            <a:p>
+              <a:pPr algn="ctr"/>
+              <a:endParaRPr lang="de-DE"/>
+            </a:p>
+          </p:txBody>
+        </p:sp>
+        <p:sp>
+          <p:nvSpPr>
+            <p:cNvPr id="32" name="Flussdiagramm: Mehrere Dokumente 31">
+              <a:extLst>
+                <a:ext uri="{FF2B5EF4-FFF2-40B4-BE49-F238E27FC236}">
+                  <a16:creationId xmlns:a16="http://schemas.microsoft.com/office/drawing/2014/main" id="{C485454D-EA0D-47E7-9F53-FFBA3F905F45}"/>
+                </a:ext>
+              </a:extLst>
+            </p:cNvPr>
+            <p:cNvSpPr/>
+            <p:nvPr/>
+          </p:nvSpPr>
+          <p:spPr>
+            <a:xfrm>
+              <a:off x="7060782" y="3880352"/>
+              <a:ext cx="1137739" cy="1560780"/>
+            </a:xfrm>
+            <a:prstGeom prst="flowChartMultidocument">
+              <a:avLst/>
+            </a:prstGeom>
+            <a:solidFill>
+              <a:schemeClr val="bg1">
+                <a:lumMod val="85000"/>
+              </a:schemeClr>
+            </a:solidFill>
+            <a:ln w="19050">
+              <a:solidFill>
+                <a:schemeClr val="bg1">
+                  <a:lumMod val="50000"/>
+                </a:schemeClr>
+              </a:solidFill>
+            </a:ln>
+          </p:spPr>
+          <p:style>
+            <a:lnRef idx="2">
+              <a:schemeClr val="accent1">
+                <a:shade val="50000"/>
+              </a:schemeClr>
+            </a:lnRef>
+            <a:fillRef idx="1">
+              <a:schemeClr val="accent1"/>
+            </a:fillRef>
+            <a:effectRef idx="0">
+              <a:schemeClr val="accent1"/>
+            </a:effectRef>
+            <a:fontRef idx="minor">
+              <a:schemeClr val="lt1"/>
+            </a:fontRef>
+          </p:style>
+          <p:txBody>
+            <a:bodyPr rtlCol="0" anchor="ctr"/>
+            <a:lstStyle/>
+            <a:p>
+              <a:pPr algn="ctr"/>
+              <a:endParaRPr lang="de-DE"/>
+            </a:p>
+          </p:txBody>
+        </p:sp>
+        <p:sp>
+          <p:nvSpPr>
+            <p:cNvPr id="33" name="Flussdiagramm: Mehrere Dokumente 32">
+              <a:extLst>
+                <a:ext uri="{FF2B5EF4-FFF2-40B4-BE49-F238E27FC236}">
+                  <a16:creationId xmlns:a16="http://schemas.microsoft.com/office/drawing/2014/main" id="{21BDA087-665C-4E03-8F7E-FC17B50527DC}"/>
+                </a:ext>
+              </a:extLst>
+            </p:cNvPr>
+            <p:cNvSpPr/>
+            <p:nvPr/>
+          </p:nvSpPr>
+          <p:spPr>
+            <a:xfrm>
+              <a:off x="8547434" y="3890298"/>
+              <a:ext cx="1137739" cy="1560780"/>
+            </a:xfrm>
+            <a:prstGeom prst="flowChartMultidocument">
+              <a:avLst/>
+            </a:prstGeom>
+            <a:solidFill>
+              <a:schemeClr val="bg1"/>
+            </a:solidFill>
+            <a:ln w="19050">
+              <a:solidFill>
+                <a:schemeClr val="bg1">
+                  <a:lumMod val="50000"/>
+                </a:schemeClr>
+              </a:solidFill>
+            </a:ln>
+          </p:spPr>
+          <p:style>
+            <a:lnRef idx="2">
+              <a:schemeClr val="accent1">
+                <a:shade val="50000"/>
+              </a:schemeClr>
+            </a:lnRef>
+            <a:fillRef idx="1">
+              <a:schemeClr val="accent1"/>
+            </a:fillRef>
+            <a:effectRef idx="0">
+              <a:schemeClr val="accent1"/>
+            </a:effectRef>
+            <a:fontRef idx="minor">
+              <a:schemeClr val="lt1"/>
+            </a:fontRef>
+          </p:style>
+          <p:txBody>
+            <a:bodyPr rtlCol="0" anchor="ctr"/>
+            <a:lstStyle/>
+            <a:p>
+              <a:pPr algn="ctr"/>
+              <a:endParaRPr lang="de-DE"/>
+            </a:p>
+          </p:txBody>
+        </p:sp>
+        <p:cxnSp>
+          <p:nvCxnSpPr>
+            <p:cNvPr id="35" name="Gerader Verbinder 34">
+              <a:extLst>
+                <a:ext uri="{FF2B5EF4-FFF2-40B4-BE49-F238E27FC236}">
+                  <a16:creationId xmlns:a16="http://schemas.microsoft.com/office/drawing/2014/main" id="{74F723C9-27EE-4449-B5C0-F81A967C6BF0}"/>
+                </a:ext>
+              </a:extLst>
+            </p:cNvPr>
+            <p:cNvCxnSpPr/>
+            <p:nvPr/>
+          </p:nvCxnSpPr>
+          <p:spPr>
+            <a:xfrm flipH="1">
+              <a:off x="6071185" y="510339"/>
+              <a:ext cx="49630" cy="5372100"/>
+            </a:xfrm>
+            <a:prstGeom prst="line">
+              <a:avLst/>
+            </a:prstGeom>
+            <a:ln w="28575">
+              <a:solidFill>
+                <a:schemeClr val="bg1">
+                  <a:lumMod val="50000"/>
+                </a:schemeClr>
+              </a:solidFill>
+              <a:prstDash val="dash"/>
+            </a:ln>
+          </p:spPr>
+          <p:style>
+            <a:lnRef idx="1">
+              <a:schemeClr val="accent1"/>
+            </a:lnRef>
+            <a:fillRef idx="0">
+              <a:schemeClr val="accent1"/>
+            </a:fillRef>
+            <a:effectRef idx="0">
+              <a:schemeClr val="accent1"/>
+            </a:effectRef>
+            <a:fontRef idx="minor">
+              <a:schemeClr val="tx1"/>
+            </a:fontRef>
+          </p:style>
+        </p:cxnSp>
+        <p:sp>
+          <p:nvSpPr>
+            <p:cNvPr id="38" name="Textfeld 37">
+              <a:extLst>
+                <a:ext uri="{FF2B5EF4-FFF2-40B4-BE49-F238E27FC236}">
+                  <a16:creationId xmlns:a16="http://schemas.microsoft.com/office/drawing/2014/main" id="{839CAEF5-09F5-466C-93B7-DF1539790899}"/>
+                </a:ext>
+              </a:extLst>
+            </p:cNvPr>
+            <p:cNvSpPr txBox="1"/>
+            <p:nvPr/>
+          </p:nvSpPr>
+          <p:spPr>
+            <a:xfrm>
+              <a:off x="7246018" y="4118321"/>
+              <a:ext cx="866273" cy="307777"/>
+            </a:xfrm>
+            <a:prstGeom prst="rect">
+              <a:avLst/>
+            </a:prstGeom>
+            <a:noFill/>
+          </p:spPr>
+          <p:txBody>
+            <a:bodyPr wrap="square" rtlCol="0">
+              <a:spAutoFit/>
+            </a:bodyPr>
+            <a:lstStyle/>
+            <a:p>
+              <a:r>
+                <a:rPr lang="de-DE" sz="1400" dirty="0"/>
+                <a:t>„blau“</a:t>
+              </a:r>
+            </a:p>
+          </p:txBody>
+        </p:sp>
+        <p:sp>
+          <p:nvSpPr>
+            <p:cNvPr id="40" name="Textfeld 39">
+              <a:extLst>
+                <a:ext uri="{FF2B5EF4-FFF2-40B4-BE49-F238E27FC236}">
+                  <a16:creationId xmlns:a16="http://schemas.microsoft.com/office/drawing/2014/main" id="{1B9B89D2-ACFA-490D-90F3-DBACE54F5D61}"/>
+                </a:ext>
+              </a:extLst>
+            </p:cNvPr>
+            <p:cNvSpPr txBox="1"/>
+            <p:nvPr/>
+          </p:nvSpPr>
+          <p:spPr>
+            <a:xfrm>
+              <a:off x="7226714" y="4380087"/>
+              <a:ext cx="866273" cy="307777"/>
+            </a:xfrm>
+            <a:prstGeom prst="rect">
+              <a:avLst/>
+            </a:prstGeom>
+            <a:noFill/>
+          </p:spPr>
+          <p:txBody>
+            <a:bodyPr wrap="square" rtlCol="0">
+              <a:spAutoFit/>
+            </a:bodyPr>
+            <a:lstStyle/>
+            <a:p>
+              <a:r>
+                <a:rPr lang="de-DE" sz="1400" dirty="0"/>
+                <a:t>„herr“</a:t>
+              </a:r>
+            </a:p>
+          </p:txBody>
+        </p:sp>
+        <p:sp>
+          <p:nvSpPr>
+            <p:cNvPr id="42" name="Textfeld 41">
+              <a:extLst>
+                <a:ext uri="{FF2B5EF4-FFF2-40B4-BE49-F238E27FC236}">
+                  <a16:creationId xmlns:a16="http://schemas.microsoft.com/office/drawing/2014/main" id="{38931ED6-7540-42D5-AE98-694F27C3102A}"/>
+                </a:ext>
+              </a:extLst>
+            </p:cNvPr>
+            <p:cNvSpPr txBox="1"/>
+            <p:nvPr/>
+          </p:nvSpPr>
+          <p:spPr>
+            <a:xfrm>
+              <a:off x="7246018" y="4670688"/>
+              <a:ext cx="866273" cy="307777"/>
+            </a:xfrm>
+            <a:prstGeom prst="rect">
+              <a:avLst/>
+            </a:prstGeom>
+            <a:noFill/>
+          </p:spPr>
+          <p:txBody>
+            <a:bodyPr wrap="square" rtlCol="0">
+              <a:spAutoFit/>
+            </a:bodyPr>
+            <a:lstStyle/>
+            <a:p>
+              <a:r>
+                <a:rPr lang="de-DE" sz="1400" dirty="0"/>
+                <a:t>„hos“</a:t>
+              </a:r>
+            </a:p>
+          </p:txBody>
+        </p:sp>
+        <p:sp>
+          <p:nvSpPr>
+            <p:cNvPr id="43" name="Textfeld 42">
+              <a:extLst>
+                <a:ext uri="{FF2B5EF4-FFF2-40B4-BE49-F238E27FC236}">
+                  <a16:creationId xmlns:a16="http://schemas.microsoft.com/office/drawing/2014/main" id="{E6F2128C-E2B6-408B-A2ED-B69AA537A7DD}"/>
+                </a:ext>
+              </a:extLst>
+            </p:cNvPr>
+            <p:cNvSpPr txBox="1"/>
+            <p:nvPr/>
+          </p:nvSpPr>
+          <p:spPr>
+            <a:xfrm>
+              <a:off x="7236237" y="4952380"/>
+              <a:ext cx="866273" cy="307777"/>
+            </a:xfrm>
+            <a:prstGeom prst="rect">
+              <a:avLst/>
+            </a:prstGeom>
+            <a:noFill/>
+          </p:spPr>
+          <p:txBody>
+            <a:bodyPr wrap="square" rtlCol="0">
+              <a:spAutoFit/>
+            </a:bodyPr>
+            <a:lstStyle/>
+            <a:p>
+              <a:r>
+                <a:rPr lang="de-DE" sz="1400" dirty="0"/>
+                <a:t>„levis“</a:t>
+              </a:r>
+            </a:p>
+          </p:txBody>
+        </p:sp>
+        <p:sp>
+          <p:nvSpPr>
+            <p:cNvPr id="44" name="Textfeld 43">
+              <a:extLst>
+                <a:ext uri="{FF2B5EF4-FFF2-40B4-BE49-F238E27FC236}">
+                  <a16:creationId xmlns:a16="http://schemas.microsoft.com/office/drawing/2014/main" id="{C434777C-FFE1-4A13-9068-7135E41BEE45}"/>
+                </a:ext>
+              </a:extLst>
+            </p:cNvPr>
+            <p:cNvSpPr txBox="1"/>
+            <p:nvPr/>
+          </p:nvSpPr>
+          <p:spPr>
+            <a:xfrm>
+              <a:off x="8741444" y="4123187"/>
+              <a:ext cx="866273" cy="307777"/>
+            </a:xfrm>
+            <a:prstGeom prst="rect">
+              <a:avLst/>
+            </a:prstGeom>
+            <a:noFill/>
+          </p:spPr>
+          <p:txBody>
+            <a:bodyPr wrap="square" rtlCol="0">
+              <a:spAutoFit/>
+            </a:bodyPr>
+            <a:lstStyle/>
+            <a:p>
+              <a:r>
+                <a:rPr lang="de-DE" sz="1400" dirty="0"/>
+                <a:t>„grau“</a:t>
+              </a:r>
+            </a:p>
+          </p:txBody>
+        </p:sp>
+        <p:sp>
+          <p:nvSpPr>
+            <p:cNvPr id="45" name="Textfeld 44">
+              <a:extLst>
+                <a:ext uri="{FF2B5EF4-FFF2-40B4-BE49-F238E27FC236}">
+                  <a16:creationId xmlns:a16="http://schemas.microsoft.com/office/drawing/2014/main" id="{8D96B217-1D45-457D-A63A-47BFF8382689}"/>
+                </a:ext>
+              </a:extLst>
+            </p:cNvPr>
+            <p:cNvSpPr txBox="1"/>
+            <p:nvPr/>
+          </p:nvSpPr>
+          <p:spPr>
+            <a:xfrm>
+              <a:off x="8722139" y="4384793"/>
+              <a:ext cx="866273" cy="307777"/>
+            </a:xfrm>
+            <a:prstGeom prst="rect">
+              <a:avLst/>
+            </a:prstGeom>
+            <a:noFill/>
+          </p:spPr>
+          <p:txBody>
+            <a:bodyPr wrap="square" rtlCol="0">
+              <a:spAutoFit/>
+            </a:bodyPr>
+            <a:lstStyle/>
+            <a:p>
+              <a:r>
+                <a:rPr lang="de-DE" sz="1400" dirty="0"/>
+                <a:t>„dam“</a:t>
+              </a:r>
+            </a:p>
+          </p:txBody>
+        </p:sp>
+        <p:sp>
+          <p:nvSpPr>
+            <p:cNvPr id="46" name="Textfeld 45">
+              <a:extLst>
+                <a:ext uri="{FF2B5EF4-FFF2-40B4-BE49-F238E27FC236}">
+                  <a16:creationId xmlns:a16="http://schemas.microsoft.com/office/drawing/2014/main" id="{FF3ACBE3-93A3-4482-B27A-84E67838E29B}"/>
+                </a:ext>
+              </a:extLst>
+            </p:cNvPr>
+            <p:cNvSpPr txBox="1"/>
+            <p:nvPr/>
+          </p:nvSpPr>
+          <p:spPr>
+            <a:xfrm>
+              <a:off x="8741444" y="4670688"/>
+              <a:ext cx="866273" cy="307777"/>
+            </a:xfrm>
+            <a:prstGeom prst="rect">
+              <a:avLst/>
+            </a:prstGeom>
+            <a:noFill/>
+          </p:spPr>
+          <p:txBody>
+            <a:bodyPr wrap="square" rtlCol="0">
+              <a:spAutoFit/>
+            </a:bodyPr>
+            <a:lstStyle/>
+            <a:p>
+              <a:r>
+                <a:rPr lang="de-DE" sz="1400" dirty="0"/>
+                <a:t>„blus“</a:t>
+              </a:r>
+            </a:p>
+          </p:txBody>
+        </p:sp>
+        <p:sp>
+          <p:nvSpPr>
+            <p:cNvPr id="47" name="Textfeld 46">
+              <a:extLst>
+                <a:ext uri="{FF2B5EF4-FFF2-40B4-BE49-F238E27FC236}">
+                  <a16:creationId xmlns:a16="http://schemas.microsoft.com/office/drawing/2014/main" id="{4CC17A17-9AC6-450C-BDD9-06414FC3B300}"/>
+                </a:ext>
+              </a:extLst>
+            </p:cNvPr>
+            <p:cNvSpPr txBox="1"/>
+            <p:nvPr/>
+          </p:nvSpPr>
+          <p:spPr>
+            <a:xfrm>
+              <a:off x="8722139" y="4952380"/>
+              <a:ext cx="866273" cy="307777"/>
+            </a:xfrm>
+            <a:prstGeom prst="rect">
+              <a:avLst/>
+            </a:prstGeom>
+            <a:noFill/>
+          </p:spPr>
+          <p:txBody>
+            <a:bodyPr wrap="square" rtlCol="0">
+              <a:spAutoFit/>
+            </a:bodyPr>
+            <a:lstStyle/>
+            <a:p>
+              <a:r>
+                <a:rPr lang="de-DE" sz="1400" dirty="0"/>
+                <a:t>„levis“</a:t>
+              </a:r>
+            </a:p>
+          </p:txBody>
+        </p:sp>
+        <p:sp>
+          <p:nvSpPr>
+            <p:cNvPr id="48" name="Textfeld 47">
+              <a:extLst>
+                <a:ext uri="{FF2B5EF4-FFF2-40B4-BE49-F238E27FC236}">
+                  <a16:creationId xmlns:a16="http://schemas.microsoft.com/office/drawing/2014/main" id="{E4DC86BC-2617-4DC6-93B6-621740128402}"/>
+                </a:ext>
+              </a:extLst>
+            </p:cNvPr>
+            <p:cNvSpPr txBox="1"/>
+            <p:nvPr/>
+          </p:nvSpPr>
+          <p:spPr>
+            <a:xfrm>
+              <a:off x="6988085" y="1643456"/>
+              <a:ext cx="866273" cy="261610"/>
+            </a:xfrm>
+            <a:prstGeom prst="rect">
+              <a:avLst/>
+            </a:prstGeom>
+            <a:noFill/>
+          </p:spPr>
+          <p:txBody>
+            <a:bodyPr wrap="square" rtlCol="0">
+              <a:spAutoFit/>
+            </a:bodyPr>
+            <a:lstStyle/>
+            <a:p>
+              <a:r>
+                <a:rPr lang="de-DE" sz="1100" dirty="0"/>
+                <a:t>„blau“</a:t>
+              </a:r>
+            </a:p>
+          </p:txBody>
+        </p:sp>
+        <p:sp>
+          <p:nvSpPr>
+            <p:cNvPr id="49" name="Textfeld 48">
+              <a:extLst>
+                <a:ext uri="{FF2B5EF4-FFF2-40B4-BE49-F238E27FC236}">
+                  <a16:creationId xmlns:a16="http://schemas.microsoft.com/office/drawing/2014/main" id="{E0B14B28-0D35-4E74-8D7F-A1E104CC5D15}"/>
+                </a:ext>
+              </a:extLst>
+            </p:cNvPr>
+            <p:cNvSpPr txBox="1"/>
+            <p:nvPr/>
+          </p:nvSpPr>
+          <p:spPr>
+            <a:xfrm>
+              <a:off x="6968781" y="1867122"/>
+              <a:ext cx="866273" cy="261610"/>
+            </a:xfrm>
+            <a:prstGeom prst="rect">
+              <a:avLst/>
+            </a:prstGeom>
+            <a:noFill/>
+          </p:spPr>
+          <p:txBody>
+            <a:bodyPr wrap="square" rtlCol="0">
+              <a:spAutoFit/>
+            </a:bodyPr>
+            <a:lstStyle/>
+            <a:p>
+              <a:r>
+                <a:rPr lang="de-DE" sz="1100" dirty="0"/>
+                <a:t>„Herren“</a:t>
+              </a:r>
+            </a:p>
+          </p:txBody>
+        </p:sp>
+        <p:sp>
+          <p:nvSpPr>
+            <p:cNvPr id="50" name="Textfeld 49">
+              <a:extLst>
+                <a:ext uri="{FF2B5EF4-FFF2-40B4-BE49-F238E27FC236}">
+                  <a16:creationId xmlns:a16="http://schemas.microsoft.com/office/drawing/2014/main" id="{1A3AF519-192B-4F74-B86D-811B3E415161}"/>
+                </a:ext>
+              </a:extLst>
+            </p:cNvPr>
+            <p:cNvSpPr txBox="1"/>
+            <p:nvPr/>
+          </p:nvSpPr>
+          <p:spPr>
+            <a:xfrm>
+              <a:off x="6988085" y="2129148"/>
+              <a:ext cx="866273" cy="261610"/>
+            </a:xfrm>
+            <a:prstGeom prst="rect">
+              <a:avLst/>
+            </a:prstGeom>
+            <a:noFill/>
+          </p:spPr>
+          <p:txBody>
+            <a:bodyPr wrap="square" rtlCol="0">
+              <a:spAutoFit/>
+            </a:bodyPr>
+            <a:lstStyle/>
+            <a:p>
+              <a:r>
+                <a:rPr lang="de-DE" sz="1100" dirty="0"/>
+                <a:t>„Hosen“</a:t>
+              </a:r>
+            </a:p>
+          </p:txBody>
+        </p:sp>
+        <p:sp>
+          <p:nvSpPr>
+            <p:cNvPr id="51" name="Textfeld 50">
+              <a:extLst>
+                <a:ext uri="{FF2B5EF4-FFF2-40B4-BE49-F238E27FC236}">
+                  <a16:creationId xmlns:a16="http://schemas.microsoft.com/office/drawing/2014/main" id="{7F746909-B7BC-42BF-82D0-8261941E2E80}"/>
+                </a:ext>
+              </a:extLst>
+            </p:cNvPr>
+            <p:cNvSpPr txBox="1"/>
+            <p:nvPr/>
+          </p:nvSpPr>
+          <p:spPr>
+            <a:xfrm>
+              <a:off x="6964150" y="2378425"/>
+              <a:ext cx="866273" cy="261610"/>
+            </a:xfrm>
+            <a:prstGeom prst="rect">
+              <a:avLst/>
+            </a:prstGeom>
+            <a:noFill/>
+          </p:spPr>
+          <p:txBody>
+            <a:bodyPr wrap="square" rtlCol="0">
+              <a:spAutoFit/>
+            </a:bodyPr>
+            <a:lstStyle/>
+            <a:p>
+              <a:r>
+                <a:rPr lang="de-DE" sz="1100" dirty="0"/>
+                <a:t>„Levi‘s“</a:t>
+              </a:r>
+            </a:p>
+          </p:txBody>
+        </p:sp>
+        <p:sp>
+          <p:nvSpPr>
+            <p:cNvPr id="52" name="Textfeld 51">
+              <a:extLst>
+                <a:ext uri="{FF2B5EF4-FFF2-40B4-BE49-F238E27FC236}">
+                  <a16:creationId xmlns:a16="http://schemas.microsoft.com/office/drawing/2014/main" id="{69A9B7FF-CCC2-4718-8B77-976C9F25295E}"/>
+                </a:ext>
+              </a:extLst>
+            </p:cNvPr>
+            <p:cNvSpPr txBox="1"/>
+            <p:nvPr/>
+          </p:nvSpPr>
+          <p:spPr>
+            <a:xfrm>
+              <a:off x="9246140" y="1636608"/>
+              <a:ext cx="866273" cy="261610"/>
+            </a:xfrm>
+            <a:prstGeom prst="rect">
+              <a:avLst/>
+            </a:prstGeom>
+            <a:noFill/>
+          </p:spPr>
+          <p:txBody>
+            <a:bodyPr wrap="square" rtlCol="0">
+              <a:spAutoFit/>
+            </a:bodyPr>
+            <a:lstStyle/>
+            <a:p>
+              <a:r>
+                <a:rPr lang="de-DE" sz="1100" dirty="0"/>
+                <a:t>„grau“</a:t>
+              </a:r>
+            </a:p>
+          </p:txBody>
+        </p:sp>
+        <p:sp>
+          <p:nvSpPr>
+            <p:cNvPr id="53" name="Textfeld 52">
+              <a:extLst>
+                <a:ext uri="{FF2B5EF4-FFF2-40B4-BE49-F238E27FC236}">
+                  <a16:creationId xmlns:a16="http://schemas.microsoft.com/office/drawing/2014/main" id="{84174574-BB3C-451A-B858-D06777713923}"/>
+                </a:ext>
+              </a:extLst>
+            </p:cNvPr>
+            <p:cNvSpPr txBox="1"/>
+            <p:nvPr/>
+          </p:nvSpPr>
+          <p:spPr>
+            <a:xfrm>
+              <a:off x="9226836" y="1860274"/>
+              <a:ext cx="866273" cy="261610"/>
+            </a:xfrm>
+            <a:prstGeom prst="rect">
+              <a:avLst/>
+            </a:prstGeom>
+            <a:noFill/>
+          </p:spPr>
+          <p:txBody>
+            <a:bodyPr wrap="square" rtlCol="0">
+              <a:spAutoFit/>
+            </a:bodyPr>
+            <a:lstStyle/>
+            <a:p>
+              <a:r>
+                <a:rPr lang="de-DE" sz="1100" dirty="0"/>
+                <a:t>„Damen“</a:t>
+              </a:r>
+            </a:p>
+          </p:txBody>
+        </p:sp>
+        <p:sp>
+          <p:nvSpPr>
+            <p:cNvPr id="54" name="Textfeld 53">
+              <a:extLst>
+                <a:ext uri="{FF2B5EF4-FFF2-40B4-BE49-F238E27FC236}">
+                  <a16:creationId xmlns:a16="http://schemas.microsoft.com/office/drawing/2014/main" id="{20973450-C77B-4ABB-A588-A5351739478A}"/>
+                </a:ext>
+              </a:extLst>
+            </p:cNvPr>
+            <p:cNvSpPr txBox="1"/>
+            <p:nvPr/>
+          </p:nvSpPr>
+          <p:spPr>
+            <a:xfrm>
+              <a:off x="9246140" y="2122300"/>
+              <a:ext cx="866273" cy="261610"/>
+            </a:xfrm>
+            <a:prstGeom prst="rect">
+              <a:avLst/>
+            </a:prstGeom>
+            <a:noFill/>
+          </p:spPr>
+          <p:txBody>
+            <a:bodyPr wrap="square" rtlCol="0">
+              <a:spAutoFit/>
+            </a:bodyPr>
+            <a:lstStyle/>
+            <a:p>
+              <a:r>
+                <a:rPr lang="de-DE" sz="1100" dirty="0"/>
+                <a:t>„Blusen“</a:t>
+              </a:r>
+            </a:p>
+          </p:txBody>
+        </p:sp>
+        <p:sp>
+          <p:nvSpPr>
+            <p:cNvPr id="55" name="Textfeld 54">
+              <a:extLst>
+                <a:ext uri="{FF2B5EF4-FFF2-40B4-BE49-F238E27FC236}">
+                  <a16:creationId xmlns:a16="http://schemas.microsoft.com/office/drawing/2014/main" id="{73942919-D1E6-4757-A1A5-FFFD28BEE734}"/>
+                </a:ext>
+              </a:extLst>
+            </p:cNvPr>
+            <p:cNvSpPr txBox="1"/>
+            <p:nvPr/>
+          </p:nvSpPr>
+          <p:spPr>
+            <a:xfrm>
+              <a:off x="9222205" y="2371577"/>
+              <a:ext cx="866273" cy="261610"/>
+            </a:xfrm>
+            <a:prstGeom prst="rect">
+              <a:avLst/>
+            </a:prstGeom>
+            <a:noFill/>
+          </p:spPr>
+          <p:txBody>
+            <a:bodyPr wrap="square" rtlCol="0">
+              <a:spAutoFit/>
+            </a:bodyPr>
+            <a:lstStyle/>
+            <a:p>
+              <a:r>
+                <a:rPr lang="de-DE" sz="1100" dirty="0"/>
+                <a:t>„Levi‘s“</a:t>
+              </a:r>
+            </a:p>
+          </p:txBody>
+        </p:sp>
+      </p:grpSp>
+    </p:spTree>
+    <p:extLst>
+      <p:ext uri="{BB962C8B-B14F-4D97-AF65-F5344CB8AC3E}">
+        <p14:creationId xmlns:p14="http://schemas.microsoft.com/office/powerpoint/2010/main" val="1841519366"/>
+      </p:ext>
+    </p:extLst>
+  </p:cSld>
+  <p:clrMapOvr>
+    <a:masterClrMapping/>
+  </p:clrMapOvr>
+</p:sld>
+</file>
+
+<file path=ppt/slides/slide4.xml><?xml version="1.0" encoding="utf-8"?>
+<p:sld xmlns:a="http://schemas.openxmlformats.org/drawingml/2006/main" xmlns:r="http://schemas.openxmlformats.org/officeDocument/2006/relationships" xmlns:p="http://schemas.openxmlformats.org/presentationml/2006/main">
+  <p:cSld>
+    <p:spTree>
+      <p:nvGrpSpPr>
+        <p:cNvPr id="1" name=""/>
+        <p:cNvGrpSpPr/>
+        <p:nvPr/>
+      </p:nvGrpSpPr>
+      <p:grpSpPr>
+        <a:xfrm>
+          <a:off x="0" y="0"/>
+          <a:ext cx="0" cy="0"/>
+          <a:chOff x="0" y="0"/>
+          <a:chExt cx="0" cy="0"/>
+        </a:xfrm>
+      </p:grpSpPr>
+      <p:grpSp>
+        <p:nvGrpSpPr>
+          <p:cNvPr id="3" name="Gruppieren 2">
+            <a:extLst>
+              <a:ext uri="{FF2B5EF4-FFF2-40B4-BE49-F238E27FC236}">
+                <a16:creationId xmlns:a16="http://schemas.microsoft.com/office/drawing/2014/main" id="{BEC39173-941E-4525-9D1F-47A5C589B12F}"/>
+              </a:ext>
+            </a:extLst>
+          </p:cNvPr>
+          <p:cNvGrpSpPr/>
+          <p:nvPr/>
+        </p:nvGrpSpPr>
+        <p:grpSpPr>
+          <a:xfrm>
+            <a:off x="1628775" y="548439"/>
+            <a:ext cx="7943850" cy="5372100"/>
+            <a:chOff x="1628775" y="548439"/>
+            <a:chExt cx="7943850" cy="5372100"/>
+          </a:xfrm>
+        </p:grpSpPr>
+        <p:grpSp>
+          <p:nvGrpSpPr>
+            <p:cNvPr id="56" name="Gruppieren 55">
+              <a:extLst>
+                <a:ext uri="{FF2B5EF4-FFF2-40B4-BE49-F238E27FC236}">
+                  <a16:creationId xmlns:a16="http://schemas.microsoft.com/office/drawing/2014/main" id="{60E259BE-A6C2-47CD-B215-858C70024F0F}"/>
+                </a:ext>
+              </a:extLst>
+            </p:cNvPr>
+            <p:cNvGrpSpPr/>
+            <p:nvPr/>
+          </p:nvGrpSpPr>
+          <p:grpSpPr>
+            <a:xfrm>
+              <a:off x="1811440" y="548439"/>
+              <a:ext cx="7479813" cy="5372100"/>
+              <a:chOff x="2678215" y="510339"/>
+              <a:chExt cx="7479813" cy="5372100"/>
+            </a:xfrm>
+          </p:grpSpPr>
+          <p:sp>
+            <p:nvSpPr>
+              <p:cNvPr id="26" name="Rechteck: abgerundete Ecken 25">
+                <a:extLst>
+                  <a:ext uri="{FF2B5EF4-FFF2-40B4-BE49-F238E27FC236}">
+                    <a16:creationId xmlns:a16="http://schemas.microsoft.com/office/drawing/2014/main" id="{78FD1322-8CE2-4D68-9220-024521873A48}"/>
+                  </a:ext>
+                </a:extLst>
+              </p:cNvPr>
+              <p:cNvSpPr/>
+              <p:nvPr/>
+            </p:nvSpPr>
+            <p:spPr>
+              <a:xfrm>
+                <a:off x="4951875" y="1813259"/>
+                <a:ext cx="595811" cy="364317"/>
+              </a:xfrm>
+              <a:prstGeom prst="roundRect">
+                <a:avLst>
+                  <a:gd name="adj" fmla="val 50000"/>
+                </a:avLst>
+              </a:prstGeom>
+              <a:solidFill>
+                <a:schemeClr val="tx1"/>
+              </a:solidFill>
+              <a:ln>
+                <a:noFill/>
+              </a:ln>
+            </p:spPr>
+            <p:style>
+              <a:lnRef idx="2">
+                <a:schemeClr val="accent1">
+                  <a:shade val="50000"/>
+                </a:schemeClr>
+              </a:lnRef>
+              <a:fillRef idx="1">
+                <a:schemeClr val="accent1"/>
+              </a:fillRef>
+              <a:effectRef idx="0">
+                <a:schemeClr val="accent1"/>
+              </a:effectRef>
+              <a:fontRef idx="minor">
+                <a:schemeClr val="lt1"/>
+              </a:fontRef>
+            </p:style>
+            <p:txBody>
+              <a:bodyPr rtlCol="0" anchor="ctr"/>
+              <a:lstStyle/>
+              <a:p>
+                <a:pPr algn="ctr"/>
+                <a:endParaRPr lang="de-DE"/>
+              </a:p>
+            </p:txBody>
+          </p:sp>
+          <p:sp>
+            <p:nvSpPr>
+              <p:cNvPr id="4" name="Rechteck 3">
+                <a:extLst>
+                  <a:ext uri="{FF2B5EF4-FFF2-40B4-BE49-F238E27FC236}">
+                    <a16:creationId xmlns:a16="http://schemas.microsoft.com/office/drawing/2014/main" id="{DDC46C59-CA02-428F-A1E4-90F704724EC9}"/>
+                  </a:ext>
+                </a:extLst>
+              </p:cNvPr>
+              <p:cNvSpPr/>
+              <p:nvPr/>
+            </p:nvSpPr>
+            <p:spPr>
+              <a:xfrm>
+                <a:off x="2838449" y="762007"/>
+                <a:ext cx="2310063" cy="473242"/>
+              </a:xfrm>
+              <a:prstGeom prst="rect">
+                <a:avLst/>
+              </a:prstGeom>
+              <a:solidFill>
+                <a:schemeClr val="bg1">
+                  <a:lumMod val="85000"/>
+                </a:schemeClr>
+              </a:solidFill>
+              <a:ln>
+                <a:noFill/>
+              </a:ln>
+            </p:spPr>
+            <p:style>
+              <a:lnRef idx="2">
+                <a:schemeClr val="accent1">
+                  <a:shade val="50000"/>
+                </a:schemeClr>
+              </a:lnRef>
+              <a:fillRef idx="1">
+                <a:schemeClr val="accent1"/>
+              </a:fillRef>
+              <a:effectRef idx="0">
+                <a:schemeClr val="accent1"/>
+              </a:effectRef>
+              <a:fontRef idx="minor">
+                <a:schemeClr val="lt1"/>
+              </a:fontRef>
+            </p:style>
+            <p:txBody>
+              <a:bodyPr rtlCol="0" anchor="ctr"/>
+              <a:lstStyle/>
+              <a:p>
+                <a:pPr algn="ctr"/>
+                <a:r>
+                  <a:rPr lang="de-DE" dirty="0">
+                    <a:solidFill>
+                      <a:schemeClr val="tx1"/>
+                    </a:solidFill>
+                  </a:rPr>
+                  <a:t>Query Time</a:t>
+                </a:r>
+              </a:p>
+            </p:txBody>
+          </p:sp>
+          <p:sp>
+            <p:nvSpPr>
+              <p:cNvPr id="5" name="Rechteck 4">
+                <a:extLst>
+                  <a:ext uri="{FF2B5EF4-FFF2-40B4-BE49-F238E27FC236}">
+                    <a16:creationId xmlns:a16="http://schemas.microsoft.com/office/drawing/2014/main" id="{0A18165E-22D8-482B-9236-EDFA3F3903B3}"/>
+                  </a:ext>
+                </a:extLst>
+              </p:cNvPr>
+              <p:cNvSpPr/>
+              <p:nvPr/>
+            </p:nvSpPr>
+            <p:spPr>
+              <a:xfrm>
+                <a:off x="7291138" y="762007"/>
+                <a:ext cx="2310063" cy="473242"/>
+              </a:xfrm>
+              <a:prstGeom prst="rect">
+                <a:avLst/>
+              </a:prstGeom>
+              <a:solidFill>
+                <a:schemeClr val="bg1">
+                  <a:lumMod val="85000"/>
+                </a:schemeClr>
+              </a:solidFill>
+              <a:ln>
+                <a:noFill/>
+              </a:ln>
+            </p:spPr>
+            <p:style>
+              <a:lnRef idx="2">
+                <a:schemeClr val="accent1">
+                  <a:shade val="50000"/>
+                </a:schemeClr>
+              </a:lnRef>
+              <a:fillRef idx="1">
+                <a:schemeClr val="accent1"/>
+              </a:fillRef>
+              <a:effectRef idx="0">
+                <a:schemeClr val="accent1"/>
+              </a:effectRef>
+              <a:fontRef idx="minor">
+                <a:schemeClr val="lt1"/>
+              </a:fontRef>
+            </p:style>
+            <p:txBody>
+              <a:bodyPr rtlCol="0" anchor="ctr"/>
+              <a:lstStyle/>
+              <a:p>
+                <a:pPr algn="ctr"/>
+                <a:r>
+                  <a:rPr lang="de-DE" dirty="0">
+                    <a:solidFill>
+                      <a:schemeClr val="tx1"/>
+                    </a:solidFill>
+                  </a:rPr>
+                  <a:t>Index Time</a:t>
+                </a:r>
+              </a:p>
+            </p:txBody>
+          </p:sp>
+          <p:sp>
+            <p:nvSpPr>
+              <p:cNvPr id="6" name="Flussdiagramm: Magnetplattenspeicher 5">
+                <a:extLst>
+                  <a:ext uri="{FF2B5EF4-FFF2-40B4-BE49-F238E27FC236}">
+                    <a16:creationId xmlns:a16="http://schemas.microsoft.com/office/drawing/2014/main" id="{7EEA170B-4089-4D97-A1FD-FEEE2150A1A3}"/>
+                  </a:ext>
+                </a:extLst>
+              </p:cNvPr>
+              <p:cNvSpPr/>
+              <p:nvPr/>
+            </p:nvSpPr>
+            <p:spPr>
+              <a:xfrm>
+                <a:off x="8171448" y="1594556"/>
+                <a:ext cx="617621" cy="818147"/>
+              </a:xfrm>
+              <a:prstGeom prst="flowChartMagneticDisk">
+                <a:avLst/>
+              </a:prstGeom>
+              <a:solidFill>
+                <a:schemeClr val="bg1">
+                  <a:lumMod val="85000"/>
+                </a:schemeClr>
+              </a:solidFill>
+              <a:ln>
+                <a:solidFill>
+                  <a:schemeClr val="bg1">
+                    <a:lumMod val="50000"/>
+                  </a:schemeClr>
+                </a:solidFill>
+              </a:ln>
+            </p:spPr>
+            <p:style>
+              <a:lnRef idx="2">
+                <a:schemeClr val="accent1">
+                  <a:shade val="50000"/>
+                </a:schemeClr>
+              </a:lnRef>
+              <a:fillRef idx="1">
+                <a:schemeClr val="accent1"/>
+              </a:fillRef>
+              <a:effectRef idx="0">
+                <a:schemeClr val="accent1"/>
+              </a:effectRef>
+              <a:fontRef idx="minor">
+                <a:schemeClr val="lt1"/>
+              </a:fontRef>
+            </p:style>
+            <p:txBody>
+              <a:bodyPr rtlCol="0" anchor="ctr"/>
+              <a:lstStyle/>
+              <a:p>
+                <a:pPr algn="ctr"/>
+                <a:endParaRPr lang="de-DE"/>
+              </a:p>
+            </p:txBody>
+          </p:sp>
+          <p:sp>
+            <p:nvSpPr>
+              <p:cNvPr id="7" name="Rechteck 6">
+                <a:extLst>
+                  <a:ext uri="{FF2B5EF4-FFF2-40B4-BE49-F238E27FC236}">
+                    <a16:creationId xmlns:a16="http://schemas.microsoft.com/office/drawing/2014/main" id="{80A2E756-CB6D-4ADE-BA49-BD4CD9C18D47}"/>
+                  </a:ext>
+                </a:extLst>
+              </p:cNvPr>
+              <p:cNvSpPr/>
+              <p:nvPr/>
+            </p:nvSpPr>
+            <p:spPr>
+              <a:xfrm>
+                <a:off x="3223458" y="3017507"/>
+                <a:ext cx="1331494" cy="304801"/>
+              </a:xfrm>
+              <a:prstGeom prst="rect">
+                <a:avLst/>
+              </a:prstGeom>
+              <a:solidFill>
+                <a:schemeClr val="bg1"/>
+              </a:solidFill>
+              <a:ln>
+                <a:solidFill>
+                  <a:schemeClr val="bg1">
+                    <a:lumMod val="85000"/>
+                  </a:schemeClr>
+                </a:solidFill>
+              </a:ln>
+            </p:spPr>
+            <p:style>
+              <a:lnRef idx="2">
+                <a:schemeClr val="accent1">
+                  <a:shade val="50000"/>
+                </a:schemeClr>
+              </a:lnRef>
+              <a:fillRef idx="1">
+                <a:schemeClr val="accent1"/>
+              </a:fillRef>
+              <a:effectRef idx="0">
+                <a:schemeClr val="accent1"/>
+              </a:effectRef>
+              <a:fontRef idx="minor">
+                <a:schemeClr val="lt1"/>
+              </a:fontRef>
+            </p:style>
+            <p:txBody>
+              <a:bodyPr rtlCol="0" anchor="ctr"/>
+              <a:lstStyle/>
+              <a:p>
+                <a:pPr algn="ctr"/>
+                <a:r>
+                  <a:rPr lang="de-DE" sz="1600" dirty="0">
+                    <a:solidFill>
+                      <a:schemeClr val="tx1"/>
+                    </a:solidFill>
+                  </a:rPr>
+                  <a:t>Analyzer</a:t>
+                </a:r>
+              </a:p>
+            </p:txBody>
+          </p:sp>
+          <p:sp>
+            <p:nvSpPr>
+              <p:cNvPr id="8" name="Rechteck 7">
+                <a:extLst>
+                  <a:ext uri="{FF2B5EF4-FFF2-40B4-BE49-F238E27FC236}">
+                    <a16:creationId xmlns:a16="http://schemas.microsoft.com/office/drawing/2014/main" id="{659024FE-EDF4-4355-84AB-365ECBD1D2B4}"/>
+                  </a:ext>
+                </a:extLst>
+              </p:cNvPr>
+              <p:cNvSpPr/>
+              <p:nvPr/>
+            </p:nvSpPr>
+            <p:spPr>
+              <a:xfrm>
+                <a:off x="7795206" y="3017507"/>
+                <a:ext cx="1331494" cy="304801"/>
+              </a:xfrm>
+              <a:prstGeom prst="rect">
+                <a:avLst/>
+              </a:prstGeom>
+              <a:solidFill>
+                <a:schemeClr val="bg1"/>
+              </a:solidFill>
+              <a:ln>
+                <a:solidFill>
+                  <a:schemeClr val="bg1">
+                    <a:lumMod val="85000"/>
+                  </a:schemeClr>
+                </a:solidFill>
+              </a:ln>
+            </p:spPr>
+            <p:style>
+              <a:lnRef idx="2">
+                <a:schemeClr val="accent1">
+                  <a:shade val="50000"/>
+                </a:schemeClr>
+              </a:lnRef>
+              <a:fillRef idx="1">
+                <a:schemeClr val="accent1"/>
+              </a:fillRef>
+              <a:effectRef idx="0">
+                <a:schemeClr val="accent1"/>
+              </a:effectRef>
+              <a:fontRef idx="minor">
+                <a:schemeClr val="lt1"/>
+              </a:fontRef>
+            </p:style>
+            <p:txBody>
+              <a:bodyPr rtlCol="0" anchor="ctr"/>
+              <a:lstStyle/>
+              <a:p>
+                <a:pPr algn="ctr"/>
+                <a:r>
+                  <a:rPr lang="de-DE" sz="1600" dirty="0">
+                    <a:solidFill>
+                      <a:schemeClr val="tx1"/>
+                    </a:solidFill>
+                  </a:rPr>
+                  <a:t>Analyzer</a:t>
+                </a:r>
+              </a:p>
+            </p:txBody>
+          </p:sp>
+          <p:sp>
+            <p:nvSpPr>
+              <p:cNvPr id="10" name="Pfeil: nach unten 9">
+                <a:extLst>
+                  <a:ext uri="{FF2B5EF4-FFF2-40B4-BE49-F238E27FC236}">
+                    <a16:creationId xmlns:a16="http://schemas.microsoft.com/office/drawing/2014/main" id="{2C16EBCF-2E2B-46FC-91F3-5A93B63C72CF}"/>
+                  </a:ext>
+                </a:extLst>
+              </p:cNvPr>
+              <p:cNvSpPr/>
+              <p:nvPr/>
+            </p:nvSpPr>
+            <p:spPr>
+              <a:xfrm>
+                <a:off x="3784931" y="2666999"/>
+                <a:ext cx="208548" cy="264695"/>
+              </a:xfrm>
+              <a:prstGeom prst="downArrow">
+                <a:avLst/>
+              </a:prstGeom>
+              <a:solidFill>
+                <a:schemeClr val="bg1"/>
+              </a:solidFill>
+              <a:ln>
+                <a:solidFill>
+                  <a:schemeClr val="bg1">
+                    <a:lumMod val="75000"/>
+                  </a:schemeClr>
+                </a:solidFill>
+              </a:ln>
+            </p:spPr>
+            <p:style>
+              <a:lnRef idx="2">
+                <a:schemeClr val="accent1">
+                  <a:shade val="50000"/>
+                </a:schemeClr>
+              </a:lnRef>
+              <a:fillRef idx="1">
+                <a:schemeClr val="accent1"/>
+              </a:fillRef>
+              <a:effectRef idx="0">
+                <a:schemeClr val="accent1"/>
+              </a:effectRef>
+              <a:fontRef idx="minor">
+                <a:schemeClr val="lt1"/>
+              </a:fontRef>
+            </p:style>
+            <p:txBody>
+              <a:bodyPr rtlCol="0" anchor="ctr"/>
+              <a:lstStyle/>
+              <a:p>
+                <a:pPr algn="ctr"/>
+                <a:endParaRPr lang="de-DE"/>
+              </a:p>
+            </p:txBody>
+          </p:sp>
+          <p:sp>
+            <p:nvSpPr>
+              <p:cNvPr id="11" name="Pfeil: nach unten 10">
+                <a:extLst>
+                  <a:ext uri="{FF2B5EF4-FFF2-40B4-BE49-F238E27FC236}">
+                    <a16:creationId xmlns:a16="http://schemas.microsoft.com/office/drawing/2014/main" id="{FF8A1C6A-3032-4369-89F3-19E1F5A8DE46}"/>
+                  </a:ext>
+                </a:extLst>
+              </p:cNvPr>
+              <p:cNvSpPr/>
+              <p:nvPr/>
+            </p:nvSpPr>
+            <p:spPr>
+              <a:xfrm>
+                <a:off x="3784931" y="3479926"/>
+                <a:ext cx="208548" cy="264695"/>
+              </a:xfrm>
+              <a:prstGeom prst="downArrow">
+                <a:avLst/>
+              </a:prstGeom>
+              <a:solidFill>
+                <a:schemeClr val="bg1"/>
+              </a:solidFill>
+              <a:ln>
+                <a:solidFill>
+                  <a:schemeClr val="bg1">
+                    <a:lumMod val="75000"/>
+                  </a:schemeClr>
+                </a:solidFill>
+              </a:ln>
+            </p:spPr>
+            <p:style>
+              <a:lnRef idx="2">
+                <a:schemeClr val="accent1">
+                  <a:shade val="50000"/>
+                </a:schemeClr>
+              </a:lnRef>
+              <a:fillRef idx="1">
+                <a:schemeClr val="accent1"/>
+              </a:fillRef>
+              <a:effectRef idx="0">
+                <a:schemeClr val="accent1"/>
+              </a:effectRef>
+              <a:fontRef idx="minor">
+                <a:schemeClr val="lt1"/>
+              </a:fontRef>
+            </p:style>
+            <p:txBody>
+              <a:bodyPr rtlCol="0" anchor="ctr"/>
+              <a:lstStyle/>
+              <a:p>
+                <a:pPr algn="ctr"/>
+                <a:endParaRPr lang="de-DE"/>
+              </a:p>
+            </p:txBody>
+          </p:sp>
+          <p:sp>
+            <p:nvSpPr>
+              <p:cNvPr id="12" name="Pfeil: nach unten 11">
+                <a:extLst>
+                  <a:ext uri="{FF2B5EF4-FFF2-40B4-BE49-F238E27FC236}">
+                    <a16:creationId xmlns:a16="http://schemas.microsoft.com/office/drawing/2014/main" id="{69232CC7-CBDE-42CB-96FD-4C1249EE33E6}"/>
+                  </a:ext>
+                </a:extLst>
+              </p:cNvPr>
+              <p:cNvSpPr/>
+              <p:nvPr/>
+            </p:nvSpPr>
+            <p:spPr>
+              <a:xfrm>
+                <a:off x="8341895" y="2672513"/>
+                <a:ext cx="208548" cy="264695"/>
+              </a:xfrm>
+              <a:prstGeom prst="downArrow">
+                <a:avLst/>
+              </a:prstGeom>
+              <a:solidFill>
+                <a:schemeClr val="bg1"/>
+              </a:solidFill>
+              <a:ln>
+                <a:solidFill>
+                  <a:schemeClr val="bg1">
+                    <a:lumMod val="75000"/>
+                  </a:schemeClr>
+                </a:solidFill>
+              </a:ln>
+            </p:spPr>
+            <p:style>
+              <a:lnRef idx="2">
+                <a:schemeClr val="accent1">
+                  <a:shade val="50000"/>
+                </a:schemeClr>
+              </a:lnRef>
+              <a:fillRef idx="1">
+                <a:schemeClr val="accent1"/>
+              </a:fillRef>
+              <a:effectRef idx="0">
+                <a:schemeClr val="accent1"/>
+              </a:effectRef>
+              <a:fontRef idx="minor">
+                <a:schemeClr val="lt1"/>
+              </a:fontRef>
+            </p:style>
+            <p:txBody>
+              <a:bodyPr rtlCol="0" anchor="ctr"/>
+              <a:lstStyle/>
+              <a:p>
+                <a:pPr algn="ctr"/>
+                <a:endParaRPr lang="de-DE"/>
+              </a:p>
+            </p:txBody>
+          </p:sp>
+          <p:sp>
+            <p:nvSpPr>
+              <p:cNvPr id="13" name="Pfeil: nach unten 12">
+                <a:extLst>
+                  <a:ext uri="{FF2B5EF4-FFF2-40B4-BE49-F238E27FC236}">
+                    <a16:creationId xmlns:a16="http://schemas.microsoft.com/office/drawing/2014/main" id="{F8694B22-58F9-4685-88E6-545F3C1C0875}"/>
+                  </a:ext>
+                </a:extLst>
+              </p:cNvPr>
+              <p:cNvSpPr/>
+              <p:nvPr/>
+            </p:nvSpPr>
+            <p:spPr>
+              <a:xfrm>
+                <a:off x="8356679" y="3476419"/>
+                <a:ext cx="208548" cy="264695"/>
+              </a:xfrm>
+              <a:prstGeom prst="downArrow">
+                <a:avLst/>
+              </a:prstGeom>
+              <a:solidFill>
+                <a:schemeClr val="bg1"/>
+              </a:solidFill>
+              <a:ln>
+                <a:solidFill>
+                  <a:schemeClr val="bg1">
+                    <a:lumMod val="75000"/>
+                  </a:schemeClr>
+                </a:solidFill>
+              </a:ln>
+            </p:spPr>
+            <p:style>
+              <a:lnRef idx="2">
+                <a:schemeClr val="accent1">
+                  <a:shade val="50000"/>
+                </a:schemeClr>
+              </a:lnRef>
+              <a:fillRef idx="1">
+                <a:schemeClr val="accent1"/>
+              </a:fillRef>
+              <a:effectRef idx="0">
+                <a:schemeClr val="accent1"/>
+              </a:effectRef>
+              <a:fontRef idx="minor">
+                <a:schemeClr val="lt1"/>
+              </a:fontRef>
+            </p:style>
+            <p:txBody>
+              <a:bodyPr rtlCol="0" anchor="ctr"/>
+              <a:lstStyle/>
+              <a:p>
+                <a:pPr algn="ctr"/>
+                <a:endParaRPr lang="de-DE"/>
+              </a:p>
+            </p:txBody>
+          </p:sp>
+          <p:sp>
+            <p:nvSpPr>
+              <p:cNvPr id="14" name="Textfeld 13">
+                <a:extLst>
+                  <a:ext uri="{FF2B5EF4-FFF2-40B4-BE49-F238E27FC236}">
+                    <a16:creationId xmlns:a16="http://schemas.microsoft.com/office/drawing/2014/main" id="{DF14B5B0-FAE2-4D58-B44F-BBA3294EE675}"/>
+                  </a:ext>
+                </a:extLst>
+              </p:cNvPr>
+              <p:cNvSpPr txBox="1"/>
+              <p:nvPr/>
+            </p:nvSpPr>
+            <p:spPr>
+              <a:xfrm>
+                <a:off x="3569997" y="4118321"/>
+                <a:ext cx="866273" cy="307777"/>
+              </a:xfrm>
+              <a:prstGeom prst="rect">
+                <a:avLst/>
+              </a:prstGeom>
+              <a:noFill/>
+            </p:spPr>
+            <p:txBody>
+              <a:bodyPr wrap="square" rtlCol="0">
+                <a:spAutoFit/>
+              </a:bodyPr>
+              <a:lstStyle/>
+              <a:p>
+                <a:r>
+                  <a:rPr lang="de-DE" sz="1400" dirty="0"/>
+                  <a:t>„blau“</a:t>
+                </a:r>
+              </a:p>
+            </p:txBody>
+          </p:sp>
+          <p:sp>
+            <p:nvSpPr>
+              <p:cNvPr id="15" name="Textfeld 14">
+                <a:extLst>
+                  <a:ext uri="{FF2B5EF4-FFF2-40B4-BE49-F238E27FC236}">
+                    <a16:creationId xmlns:a16="http://schemas.microsoft.com/office/drawing/2014/main" id="{9AFEFA15-3F26-42F7-867F-B5C97A0CB947}"/>
+                  </a:ext>
+                </a:extLst>
+              </p:cNvPr>
+              <p:cNvSpPr txBox="1"/>
+              <p:nvPr/>
+            </p:nvSpPr>
+            <p:spPr>
+              <a:xfrm>
+                <a:off x="3566735" y="4388147"/>
+                <a:ext cx="866273" cy="307777"/>
+              </a:xfrm>
+              <a:prstGeom prst="rect">
+                <a:avLst/>
+              </a:prstGeom>
+              <a:noFill/>
+            </p:spPr>
+            <p:txBody>
+              <a:bodyPr wrap="square" rtlCol="0">
+                <a:spAutoFit/>
+              </a:bodyPr>
+              <a:lstStyle/>
+              <a:p>
+                <a:r>
+                  <a:rPr lang="de-DE" sz="1400" dirty="0"/>
+                  <a:t>„herr“</a:t>
+                </a:r>
+              </a:p>
+            </p:txBody>
+          </p:sp>
+          <p:sp>
+            <p:nvSpPr>
+              <p:cNvPr id="16" name="Textfeld 15">
+                <a:extLst>
+                  <a:ext uri="{FF2B5EF4-FFF2-40B4-BE49-F238E27FC236}">
+                    <a16:creationId xmlns:a16="http://schemas.microsoft.com/office/drawing/2014/main" id="{7C3B4127-4232-4BCF-B747-574D97FCA728}"/>
+                  </a:ext>
+                </a:extLst>
+              </p:cNvPr>
+              <p:cNvSpPr txBox="1"/>
+              <p:nvPr/>
+            </p:nvSpPr>
+            <p:spPr>
+              <a:xfrm>
+                <a:off x="3576640" y="4670687"/>
+                <a:ext cx="866273" cy="307777"/>
+              </a:xfrm>
+              <a:prstGeom prst="rect">
+                <a:avLst/>
+              </a:prstGeom>
+              <a:noFill/>
+            </p:spPr>
+            <p:txBody>
+              <a:bodyPr wrap="square" rtlCol="0">
+                <a:spAutoFit/>
+              </a:bodyPr>
+              <a:lstStyle/>
+              <a:p>
+                <a:r>
+                  <a:rPr lang="de-DE" sz="1400" dirty="0"/>
+                  <a:t>„hos“</a:t>
+                </a:r>
+              </a:p>
+            </p:txBody>
+          </p:sp>
+          <p:sp>
+            <p:nvSpPr>
+              <p:cNvPr id="17" name="Textfeld 16">
+                <a:extLst>
+                  <a:ext uri="{FF2B5EF4-FFF2-40B4-BE49-F238E27FC236}">
+                    <a16:creationId xmlns:a16="http://schemas.microsoft.com/office/drawing/2014/main" id="{CE108506-6EF0-450A-9669-FF1CC0DB5BDB}"/>
+                  </a:ext>
+                </a:extLst>
+              </p:cNvPr>
+              <p:cNvSpPr txBox="1"/>
+              <p:nvPr/>
+            </p:nvSpPr>
+            <p:spPr>
+              <a:xfrm>
+                <a:off x="3560342" y="4954791"/>
+                <a:ext cx="866273" cy="307777"/>
+              </a:xfrm>
+              <a:prstGeom prst="rect">
+                <a:avLst/>
+              </a:prstGeom>
+              <a:noFill/>
+            </p:spPr>
+            <p:txBody>
+              <a:bodyPr wrap="square" rtlCol="0">
+                <a:spAutoFit/>
+              </a:bodyPr>
+              <a:lstStyle/>
+              <a:p>
+                <a:r>
+                  <a:rPr lang="de-DE" sz="1400" dirty="0"/>
+                  <a:t>„levis“</a:t>
+                </a:r>
+              </a:p>
+            </p:txBody>
+          </p:sp>
+          <p:cxnSp>
+            <p:nvCxnSpPr>
+              <p:cNvPr id="19" name="Gerade Verbindung mit Pfeil 18">
+                <a:extLst>
+                  <a:ext uri="{FF2B5EF4-FFF2-40B4-BE49-F238E27FC236}">
+                    <a16:creationId xmlns:a16="http://schemas.microsoft.com/office/drawing/2014/main" id="{3A48BAB5-0CA9-41E1-8267-7CF204E5963E}"/>
+                  </a:ext>
+                </a:extLst>
+              </p:cNvPr>
+              <p:cNvCxnSpPr/>
+              <p:nvPr/>
+            </p:nvCxnSpPr>
+            <p:spPr>
+              <a:xfrm>
+                <a:off x="5148512" y="4272209"/>
+                <a:ext cx="1812757" cy="0"/>
+              </a:xfrm>
+              <a:prstGeom prst="straightConnector1">
+                <a:avLst/>
+              </a:prstGeom>
+              <a:ln w="19050">
+                <a:solidFill>
+                  <a:schemeClr val="tx1"/>
+                </a:solidFill>
+                <a:headEnd type="arrow" w="med" len="med"/>
+                <a:tailEnd type="arrow" w="med" len="med"/>
+              </a:ln>
+            </p:spPr>
+            <p:style>
+              <a:lnRef idx="1">
+                <a:schemeClr val="accent1"/>
+              </a:lnRef>
+              <a:fillRef idx="0">
+                <a:schemeClr val="accent1"/>
+              </a:fillRef>
+              <a:effectRef idx="0">
+                <a:schemeClr val="accent1"/>
+              </a:effectRef>
+              <a:fontRef idx="minor">
+                <a:schemeClr val="tx1"/>
+              </a:fontRef>
+            </p:style>
+          </p:cxnSp>
+          <p:cxnSp>
+            <p:nvCxnSpPr>
+              <p:cNvPr id="20" name="Gerade Verbindung mit Pfeil 19">
+                <a:extLst>
+                  <a:ext uri="{FF2B5EF4-FFF2-40B4-BE49-F238E27FC236}">
+                    <a16:creationId xmlns:a16="http://schemas.microsoft.com/office/drawing/2014/main" id="{90D5E827-96FA-44B0-9089-FA7F661CED06}"/>
+                  </a:ext>
+                </a:extLst>
+              </p:cNvPr>
+              <p:cNvCxnSpPr/>
+              <p:nvPr/>
+            </p:nvCxnSpPr>
+            <p:spPr>
+              <a:xfrm>
+                <a:off x="5151393" y="4537968"/>
+                <a:ext cx="1812757" cy="0"/>
+              </a:xfrm>
+              <a:prstGeom prst="straightConnector1">
+                <a:avLst/>
+              </a:prstGeom>
+              <a:ln w="19050">
+                <a:solidFill>
+                  <a:schemeClr val="tx1"/>
+                </a:solidFill>
+                <a:headEnd type="arrow" w="med" len="med"/>
+                <a:tailEnd type="arrow" w="med" len="med"/>
+              </a:ln>
+            </p:spPr>
+            <p:style>
+              <a:lnRef idx="1">
+                <a:schemeClr val="accent1"/>
+              </a:lnRef>
+              <a:fillRef idx="0">
+                <a:schemeClr val="accent1"/>
+              </a:fillRef>
+              <a:effectRef idx="0">
+                <a:schemeClr val="accent1"/>
+              </a:effectRef>
+              <a:fontRef idx="minor">
+                <a:schemeClr val="tx1"/>
+              </a:fontRef>
+            </p:style>
+          </p:cxnSp>
+          <p:cxnSp>
+            <p:nvCxnSpPr>
+              <p:cNvPr id="21" name="Gerade Verbindung mit Pfeil 20">
+                <a:extLst>
+                  <a:ext uri="{FF2B5EF4-FFF2-40B4-BE49-F238E27FC236}">
+                    <a16:creationId xmlns:a16="http://schemas.microsoft.com/office/drawing/2014/main" id="{6B82DA9D-CBCC-49AC-8CA5-6BA217F4B5F1}"/>
+                  </a:ext>
+                </a:extLst>
+              </p:cNvPr>
+              <p:cNvCxnSpPr/>
+              <p:nvPr/>
+            </p:nvCxnSpPr>
+            <p:spPr>
+              <a:xfrm>
+                <a:off x="5148511" y="4817517"/>
+                <a:ext cx="1812757" cy="0"/>
+              </a:xfrm>
+              <a:prstGeom prst="straightConnector1">
+                <a:avLst/>
+              </a:prstGeom>
+              <a:ln w="19050">
+                <a:solidFill>
+                  <a:schemeClr val="tx1"/>
+                </a:solidFill>
+                <a:headEnd type="arrow" w="med" len="med"/>
+                <a:tailEnd type="arrow" w="med" len="med"/>
+              </a:ln>
+            </p:spPr>
+            <p:style>
+              <a:lnRef idx="1">
+                <a:schemeClr val="accent1"/>
+              </a:lnRef>
+              <a:fillRef idx="0">
+                <a:schemeClr val="accent1"/>
+              </a:fillRef>
+              <a:effectRef idx="0">
+                <a:schemeClr val="accent1"/>
+              </a:effectRef>
+              <a:fontRef idx="minor">
+                <a:schemeClr val="tx1"/>
+              </a:fontRef>
+            </p:style>
+          </p:cxnSp>
+          <p:cxnSp>
+            <p:nvCxnSpPr>
+              <p:cNvPr id="22" name="Gerade Verbindung mit Pfeil 21">
+                <a:extLst>
+                  <a:ext uri="{FF2B5EF4-FFF2-40B4-BE49-F238E27FC236}">
+                    <a16:creationId xmlns:a16="http://schemas.microsoft.com/office/drawing/2014/main" id="{C7D3D354-5F5F-4746-B493-D24373ED2AD8}"/>
+                  </a:ext>
+                </a:extLst>
+              </p:cNvPr>
+              <p:cNvCxnSpPr/>
+              <p:nvPr/>
+            </p:nvCxnSpPr>
+            <p:spPr>
+              <a:xfrm>
+                <a:off x="5148511" y="5090342"/>
+                <a:ext cx="1812757" cy="0"/>
+              </a:xfrm>
+              <a:prstGeom prst="straightConnector1">
+                <a:avLst/>
+              </a:prstGeom>
+              <a:ln w="19050">
+                <a:solidFill>
+                  <a:schemeClr val="tx1"/>
+                </a:solidFill>
+                <a:headEnd type="arrow" w="med" len="med"/>
+                <a:tailEnd type="arrow" w="med" len="med"/>
+              </a:ln>
+            </p:spPr>
+            <p:style>
+              <a:lnRef idx="1">
+                <a:schemeClr val="accent1"/>
+              </a:lnRef>
+              <a:fillRef idx="0">
+                <a:schemeClr val="accent1"/>
+              </a:fillRef>
+              <a:effectRef idx="0">
+                <a:schemeClr val="accent1"/>
+              </a:effectRef>
+              <a:fontRef idx="minor">
+                <a:schemeClr val="tx1"/>
+              </a:fontRef>
+            </p:style>
+          </p:cxnSp>
+          <p:sp>
+            <p:nvSpPr>
+              <p:cNvPr id="25" name="Rechteck: abgerundete Ecken 24">
+                <a:extLst>
+                  <a:ext uri="{FF2B5EF4-FFF2-40B4-BE49-F238E27FC236}">
+                    <a16:creationId xmlns:a16="http://schemas.microsoft.com/office/drawing/2014/main" id="{4045F874-1C67-4459-8A0F-1231F8BA428C}"/>
+                  </a:ext>
+                </a:extLst>
+              </p:cNvPr>
+              <p:cNvSpPr/>
+              <p:nvPr/>
+            </p:nvSpPr>
+            <p:spPr>
+              <a:xfrm>
+                <a:off x="2678215" y="1809722"/>
+                <a:ext cx="2865335" cy="369332"/>
+              </a:xfrm>
+              <a:prstGeom prst="roundRect">
+                <a:avLst>
+                  <a:gd name="adj" fmla="val 50000"/>
+                </a:avLst>
+              </a:prstGeom>
+              <a:noFill/>
+              <a:ln>
+                <a:solidFill>
+                  <a:schemeClr val="bg1">
+                    <a:lumMod val="75000"/>
+                  </a:schemeClr>
+                </a:solidFill>
+              </a:ln>
+            </p:spPr>
+            <p:style>
+              <a:lnRef idx="2">
+                <a:schemeClr val="accent1">
+                  <a:shade val="50000"/>
+                </a:schemeClr>
+              </a:lnRef>
+              <a:fillRef idx="1">
+                <a:schemeClr val="accent1"/>
+              </a:fillRef>
+              <a:effectRef idx="0">
+                <a:schemeClr val="accent1"/>
+              </a:effectRef>
+              <a:fontRef idx="minor">
+                <a:schemeClr val="lt1"/>
+              </a:fontRef>
+            </p:style>
+            <p:txBody>
+              <a:bodyPr rtlCol="0" anchor="ctr"/>
+              <a:lstStyle/>
+              <a:p>
+                <a:pPr algn="ctr"/>
+                <a:endParaRPr lang="de-DE"/>
+              </a:p>
+            </p:txBody>
+          </p:sp>
+          <p:pic>
+            <p:nvPicPr>
+              <p:cNvPr id="28" name="Grafik 27" descr="Lupe mit einfarbiger Füllung">
+                <a:extLst>
+                  <a:ext uri="{FF2B5EF4-FFF2-40B4-BE49-F238E27FC236}">
+                    <a16:creationId xmlns:a16="http://schemas.microsoft.com/office/drawing/2014/main" id="{A0E8925A-9136-4514-90C5-541A9E979082}"/>
+                  </a:ext>
+                </a:extLst>
+              </p:cNvPr>
+              <p:cNvPicPr>
+                <a:picLocks noChangeAspect="1"/>
+              </p:cNvPicPr>
+              <p:nvPr/>
+            </p:nvPicPr>
+            <p:blipFill>
+              <a:blip r:embed="rId2">
+                <a:extLst>
+                  <a:ext uri="{28A0092B-C50C-407E-A947-70E740481C1C}">
+                    <a14:useLocalDpi xmlns:a14="http://schemas.microsoft.com/office/drawing/2010/main" val="0"/>
+                  </a:ext>
+                  <a:ext uri="{96DAC541-7B7A-43D3-8B79-37D633B846F1}">
+                    <asvg:svgBlip xmlns:asvg="http://schemas.microsoft.com/office/drawing/2016/SVG/main" r:embed="rId3"/>
+                  </a:ext>
+                </a:extLst>
+              </a:blip>
+              <a:stretch>
+                <a:fillRect/>
+              </a:stretch>
+            </p:blipFill>
+            <p:spPr>
+              <a:xfrm>
+                <a:off x="5092490" y="1837977"/>
+                <a:ext cx="312821" cy="312821"/>
+              </a:xfrm>
+              <a:prstGeom prst="rect">
+                <a:avLst/>
+              </a:prstGeom>
+            </p:spPr>
+          </p:pic>
+          <p:sp>
+            <p:nvSpPr>
+              <p:cNvPr id="29" name="Textfeld 28">
+                <a:extLst>
+                  <a:ext uri="{FF2B5EF4-FFF2-40B4-BE49-F238E27FC236}">
+                    <a16:creationId xmlns:a16="http://schemas.microsoft.com/office/drawing/2014/main" id="{378EABF9-68D8-4C2A-BD85-54896A362DA5}"/>
+                  </a:ext>
+                </a:extLst>
+              </p:cNvPr>
+              <p:cNvSpPr txBox="1"/>
+              <p:nvPr/>
+            </p:nvSpPr>
+            <p:spPr>
+              <a:xfrm>
+                <a:off x="2750028" y="1860274"/>
+                <a:ext cx="2477822" cy="307777"/>
+              </a:xfrm>
+              <a:prstGeom prst="rect">
+                <a:avLst/>
+              </a:prstGeom>
+              <a:noFill/>
+            </p:spPr>
+            <p:txBody>
+              <a:bodyPr wrap="square" rtlCol="0" anchor="ctr">
+                <a:spAutoFit/>
+              </a:bodyPr>
+              <a:lstStyle/>
+              <a:p>
+                <a:r>
+                  <a:rPr lang="de-DE" sz="1400" dirty="0"/>
+                  <a:t>blaue herrenhose levi‘s®</a:t>
+                </a:r>
+              </a:p>
+            </p:txBody>
+          </p:sp>
+          <p:sp>
+            <p:nvSpPr>
+              <p:cNvPr id="30" name="Flussdiagramm: Mehrere Dokumente 29">
+                <a:extLst>
+                  <a:ext uri="{FF2B5EF4-FFF2-40B4-BE49-F238E27FC236}">
+                    <a16:creationId xmlns:a16="http://schemas.microsoft.com/office/drawing/2014/main" id="{D9480E90-D50F-4B0F-A5FD-7C3B955C119D}"/>
+                  </a:ext>
+                </a:extLst>
+              </p:cNvPr>
+              <p:cNvSpPr/>
+              <p:nvPr/>
+            </p:nvSpPr>
+            <p:spPr>
+              <a:xfrm>
+                <a:off x="9086854" y="1387275"/>
+                <a:ext cx="1071174" cy="1412071"/>
+              </a:xfrm>
+              <a:prstGeom prst="flowChartMultidocument">
+                <a:avLst/>
+              </a:prstGeom>
+              <a:solidFill>
+                <a:schemeClr val="bg1"/>
+              </a:solidFill>
+              <a:ln w="19050">
+                <a:solidFill>
+                  <a:schemeClr val="bg1">
+                    <a:lumMod val="50000"/>
+                  </a:schemeClr>
+                </a:solidFill>
+              </a:ln>
+            </p:spPr>
+            <p:style>
+              <a:lnRef idx="2">
+                <a:schemeClr val="accent1">
+                  <a:shade val="50000"/>
+                </a:schemeClr>
+              </a:lnRef>
+              <a:fillRef idx="1">
+                <a:schemeClr val="accent1"/>
+              </a:fillRef>
+              <a:effectRef idx="0">
+                <a:schemeClr val="accent1"/>
+              </a:effectRef>
+              <a:fontRef idx="minor">
+                <a:schemeClr val="lt1"/>
+              </a:fontRef>
+            </p:style>
+            <p:txBody>
+              <a:bodyPr rtlCol="0" anchor="ctr"/>
+              <a:lstStyle/>
+              <a:p>
+                <a:pPr algn="ctr"/>
+                <a:endParaRPr lang="de-DE"/>
+              </a:p>
+            </p:txBody>
+          </p:sp>
+          <p:sp>
+            <p:nvSpPr>
+              <p:cNvPr id="31" name="Flussdiagramm: Mehrere Dokumente 30">
+                <a:extLst>
+                  <a:ext uri="{FF2B5EF4-FFF2-40B4-BE49-F238E27FC236}">
+                    <a16:creationId xmlns:a16="http://schemas.microsoft.com/office/drawing/2014/main" id="{695427EE-595F-4BED-8473-4BD94CBCE0F7}"/>
+                  </a:ext>
+                </a:extLst>
+              </p:cNvPr>
+              <p:cNvSpPr/>
+              <p:nvPr/>
+            </p:nvSpPr>
+            <p:spPr>
+              <a:xfrm>
+                <a:off x="6843781" y="1387274"/>
+                <a:ext cx="1071174" cy="1412071"/>
+              </a:xfrm>
+              <a:prstGeom prst="flowChartMultidocument">
+                <a:avLst/>
+              </a:prstGeom>
+              <a:solidFill>
+                <a:schemeClr val="bg1">
+                  <a:lumMod val="85000"/>
+                </a:schemeClr>
+              </a:solidFill>
+              <a:ln w="19050">
+                <a:solidFill>
+                  <a:schemeClr val="bg1">
+                    <a:lumMod val="50000"/>
+                  </a:schemeClr>
+                </a:solidFill>
+              </a:ln>
+            </p:spPr>
+            <p:style>
+              <a:lnRef idx="2">
+                <a:schemeClr val="accent1">
+                  <a:shade val="50000"/>
+                </a:schemeClr>
+              </a:lnRef>
+              <a:fillRef idx="1">
+                <a:schemeClr val="accent1"/>
+              </a:fillRef>
+              <a:effectRef idx="0">
+                <a:schemeClr val="accent1"/>
+              </a:effectRef>
+              <a:fontRef idx="minor">
+                <a:schemeClr val="lt1"/>
+              </a:fontRef>
+            </p:style>
+            <p:txBody>
+              <a:bodyPr rtlCol="0" anchor="ctr"/>
+              <a:lstStyle/>
+              <a:p>
+                <a:pPr algn="ctr"/>
+                <a:endParaRPr lang="de-DE"/>
+              </a:p>
+            </p:txBody>
+          </p:sp>
+          <p:sp>
+            <p:nvSpPr>
+              <p:cNvPr id="32" name="Flussdiagramm: Mehrere Dokumente 31">
+                <a:extLst>
+                  <a:ext uri="{FF2B5EF4-FFF2-40B4-BE49-F238E27FC236}">
+                    <a16:creationId xmlns:a16="http://schemas.microsoft.com/office/drawing/2014/main" id="{C485454D-EA0D-47E7-9F53-FFBA3F905F45}"/>
+                  </a:ext>
+                </a:extLst>
+              </p:cNvPr>
+              <p:cNvSpPr/>
+              <p:nvPr/>
+            </p:nvSpPr>
+            <p:spPr>
+              <a:xfrm>
+                <a:off x="7060782" y="3880352"/>
+                <a:ext cx="1137739" cy="1560780"/>
+              </a:xfrm>
+              <a:prstGeom prst="flowChartMultidocument">
+                <a:avLst/>
+              </a:prstGeom>
+              <a:solidFill>
+                <a:schemeClr val="bg1">
+                  <a:lumMod val="85000"/>
+                </a:schemeClr>
+              </a:solidFill>
+              <a:ln w="19050">
+                <a:solidFill>
+                  <a:schemeClr val="bg1">
+                    <a:lumMod val="50000"/>
+                  </a:schemeClr>
+                </a:solidFill>
+              </a:ln>
+            </p:spPr>
+            <p:style>
+              <a:lnRef idx="2">
+                <a:schemeClr val="accent1">
+                  <a:shade val="50000"/>
+                </a:schemeClr>
+              </a:lnRef>
+              <a:fillRef idx="1">
+                <a:schemeClr val="accent1"/>
+              </a:fillRef>
+              <a:effectRef idx="0">
+                <a:schemeClr val="accent1"/>
+              </a:effectRef>
+              <a:fontRef idx="minor">
+                <a:schemeClr val="lt1"/>
+              </a:fontRef>
+            </p:style>
+            <p:txBody>
+              <a:bodyPr rtlCol="0" anchor="ctr"/>
+              <a:lstStyle/>
+              <a:p>
+                <a:pPr algn="ctr"/>
+                <a:endParaRPr lang="de-DE"/>
+              </a:p>
+            </p:txBody>
+          </p:sp>
+          <p:sp>
+            <p:nvSpPr>
+              <p:cNvPr id="33" name="Flussdiagramm: Mehrere Dokumente 32">
+                <a:extLst>
+                  <a:ext uri="{FF2B5EF4-FFF2-40B4-BE49-F238E27FC236}">
+                    <a16:creationId xmlns:a16="http://schemas.microsoft.com/office/drawing/2014/main" id="{21BDA087-665C-4E03-8F7E-FC17B50527DC}"/>
+                  </a:ext>
+                </a:extLst>
+              </p:cNvPr>
+              <p:cNvSpPr/>
+              <p:nvPr/>
+            </p:nvSpPr>
+            <p:spPr>
+              <a:xfrm>
+                <a:off x="8547434" y="3890298"/>
+                <a:ext cx="1137739" cy="1560780"/>
+              </a:xfrm>
+              <a:prstGeom prst="flowChartMultidocument">
+                <a:avLst/>
+              </a:prstGeom>
+              <a:solidFill>
+                <a:schemeClr val="bg1"/>
+              </a:solidFill>
+              <a:ln w="19050">
+                <a:solidFill>
+                  <a:schemeClr val="bg1">
+                    <a:lumMod val="50000"/>
+                  </a:schemeClr>
+                </a:solidFill>
+              </a:ln>
+            </p:spPr>
+            <p:style>
+              <a:lnRef idx="2">
+                <a:schemeClr val="accent1">
+                  <a:shade val="50000"/>
+                </a:schemeClr>
+              </a:lnRef>
+              <a:fillRef idx="1">
+                <a:schemeClr val="accent1"/>
+              </a:fillRef>
+              <a:effectRef idx="0">
+                <a:schemeClr val="accent1"/>
+              </a:effectRef>
+              <a:fontRef idx="minor">
+                <a:schemeClr val="lt1"/>
+              </a:fontRef>
+            </p:style>
+            <p:txBody>
+              <a:bodyPr rtlCol="0" anchor="ctr"/>
+              <a:lstStyle/>
+              <a:p>
+                <a:pPr algn="ctr"/>
+                <a:endParaRPr lang="de-DE"/>
+              </a:p>
+            </p:txBody>
+          </p:sp>
+          <p:cxnSp>
+            <p:nvCxnSpPr>
+              <p:cNvPr id="35" name="Gerader Verbinder 34">
+                <a:extLst>
+                  <a:ext uri="{FF2B5EF4-FFF2-40B4-BE49-F238E27FC236}">
+                    <a16:creationId xmlns:a16="http://schemas.microsoft.com/office/drawing/2014/main" id="{74F723C9-27EE-4449-B5C0-F81A967C6BF0}"/>
+                  </a:ext>
+                </a:extLst>
+              </p:cNvPr>
+              <p:cNvCxnSpPr/>
+              <p:nvPr/>
+            </p:nvCxnSpPr>
+            <p:spPr>
+              <a:xfrm flipH="1">
+                <a:off x="6071185" y="510339"/>
+                <a:ext cx="49630" cy="5372100"/>
+              </a:xfrm>
+              <a:prstGeom prst="line">
+                <a:avLst/>
+              </a:prstGeom>
+              <a:ln w="28575">
+                <a:solidFill>
+                  <a:schemeClr val="bg1">
+                    <a:lumMod val="50000"/>
+                  </a:schemeClr>
+                </a:solidFill>
+                <a:prstDash val="dash"/>
+              </a:ln>
+            </p:spPr>
+            <p:style>
+              <a:lnRef idx="1">
+                <a:schemeClr val="accent1"/>
+              </a:lnRef>
+              <a:fillRef idx="0">
+                <a:schemeClr val="accent1"/>
+              </a:fillRef>
+              <a:effectRef idx="0">
+                <a:schemeClr val="accent1"/>
+              </a:effectRef>
+              <a:fontRef idx="minor">
+                <a:schemeClr val="tx1"/>
+              </a:fontRef>
+            </p:style>
+          </p:cxnSp>
+          <p:sp>
+            <p:nvSpPr>
+              <p:cNvPr id="38" name="Textfeld 37">
+                <a:extLst>
+                  <a:ext uri="{FF2B5EF4-FFF2-40B4-BE49-F238E27FC236}">
+                    <a16:creationId xmlns:a16="http://schemas.microsoft.com/office/drawing/2014/main" id="{839CAEF5-09F5-466C-93B7-DF1539790899}"/>
+                  </a:ext>
+                </a:extLst>
+              </p:cNvPr>
+              <p:cNvSpPr txBox="1"/>
+              <p:nvPr/>
+            </p:nvSpPr>
+            <p:spPr>
+              <a:xfrm>
+                <a:off x="7246018" y="4118321"/>
+                <a:ext cx="866273" cy="307777"/>
+              </a:xfrm>
+              <a:prstGeom prst="rect">
+                <a:avLst/>
+              </a:prstGeom>
+              <a:noFill/>
+            </p:spPr>
+            <p:txBody>
+              <a:bodyPr wrap="square" rtlCol="0">
+                <a:spAutoFit/>
+              </a:bodyPr>
+              <a:lstStyle/>
+              <a:p>
+                <a:r>
+                  <a:rPr lang="de-DE" sz="1400" dirty="0"/>
+                  <a:t>„blau“</a:t>
+                </a:r>
+              </a:p>
+            </p:txBody>
+          </p:sp>
+          <p:sp>
+            <p:nvSpPr>
+              <p:cNvPr id="40" name="Textfeld 39">
+                <a:extLst>
+                  <a:ext uri="{FF2B5EF4-FFF2-40B4-BE49-F238E27FC236}">
+                    <a16:creationId xmlns:a16="http://schemas.microsoft.com/office/drawing/2014/main" id="{1B9B89D2-ACFA-490D-90F3-DBACE54F5D61}"/>
+                  </a:ext>
+                </a:extLst>
+              </p:cNvPr>
+              <p:cNvSpPr txBox="1"/>
+              <p:nvPr/>
+            </p:nvSpPr>
+            <p:spPr>
+              <a:xfrm>
+                <a:off x="7226714" y="4380087"/>
+                <a:ext cx="866273" cy="307777"/>
+              </a:xfrm>
+              <a:prstGeom prst="rect">
+                <a:avLst/>
+              </a:prstGeom>
+              <a:noFill/>
+            </p:spPr>
+            <p:txBody>
+              <a:bodyPr wrap="square" rtlCol="0">
+                <a:spAutoFit/>
+              </a:bodyPr>
+              <a:lstStyle/>
+              <a:p>
+                <a:r>
+                  <a:rPr lang="de-DE" sz="1400" dirty="0"/>
+                  <a:t>„herr“</a:t>
+                </a:r>
+              </a:p>
+            </p:txBody>
+          </p:sp>
+          <p:sp>
+            <p:nvSpPr>
+              <p:cNvPr id="42" name="Textfeld 41">
+                <a:extLst>
+                  <a:ext uri="{FF2B5EF4-FFF2-40B4-BE49-F238E27FC236}">
+                    <a16:creationId xmlns:a16="http://schemas.microsoft.com/office/drawing/2014/main" id="{38931ED6-7540-42D5-AE98-694F27C3102A}"/>
+                  </a:ext>
+                </a:extLst>
+              </p:cNvPr>
+              <p:cNvSpPr txBox="1"/>
+              <p:nvPr/>
+            </p:nvSpPr>
+            <p:spPr>
+              <a:xfrm>
+                <a:off x="7246018" y="4670688"/>
+                <a:ext cx="866273" cy="307777"/>
+              </a:xfrm>
+              <a:prstGeom prst="rect">
+                <a:avLst/>
+              </a:prstGeom>
+              <a:noFill/>
+            </p:spPr>
+            <p:txBody>
+              <a:bodyPr wrap="square" rtlCol="0">
+                <a:spAutoFit/>
+              </a:bodyPr>
+              <a:lstStyle/>
+              <a:p>
+                <a:r>
+                  <a:rPr lang="de-DE" sz="1400" dirty="0"/>
+                  <a:t>„hos“</a:t>
+                </a:r>
+              </a:p>
+            </p:txBody>
+          </p:sp>
+          <p:sp>
+            <p:nvSpPr>
+              <p:cNvPr id="43" name="Textfeld 42">
+                <a:extLst>
+                  <a:ext uri="{FF2B5EF4-FFF2-40B4-BE49-F238E27FC236}">
+                    <a16:creationId xmlns:a16="http://schemas.microsoft.com/office/drawing/2014/main" id="{E6F2128C-E2B6-408B-A2ED-B69AA537A7DD}"/>
+                  </a:ext>
+                </a:extLst>
+              </p:cNvPr>
+              <p:cNvSpPr txBox="1"/>
+              <p:nvPr/>
+            </p:nvSpPr>
+            <p:spPr>
+              <a:xfrm>
+                <a:off x="7236237" y="4952380"/>
+                <a:ext cx="866273" cy="307777"/>
+              </a:xfrm>
+              <a:prstGeom prst="rect">
+                <a:avLst/>
+              </a:prstGeom>
+              <a:noFill/>
+            </p:spPr>
+            <p:txBody>
+              <a:bodyPr wrap="square" rtlCol="0">
+                <a:spAutoFit/>
+              </a:bodyPr>
+              <a:lstStyle/>
+              <a:p>
+                <a:r>
+                  <a:rPr lang="de-DE" sz="1400" dirty="0"/>
+                  <a:t>„levis“</a:t>
+                </a:r>
+              </a:p>
+            </p:txBody>
+          </p:sp>
+          <p:sp>
+            <p:nvSpPr>
+              <p:cNvPr id="44" name="Textfeld 43">
+                <a:extLst>
+                  <a:ext uri="{FF2B5EF4-FFF2-40B4-BE49-F238E27FC236}">
+                    <a16:creationId xmlns:a16="http://schemas.microsoft.com/office/drawing/2014/main" id="{C434777C-FFE1-4A13-9068-7135E41BEE45}"/>
+                  </a:ext>
+                </a:extLst>
+              </p:cNvPr>
+              <p:cNvSpPr txBox="1"/>
+              <p:nvPr/>
+            </p:nvSpPr>
+            <p:spPr>
+              <a:xfrm>
+                <a:off x="8741444" y="4123187"/>
+                <a:ext cx="866273" cy="307777"/>
+              </a:xfrm>
+              <a:prstGeom prst="rect">
+                <a:avLst/>
+              </a:prstGeom>
+              <a:noFill/>
+            </p:spPr>
+            <p:txBody>
+              <a:bodyPr wrap="square" rtlCol="0">
+                <a:spAutoFit/>
+              </a:bodyPr>
+              <a:lstStyle/>
+              <a:p>
+                <a:r>
+                  <a:rPr lang="de-DE" sz="1400" dirty="0"/>
+                  <a:t>„grau“</a:t>
+                </a:r>
+              </a:p>
+            </p:txBody>
+          </p:sp>
+          <p:sp>
+            <p:nvSpPr>
+              <p:cNvPr id="45" name="Textfeld 44">
+                <a:extLst>
+                  <a:ext uri="{FF2B5EF4-FFF2-40B4-BE49-F238E27FC236}">
+                    <a16:creationId xmlns:a16="http://schemas.microsoft.com/office/drawing/2014/main" id="{8D96B217-1D45-457D-A63A-47BFF8382689}"/>
+                  </a:ext>
+                </a:extLst>
+              </p:cNvPr>
+              <p:cNvSpPr txBox="1"/>
+              <p:nvPr/>
+            </p:nvSpPr>
+            <p:spPr>
+              <a:xfrm>
+                <a:off x="8722139" y="4384793"/>
+                <a:ext cx="866273" cy="307777"/>
+              </a:xfrm>
+              <a:prstGeom prst="rect">
+                <a:avLst/>
+              </a:prstGeom>
+              <a:noFill/>
+            </p:spPr>
+            <p:txBody>
+              <a:bodyPr wrap="square" rtlCol="0">
+                <a:spAutoFit/>
+              </a:bodyPr>
+              <a:lstStyle/>
+              <a:p>
+                <a:r>
+                  <a:rPr lang="de-DE" sz="1400" dirty="0"/>
+                  <a:t>„dam“</a:t>
+                </a:r>
+              </a:p>
+            </p:txBody>
+          </p:sp>
+          <p:sp>
+            <p:nvSpPr>
+              <p:cNvPr id="46" name="Textfeld 45">
+                <a:extLst>
+                  <a:ext uri="{FF2B5EF4-FFF2-40B4-BE49-F238E27FC236}">
+                    <a16:creationId xmlns:a16="http://schemas.microsoft.com/office/drawing/2014/main" id="{FF3ACBE3-93A3-4482-B27A-84E67838E29B}"/>
+                  </a:ext>
+                </a:extLst>
+              </p:cNvPr>
+              <p:cNvSpPr txBox="1"/>
+              <p:nvPr/>
+            </p:nvSpPr>
+            <p:spPr>
+              <a:xfrm>
+                <a:off x="8741444" y="4670688"/>
+                <a:ext cx="866273" cy="307777"/>
+              </a:xfrm>
+              <a:prstGeom prst="rect">
+                <a:avLst/>
+              </a:prstGeom>
+              <a:noFill/>
+            </p:spPr>
+            <p:txBody>
+              <a:bodyPr wrap="square" rtlCol="0">
+                <a:spAutoFit/>
+              </a:bodyPr>
+              <a:lstStyle/>
+              <a:p>
+                <a:r>
+                  <a:rPr lang="de-DE" sz="1400" dirty="0"/>
+                  <a:t>„blus“</a:t>
+                </a:r>
+              </a:p>
+            </p:txBody>
+          </p:sp>
+          <p:sp>
+            <p:nvSpPr>
+              <p:cNvPr id="47" name="Textfeld 46">
+                <a:extLst>
+                  <a:ext uri="{FF2B5EF4-FFF2-40B4-BE49-F238E27FC236}">
+                    <a16:creationId xmlns:a16="http://schemas.microsoft.com/office/drawing/2014/main" id="{4CC17A17-9AC6-450C-BDD9-06414FC3B300}"/>
+                  </a:ext>
+                </a:extLst>
+              </p:cNvPr>
+              <p:cNvSpPr txBox="1"/>
+              <p:nvPr/>
+            </p:nvSpPr>
+            <p:spPr>
+              <a:xfrm>
+                <a:off x="8722139" y="4952380"/>
+                <a:ext cx="866273" cy="307777"/>
+              </a:xfrm>
+              <a:prstGeom prst="rect">
+                <a:avLst/>
+              </a:prstGeom>
+              <a:noFill/>
+            </p:spPr>
+            <p:txBody>
+              <a:bodyPr wrap="square" rtlCol="0">
+                <a:spAutoFit/>
+              </a:bodyPr>
+              <a:lstStyle/>
+              <a:p>
+                <a:r>
+                  <a:rPr lang="de-DE" sz="1400" dirty="0"/>
+                  <a:t>„levis“</a:t>
+                </a:r>
+              </a:p>
+            </p:txBody>
+          </p:sp>
+          <p:sp>
+            <p:nvSpPr>
+              <p:cNvPr id="48" name="Textfeld 47">
+                <a:extLst>
+                  <a:ext uri="{FF2B5EF4-FFF2-40B4-BE49-F238E27FC236}">
+                    <a16:creationId xmlns:a16="http://schemas.microsoft.com/office/drawing/2014/main" id="{E4DC86BC-2617-4DC6-93B6-621740128402}"/>
+                  </a:ext>
+                </a:extLst>
+              </p:cNvPr>
+              <p:cNvSpPr txBox="1"/>
+              <p:nvPr/>
+            </p:nvSpPr>
+            <p:spPr>
+              <a:xfrm>
+                <a:off x="6988085" y="1643456"/>
+                <a:ext cx="866273" cy="261610"/>
+              </a:xfrm>
+              <a:prstGeom prst="rect">
+                <a:avLst/>
+              </a:prstGeom>
+              <a:noFill/>
+            </p:spPr>
+            <p:txBody>
+              <a:bodyPr wrap="square" rtlCol="0">
+                <a:spAutoFit/>
+              </a:bodyPr>
+              <a:lstStyle/>
+              <a:p>
+                <a:r>
+                  <a:rPr lang="de-DE" sz="1100" dirty="0"/>
+                  <a:t>„blau“</a:t>
+                </a:r>
+              </a:p>
+            </p:txBody>
+          </p:sp>
+          <p:sp>
+            <p:nvSpPr>
+              <p:cNvPr id="49" name="Textfeld 48">
+                <a:extLst>
+                  <a:ext uri="{FF2B5EF4-FFF2-40B4-BE49-F238E27FC236}">
+                    <a16:creationId xmlns:a16="http://schemas.microsoft.com/office/drawing/2014/main" id="{E0B14B28-0D35-4E74-8D7F-A1E104CC5D15}"/>
+                  </a:ext>
+                </a:extLst>
+              </p:cNvPr>
+              <p:cNvSpPr txBox="1"/>
+              <p:nvPr/>
+            </p:nvSpPr>
+            <p:spPr>
+              <a:xfrm>
+                <a:off x="6968781" y="1867122"/>
+                <a:ext cx="866273" cy="261610"/>
+              </a:xfrm>
+              <a:prstGeom prst="rect">
+                <a:avLst/>
+              </a:prstGeom>
+              <a:noFill/>
+            </p:spPr>
+            <p:txBody>
+              <a:bodyPr wrap="square" rtlCol="0">
+                <a:spAutoFit/>
+              </a:bodyPr>
+              <a:lstStyle/>
+              <a:p>
+                <a:r>
+                  <a:rPr lang="de-DE" sz="1100" dirty="0"/>
+                  <a:t>„Herren“</a:t>
+                </a:r>
+              </a:p>
+            </p:txBody>
+          </p:sp>
+          <p:sp>
+            <p:nvSpPr>
+              <p:cNvPr id="50" name="Textfeld 49">
+                <a:extLst>
+                  <a:ext uri="{FF2B5EF4-FFF2-40B4-BE49-F238E27FC236}">
+                    <a16:creationId xmlns:a16="http://schemas.microsoft.com/office/drawing/2014/main" id="{1A3AF519-192B-4F74-B86D-811B3E415161}"/>
+                  </a:ext>
+                </a:extLst>
+              </p:cNvPr>
+              <p:cNvSpPr txBox="1"/>
+              <p:nvPr/>
+            </p:nvSpPr>
+            <p:spPr>
+              <a:xfrm>
+                <a:off x="6988085" y="2129148"/>
+                <a:ext cx="866273" cy="261610"/>
+              </a:xfrm>
+              <a:prstGeom prst="rect">
+                <a:avLst/>
+              </a:prstGeom>
+              <a:noFill/>
+            </p:spPr>
+            <p:txBody>
+              <a:bodyPr wrap="square" rtlCol="0">
+                <a:spAutoFit/>
+              </a:bodyPr>
+              <a:lstStyle/>
+              <a:p>
+                <a:r>
+                  <a:rPr lang="de-DE" sz="1100" dirty="0"/>
+                  <a:t>„Hosen“</a:t>
+                </a:r>
+              </a:p>
+            </p:txBody>
+          </p:sp>
+          <p:sp>
+            <p:nvSpPr>
+              <p:cNvPr id="51" name="Textfeld 50">
+                <a:extLst>
+                  <a:ext uri="{FF2B5EF4-FFF2-40B4-BE49-F238E27FC236}">
+                    <a16:creationId xmlns:a16="http://schemas.microsoft.com/office/drawing/2014/main" id="{7F746909-B7BC-42BF-82D0-8261941E2E80}"/>
+                  </a:ext>
+                </a:extLst>
+              </p:cNvPr>
+              <p:cNvSpPr txBox="1"/>
+              <p:nvPr/>
+            </p:nvSpPr>
+            <p:spPr>
+              <a:xfrm>
+                <a:off x="6964150" y="2378425"/>
+                <a:ext cx="866273" cy="261610"/>
+              </a:xfrm>
+              <a:prstGeom prst="rect">
+                <a:avLst/>
+              </a:prstGeom>
+              <a:noFill/>
+            </p:spPr>
+            <p:txBody>
+              <a:bodyPr wrap="square" rtlCol="0">
+                <a:spAutoFit/>
+              </a:bodyPr>
+              <a:lstStyle/>
+              <a:p>
+                <a:r>
+                  <a:rPr lang="de-DE" sz="1100" dirty="0"/>
+                  <a:t>„Levi‘s“</a:t>
+                </a:r>
+              </a:p>
+            </p:txBody>
+          </p:sp>
+          <p:sp>
+            <p:nvSpPr>
+              <p:cNvPr id="52" name="Textfeld 51">
+                <a:extLst>
+                  <a:ext uri="{FF2B5EF4-FFF2-40B4-BE49-F238E27FC236}">
+                    <a16:creationId xmlns:a16="http://schemas.microsoft.com/office/drawing/2014/main" id="{69A9B7FF-CCC2-4718-8B77-976C9F25295E}"/>
+                  </a:ext>
+                </a:extLst>
+              </p:cNvPr>
+              <p:cNvSpPr txBox="1"/>
+              <p:nvPr/>
+            </p:nvSpPr>
+            <p:spPr>
+              <a:xfrm>
+                <a:off x="9246140" y="1636608"/>
+                <a:ext cx="866273" cy="261610"/>
+              </a:xfrm>
+              <a:prstGeom prst="rect">
+                <a:avLst/>
+              </a:prstGeom>
+              <a:noFill/>
+            </p:spPr>
+            <p:txBody>
+              <a:bodyPr wrap="square" rtlCol="0">
+                <a:spAutoFit/>
+              </a:bodyPr>
+              <a:lstStyle/>
+              <a:p>
+                <a:r>
+                  <a:rPr lang="de-DE" sz="1100" dirty="0"/>
+                  <a:t>„grau“</a:t>
+                </a:r>
+              </a:p>
+            </p:txBody>
+          </p:sp>
+          <p:sp>
+            <p:nvSpPr>
+              <p:cNvPr id="53" name="Textfeld 52">
+                <a:extLst>
+                  <a:ext uri="{FF2B5EF4-FFF2-40B4-BE49-F238E27FC236}">
+                    <a16:creationId xmlns:a16="http://schemas.microsoft.com/office/drawing/2014/main" id="{84174574-BB3C-451A-B858-D06777713923}"/>
+                  </a:ext>
+                </a:extLst>
+              </p:cNvPr>
+              <p:cNvSpPr txBox="1"/>
+              <p:nvPr/>
+            </p:nvSpPr>
+            <p:spPr>
+              <a:xfrm>
+                <a:off x="9226836" y="1860274"/>
+                <a:ext cx="866273" cy="261610"/>
+              </a:xfrm>
+              <a:prstGeom prst="rect">
+                <a:avLst/>
+              </a:prstGeom>
+              <a:noFill/>
+            </p:spPr>
+            <p:txBody>
+              <a:bodyPr wrap="square" rtlCol="0">
+                <a:spAutoFit/>
+              </a:bodyPr>
+              <a:lstStyle/>
+              <a:p>
+                <a:r>
+                  <a:rPr lang="de-DE" sz="1100" dirty="0"/>
+                  <a:t>„Damen“</a:t>
+                </a:r>
+              </a:p>
+            </p:txBody>
+          </p:sp>
+          <p:sp>
+            <p:nvSpPr>
+              <p:cNvPr id="54" name="Textfeld 53">
+                <a:extLst>
+                  <a:ext uri="{FF2B5EF4-FFF2-40B4-BE49-F238E27FC236}">
+                    <a16:creationId xmlns:a16="http://schemas.microsoft.com/office/drawing/2014/main" id="{20973450-C77B-4ABB-A588-A5351739478A}"/>
+                  </a:ext>
+                </a:extLst>
+              </p:cNvPr>
+              <p:cNvSpPr txBox="1"/>
+              <p:nvPr/>
+            </p:nvSpPr>
+            <p:spPr>
+              <a:xfrm>
+                <a:off x="9246140" y="2122300"/>
+                <a:ext cx="866273" cy="261610"/>
+              </a:xfrm>
+              <a:prstGeom prst="rect">
+                <a:avLst/>
+              </a:prstGeom>
+              <a:noFill/>
+            </p:spPr>
+            <p:txBody>
+              <a:bodyPr wrap="square" rtlCol="0">
+                <a:spAutoFit/>
+              </a:bodyPr>
+              <a:lstStyle/>
+              <a:p>
+                <a:r>
+                  <a:rPr lang="de-DE" sz="1100" dirty="0"/>
+                  <a:t>„Blusen“</a:t>
+                </a:r>
+              </a:p>
+            </p:txBody>
+          </p:sp>
+          <p:sp>
+            <p:nvSpPr>
+              <p:cNvPr id="55" name="Textfeld 54">
+                <a:extLst>
+                  <a:ext uri="{FF2B5EF4-FFF2-40B4-BE49-F238E27FC236}">
+                    <a16:creationId xmlns:a16="http://schemas.microsoft.com/office/drawing/2014/main" id="{73942919-D1E6-4757-A1A5-FFFD28BEE734}"/>
+                  </a:ext>
+                </a:extLst>
+              </p:cNvPr>
+              <p:cNvSpPr txBox="1"/>
+              <p:nvPr/>
+            </p:nvSpPr>
+            <p:spPr>
+              <a:xfrm>
+                <a:off x="9222205" y="2371577"/>
+                <a:ext cx="866273" cy="261610"/>
+              </a:xfrm>
+              <a:prstGeom prst="rect">
+                <a:avLst/>
+              </a:prstGeom>
+              <a:noFill/>
+            </p:spPr>
+            <p:txBody>
+              <a:bodyPr wrap="square" rtlCol="0">
+                <a:spAutoFit/>
+              </a:bodyPr>
+              <a:lstStyle/>
+              <a:p>
+                <a:r>
+                  <a:rPr lang="de-DE" sz="1100" dirty="0"/>
+                  <a:t>„Levi‘s“</a:t>
+                </a:r>
+              </a:p>
+            </p:txBody>
+          </p:sp>
+        </p:grpSp>
+        <p:sp>
+          <p:nvSpPr>
+            <p:cNvPr id="2" name="Rechteck 1">
+              <a:extLst>
+                <a:ext uri="{FF2B5EF4-FFF2-40B4-BE49-F238E27FC236}">
+                  <a16:creationId xmlns:a16="http://schemas.microsoft.com/office/drawing/2014/main" id="{9A1EEF1B-3275-4E01-B8DF-B2EDE5918AB0}"/>
+                </a:ext>
+              </a:extLst>
+            </p:cNvPr>
+            <p:cNvSpPr/>
+            <p:nvPr/>
+          </p:nvSpPr>
+          <p:spPr>
+            <a:xfrm>
+              <a:off x="1628775" y="548439"/>
+              <a:ext cx="7943850" cy="5372100"/>
+            </a:xfrm>
+            <a:prstGeom prst="rect">
+              <a:avLst/>
+            </a:prstGeom>
+            <a:noFill/>
+            <a:ln w="28575">
+              <a:solidFill>
+                <a:schemeClr val="bg1">
+                  <a:lumMod val="50000"/>
+                </a:schemeClr>
+              </a:solidFill>
+            </a:ln>
+          </p:spPr>
+          <p:style>
+            <a:lnRef idx="2">
+              <a:schemeClr val="accent1">
+                <a:shade val="50000"/>
+              </a:schemeClr>
+            </a:lnRef>
+            <a:fillRef idx="1">
+              <a:schemeClr val="accent1"/>
+            </a:fillRef>
+            <a:effectRef idx="0">
+              <a:schemeClr val="accent1"/>
+            </a:effectRef>
+            <a:fontRef idx="minor">
+              <a:schemeClr val="lt1"/>
+            </a:fontRef>
+          </p:style>
+          <p:txBody>
+            <a:bodyPr rtlCol="0" anchor="ctr"/>
+            <a:lstStyle/>
+            <a:p>
+              <a:pPr algn="ctr"/>
+              <a:endParaRPr lang="de-DE"/>
+            </a:p>
+          </p:txBody>
+        </p:sp>
+      </p:grpSp>
+    </p:spTree>
+    <p:extLst>
+      <p:ext uri="{BB962C8B-B14F-4D97-AF65-F5344CB8AC3E}">
+        <p14:creationId xmlns:p14="http://schemas.microsoft.com/office/powerpoint/2010/main" val="3191026639"/>
+      </p:ext>
+    </p:extLst>
+  </p:cSld>
+  <p:clrMapOvr>
+    <a:masterClrMapping/>
+  </p:clrMapOvr>
+</p:sld>
+</file>
+
 <file path=ppt/theme/theme1.xml><?xml version="1.0" encoding="utf-8"?>
 <a:theme xmlns:a="http://schemas.openxmlformats.org/drawingml/2006/main" name="Office">
   <a:themeElements>

</xml_diff>

<commit_message>
begin with caption 3
</commit_message>
<xml_diff>
--- a/images/Bilder.pptx
+++ b/images/Bilder.pptx
@@ -7,8 +7,9 @@
   <p:sldIdLst>
     <p:sldId id="257" r:id="rId2"/>
     <p:sldId id="258" r:id="rId3"/>
-    <p:sldId id="259" r:id="rId4"/>
-    <p:sldId id="260" r:id="rId5"/>
+    <p:sldId id="260" r:id="rId4"/>
+    <p:sldId id="261" r:id="rId5"/>
+    <p:sldId id="262" r:id="rId6"/>
   </p:sldIdLst>
   <p:sldSz cx="12192000" cy="6858000"/>
   <p:notesSz cx="6858000" cy="9144000"/>
@@ -262,7 +263,7 @@
           <a:p>
             <a:fld id="{F01BEA2B-4EBC-4FDA-85C9-98F59DD415C0}" type="datetimeFigureOut">
               <a:rPr lang="de-DE" smtClean="0"/>
-              <a:t>20.07.2021</a:t>
+              <a:t>04.08.2021</a:t>
             </a:fld>
             <a:endParaRPr lang="de-DE"/>
           </a:p>
@@ -460,7 +461,7 @@
           <a:p>
             <a:fld id="{F01BEA2B-4EBC-4FDA-85C9-98F59DD415C0}" type="datetimeFigureOut">
               <a:rPr lang="de-DE" smtClean="0"/>
-              <a:t>20.07.2021</a:t>
+              <a:t>04.08.2021</a:t>
             </a:fld>
             <a:endParaRPr lang="de-DE"/>
           </a:p>
@@ -668,7 +669,7 @@
           <a:p>
             <a:fld id="{F01BEA2B-4EBC-4FDA-85C9-98F59DD415C0}" type="datetimeFigureOut">
               <a:rPr lang="de-DE" smtClean="0"/>
-              <a:t>20.07.2021</a:t>
+              <a:t>04.08.2021</a:t>
             </a:fld>
             <a:endParaRPr lang="de-DE"/>
           </a:p>
@@ -866,7 +867,7 @@
           <a:p>
             <a:fld id="{F01BEA2B-4EBC-4FDA-85C9-98F59DD415C0}" type="datetimeFigureOut">
               <a:rPr lang="de-DE" smtClean="0"/>
-              <a:t>20.07.2021</a:t>
+              <a:t>04.08.2021</a:t>
             </a:fld>
             <a:endParaRPr lang="de-DE"/>
           </a:p>
@@ -1141,7 +1142,7 @@
           <a:p>
             <a:fld id="{F01BEA2B-4EBC-4FDA-85C9-98F59DD415C0}" type="datetimeFigureOut">
               <a:rPr lang="de-DE" smtClean="0"/>
-              <a:t>20.07.2021</a:t>
+              <a:t>04.08.2021</a:t>
             </a:fld>
             <a:endParaRPr lang="de-DE"/>
           </a:p>
@@ -1406,7 +1407,7 @@
           <a:p>
             <a:fld id="{F01BEA2B-4EBC-4FDA-85C9-98F59DD415C0}" type="datetimeFigureOut">
               <a:rPr lang="de-DE" smtClean="0"/>
-              <a:t>20.07.2021</a:t>
+              <a:t>04.08.2021</a:t>
             </a:fld>
             <a:endParaRPr lang="de-DE"/>
           </a:p>
@@ -1818,7 +1819,7 @@
           <a:p>
             <a:fld id="{F01BEA2B-4EBC-4FDA-85C9-98F59DD415C0}" type="datetimeFigureOut">
               <a:rPr lang="de-DE" smtClean="0"/>
-              <a:t>20.07.2021</a:t>
+              <a:t>04.08.2021</a:t>
             </a:fld>
             <a:endParaRPr lang="de-DE"/>
           </a:p>
@@ -1959,7 +1960,7 @@
           <a:p>
             <a:fld id="{F01BEA2B-4EBC-4FDA-85C9-98F59DD415C0}" type="datetimeFigureOut">
               <a:rPr lang="de-DE" smtClean="0"/>
-              <a:t>20.07.2021</a:t>
+              <a:t>04.08.2021</a:t>
             </a:fld>
             <a:endParaRPr lang="de-DE"/>
           </a:p>
@@ -2072,7 +2073,7 @@
           <a:p>
             <a:fld id="{F01BEA2B-4EBC-4FDA-85C9-98F59DD415C0}" type="datetimeFigureOut">
               <a:rPr lang="de-DE" smtClean="0"/>
-              <a:t>20.07.2021</a:t>
+              <a:t>04.08.2021</a:t>
             </a:fld>
             <a:endParaRPr lang="de-DE"/>
           </a:p>
@@ -2383,7 +2384,7 @@
           <a:p>
             <a:fld id="{F01BEA2B-4EBC-4FDA-85C9-98F59DD415C0}" type="datetimeFigureOut">
               <a:rPr lang="de-DE" smtClean="0"/>
-              <a:t>20.07.2021</a:t>
+              <a:t>04.08.2021</a:t>
             </a:fld>
             <a:endParaRPr lang="de-DE"/>
           </a:p>
@@ -2671,7 +2672,7 @@
           <a:p>
             <a:fld id="{F01BEA2B-4EBC-4FDA-85C9-98F59DD415C0}" type="datetimeFigureOut">
               <a:rPr lang="de-DE" smtClean="0"/>
-              <a:t>20.07.2021</a:t>
+              <a:t>04.08.2021</a:t>
             </a:fld>
             <a:endParaRPr lang="de-DE"/>
           </a:p>
@@ -2912,7 +2913,7 @@
           <a:p>
             <a:fld id="{F01BEA2B-4EBC-4FDA-85C9-98F59DD415C0}" type="datetimeFigureOut">
               <a:rPr lang="de-DE" smtClean="0"/>
-              <a:t>20.07.2021</a:t>
+              <a:t>04.08.2021</a:t>
             </a:fld>
             <a:endParaRPr lang="de-DE"/>
           </a:p>
@@ -4874,1915 +4875,6 @@
 </file>
 
 <file path=ppt/slides/slide3.xml><?xml version="1.0" encoding="utf-8"?>
-<p:sld xmlns:a="http://schemas.openxmlformats.org/drawingml/2006/main" xmlns:r="http://schemas.openxmlformats.org/officeDocument/2006/relationships" xmlns:p="http://schemas.openxmlformats.org/presentationml/2006/main">
-  <p:cSld>
-    <p:spTree>
-      <p:nvGrpSpPr>
-        <p:cNvPr id="1" name=""/>
-        <p:cNvGrpSpPr/>
-        <p:nvPr/>
-      </p:nvGrpSpPr>
-      <p:grpSpPr>
-        <a:xfrm>
-          <a:off x="0" y="0"/>
-          <a:ext cx="0" cy="0"/>
-          <a:chOff x="0" y="0"/>
-          <a:chExt cx="0" cy="0"/>
-        </a:xfrm>
-      </p:grpSpPr>
-      <p:grpSp>
-        <p:nvGrpSpPr>
-          <p:cNvPr id="56" name="Gruppieren 55">
-            <a:extLst>
-              <a:ext uri="{FF2B5EF4-FFF2-40B4-BE49-F238E27FC236}">
-                <a16:creationId xmlns:a16="http://schemas.microsoft.com/office/drawing/2014/main" id="{60E259BE-A6C2-47CD-B215-858C70024F0F}"/>
-              </a:ext>
-            </a:extLst>
-          </p:cNvPr>
-          <p:cNvGrpSpPr/>
-          <p:nvPr/>
-        </p:nvGrpSpPr>
-        <p:grpSpPr>
-          <a:xfrm>
-            <a:off x="1811440" y="548439"/>
-            <a:ext cx="7479813" cy="5372100"/>
-            <a:chOff x="2678215" y="510339"/>
-            <a:chExt cx="7479813" cy="5372100"/>
-          </a:xfrm>
-        </p:grpSpPr>
-        <p:sp>
-          <p:nvSpPr>
-            <p:cNvPr id="26" name="Rechteck: abgerundete Ecken 25">
-              <a:extLst>
-                <a:ext uri="{FF2B5EF4-FFF2-40B4-BE49-F238E27FC236}">
-                  <a16:creationId xmlns:a16="http://schemas.microsoft.com/office/drawing/2014/main" id="{78FD1322-8CE2-4D68-9220-024521873A48}"/>
-                </a:ext>
-              </a:extLst>
-            </p:cNvPr>
-            <p:cNvSpPr/>
-            <p:nvPr/>
-          </p:nvSpPr>
-          <p:spPr>
-            <a:xfrm>
-              <a:off x="4951875" y="1813259"/>
-              <a:ext cx="595811" cy="364317"/>
-            </a:xfrm>
-            <a:prstGeom prst="roundRect">
-              <a:avLst>
-                <a:gd name="adj" fmla="val 50000"/>
-              </a:avLst>
-            </a:prstGeom>
-            <a:solidFill>
-              <a:schemeClr val="tx1"/>
-            </a:solidFill>
-            <a:ln>
-              <a:noFill/>
-            </a:ln>
-          </p:spPr>
-          <p:style>
-            <a:lnRef idx="2">
-              <a:schemeClr val="accent1">
-                <a:shade val="50000"/>
-              </a:schemeClr>
-            </a:lnRef>
-            <a:fillRef idx="1">
-              <a:schemeClr val="accent1"/>
-            </a:fillRef>
-            <a:effectRef idx="0">
-              <a:schemeClr val="accent1"/>
-            </a:effectRef>
-            <a:fontRef idx="minor">
-              <a:schemeClr val="lt1"/>
-            </a:fontRef>
-          </p:style>
-          <p:txBody>
-            <a:bodyPr rtlCol="0" anchor="ctr"/>
-            <a:lstStyle/>
-            <a:p>
-              <a:pPr algn="ctr"/>
-              <a:endParaRPr lang="de-DE"/>
-            </a:p>
-          </p:txBody>
-        </p:sp>
-        <p:sp>
-          <p:nvSpPr>
-            <p:cNvPr id="4" name="Rechteck 3">
-              <a:extLst>
-                <a:ext uri="{FF2B5EF4-FFF2-40B4-BE49-F238E27FC236}">
-                  <a16:creationId xmlns:a16="http://schemas.microsoft.com/office/drawing/2014/main" id="{DDC46C59-CA02-428F-A1E4-90F704724EC9}"/>
-                </a:ext>
-              </a:extLst>
-            </p:cNvPr>
-            <p:cNvSpPr/>
-            <p:nvPr/>
-          </p:nvSpPr>
-          <p:spPr>
-            <a:xfrm>
-              <a:off x="2838449" y="762007"/>
-              <a:ext cx="2310063" cy="473242"/>
-            </a:xfrm>
-            <a:prstGeom prst="rect">
-              <a:avLst/>
-            </a:prstGeom>
-            <a:solidFill>
-              <a:schemeClr val="bg1">
-                <a:lumMod val="85000"/>
-              </a:schemeClr>
-            </a:solidFill>
-            <a:ln>
-              <a:noFill/>
-            </a:ln>
-          </p:spPr>
-          <p:style>
-            <a:lnRef idx="2">
-              <a:schemeClr val="accent1">
-                <a:shade val="50000"/>
-              </a:schemeClr>
-            </a:lnRef>
-            <a:fillRef idx="1">
-              <a:schemeClr val="accent1"/>
-            </a:fillRef>
-            <a:effectRef idx="0">
-              <a:schemeClr val="accent1"/>
-            </a:effectRef>
-            <a:fontRef idx="minor">
-              <a:schemeClr val="lt1"/>
-            </a:fontRef>
-          </p:style>
-          <p:txBody>
-            <a:bodyPr rtlCol="0" anchor="ctr"/>
-            <a:lstStyle/>
-            <a:p>
-              <a:pPr algn="ctr"/>
-              <a:r>
-                <a:rPr lang="de-DE" dirty="0">
-                  <a:solidFill>
-                    <a:schemeClr val="tx1"/>
-                  </a:solidFill>
-                </a:rPr>
-                <a:t>Query Time</a:t>
-              </a:r>
-            </a:p>
-          </p:txBody>
-        </p:sp>
-        <p:sp>
-          <p:nvSpPr>
-            <p:cNvPr id="5" name="Rechteck 4">
-              <a:extLst>
-                <a:ext uri="{FF2B5EF4-FFF2-40B4-BE49-F238E27FC236}">
-                  <a16:creationId xmlns:a16="http://schemas.microsoft.com/office/drawing/2014/main" id="{0A18165E-22D8-482B-9236-EDFA3F3903B3}"/>
-                </a:ext>
-              </a:extLst>
-            </p:cNvPr>
-            <p:cNvSpPr/>
-            <p:nvPr/>
-          </p:nvSpPr>
-          <p:spPr>
-            <a:xfrm>
-              <a:off x="7291138" y="762007"/>
-              <a:ext cx="2310063" cy="473242"/>
-            </a:xfrm>
-            <a:prstGeom prst="rect">
-              <a:avLst/>
-            </a:prstGeom>
-            <a:solidFill>
-              <a:schemeClr val="bg1">
-                <a:lumMod val="85000"/>
-              </a:schemeClr>
-            </a:solidFill>
-            <a:ln>
-              <a:noFill/>
-            </a:ln>
-          </p:spPr>
-          <p:style>
-            <a:lnRef idx="2">
-              <a:schemeClr val="accent1">
-                <a:shade val="50000"/>
-              </a:schemeClr>
-            </a:lnRef>
-            <a:fillRef idx="1">
-              <a:schemeClr val="accent1"/>
-            </a:fillRef>
-            <a:effectRef idx="0">
-              <a:schemeClr val="accent1"/>
-            </a:effectRef>
-            <a:fontRef idx="minor">
-              <a:schemeClr val="lt1"/>
-            </a:fontRef>
-          </p:style>
-          <p:txBody>
-            <a:bodyPr rtlCol="0" anchor="ctr"/>
-            <a:lstStyle/>
-            <a:p>
-              <a:pPr algn="ctr"/>
-              <a:r>
-                <a:rPr lang="de-DE" dirty="0">
-                  <a:solidFill>
-                    <a:schemeClr val="tx1"/>
-                  </a:solidFill>
-                </a:rPr>
-                <a:t>Index Time</a:t>
-              </a:r>
-            </a:p>
-          </p:txBody>
-        </p:sp>
-        <p:sp>
-          <p:nvSpPr>
-            <p:cNvPr id="6" name="Flussdiagramm: Magnetplattenspeicher 5">
-              <a:extLst>
-                <a:ext uri="{FF2B5EF4-FFF2-40B4-BE49-F238E27FC236}">
-                  <a16:creationId xmlns:a16="http://schemas.microsoft.com/office/drawing/2014/main" id="{7EEA170B-4089-4D97-A1FD-FEEE2150A1A3}"/>
-                </a:ext>
-              </a:extLst>
-            </p:cNvPr>
-            <p:cNvSpPr/>
-            <p:nvPr/>
-          </p:nvSpPr>
-          <p:spPr>
-            <a:xfrm>
-              <a:off x="8171448" y="1594556"/>
-              <a:ext cx="617621" cy="818147"/>
-            </a:xfrm>
-            <a:prstGeom prst="flowChartMagneticDisk">
-              <a:avLst/>
-            </a:prstGeom>
-            <a:solidFill>
-              <a:schemeClr val="bg1">
-                <a:lumMod val="85000"/>
-              </a:schemeClr>
-            </a:solidFill>
-            <a:ln>
-              <a:solidFill>
-                <a:schemeClr val="bg1">
-                  <a:lumMod val="50000"/>
-                </a:schemeClr>
-              </a:solidFill>
-            </a:ln>
-          </p:spPr>
-          <p:style>
-            <a:lnRef idx="2">
-              <a:schemeClr val="accent1">
-                <a:shade val="50000"/>
-              </a:schemeClr>
-            </a:lnRef>
-            <a:fillRef idx="1">
-              <a:schemeClr val="accent1"/>
-            </a:fillRef>
-            <a:effectRef idx="0">
-              <a:schemeClr val="accent1"/>
-            </a:effectRef>
-            <a:fontRef idx="minor">
-              <a:schemeClr val="lt1"/>
-            </a:fontRef>
-          </p:style>
-          <p:txBody>
-            <a:bodyPr rtlCol="0" anchor="ctr"/>
-            <a:lstStyle/>
-            <a:p>
-              <a:pPr algn="ctr"/>
-              <a:endParaRPr lang="de-DE"/>
-            </a:p>
-          </p:txBody>
-        </p:sp>
-        <p:sp>
-          <p:nvSpPr>
-            <p:cNvPr id="7" name="Rechteck 6">
-              <a:extLst>
-                <a:ext uri="{FF2B5EF4-FFF2-40B4-BE49-F238E27FC236}">
-                  <a16:creationId xmlns:a16="http://schemas.microsoft.com/office/drawing/2014/main" id="{80A2E756-CB6D-4ADE-BA49-BD4CD9C18D47}"/>
-                </a:ext>
-              </a:extLst>
-            </p:cNvPr>
-            <p:cNvSpPr/>
-            <p:nvPr/>
-          </p:nvSpPr>
-          <p:spPr>
-            <a:xfrm>
-              <a:off x="3223458" y="3017507"/>
-              <a:ext cx="1331494" cy="304801"/>
-            </a:xfrm>
-            <a:prstGeom prst="rect">
-              <a:avLst/>
-            </a:prstGeom>
-            <a:solidFill>
-              <a:schemeClr val="bg1"/>
-            </a:solidFill>
-            <a:ln>
-              <a:solidFill>
-                <a:schemeClr val="bg1">
-                  <a:lumMod val="85000"/>
-                </a:schemeClr>
-              </a:solidFill>
-            </a:ln>
-          </p:spPr>
-          <p:style>
-            <a:lnRef idx="2">
-              <a:schemeClr val="accent1">
-                <a:shade val="50000"/>
-              </a:schemeClr>
-            </a:lnRef>
-            <a:fillRef idx="1">
-              <a:schemeClr val="accent1"/>
-            </a:fillRef>
-            <a:effectRef idx="0">
-              <a:schemeClr val="accent1"/>
-            </a:effectRef>
-            <a:fontRef idx="minor">
-              <a:schemeClr val="lt1"/>
-            </a:fontRef>
-          </p:style>
-          <p:txBody>
-            <a:bodyPr rtlCol="0" anchor="ctr"/>
-            <a:lstStyle/>
-            <a:p>
-              <a:pPr algn="ctr"/>
-              <a:r>
-                <a:rPr lang="de-DE" sz="1600" dirty="0">
-                  <a:solidFill>
-                    <a:schemeClr val="tx1"/>
-                  </a:solidFill>
-                </a:rPr>
-                <a:t>Analyzer</a:t>
-              </a:r>
-            </a:p>
-          </p:txBody>
-        </p:sp>
-        <p:sp>
-          <p:nvSpPr>
-            <p:cNvPr id="8" name="Rechteck 7">
-              <a:extLst>
-                <a:ext uri="{FF2B5EF4-FFF2-40B4-BE49-F238E27FC236}">
-                  <a16:creationId xmlns:a16="http://schemas.microsoft.com/office/drawing/2014/main" id="{659024FE-EDF4-4355-84AB-365ECBD1D2B4}"/>
-                </a:ext>
-              </a:extLst>
-            </p:cNvPr>
-            <p:cNvSpPr/>
-            <p:nvPr/>
-          </p:nvSpPr>
-          <p:spPr>
-            <a:xfrm>
-              <a:off x="7795206" y="3017507"/>
-              <a:ext cx="1331494" cy="304801"/>
-            </a:xfrm>
-            <a:prstGeom prst="rect">
-              <a:avLst/>
-            </a:prstGeom>
-            <a:solidFill>
-              <a:schemeClr val="bg1"/>
-            </a:solidFill>
-            <a:ln>
-              <a:solidFill>
-                <a:schemeClr val="bg1">
-                  <a:lumMod val="85000"/>
-                </a:schemeClr>
-              </a:solidFill>
-            </a:ln>
-          </p:spPr>
-          <p:style>
-            <a:lnRef idx="2">
-              <a:schemeClr val="accent1">
-                <a:shade val="50000"/>
-              </a:schemeClr>
-            </a:lnRef>
-            <a:fillRef idx="1">
-              <a:schemeClr val="accent1"/>
-            </a:fillRef>
-            <a:effectRef idx="0">
-              <a:schemeClr val="accent1"/>
-            </a:effectRef>
-            <a:fontRef idx="minor">
-              <a:schemeClr val="lt1"/>
-            </a:fontRef>
-          </p:style>
-          <p:txBody>
-            <a:bodyPr rtlCol="0" anchor="ctr"/>
-            <a:lstStyle/>
-            <a:p>
-              <a:pPr algn="ctr"/>
-              <a:r>
-                <a:rPr lang="de-DE" sz="1600" dirty="0">
-                  <a:solidFill>
-                    <a:schemeClr val="tx1"/>
-                  </a:solidFill>
-                </a:rPr>
-                <a:t>Analyzer</a:t>
-              </a:r>
-            </a:p>
-          </p:txBody>
-        </p:sp>
-        <p:sp>
-          <p:nvSpPr>
-            <p:cNvPr id="10" name="Pfeil: nach unten 9">
-              <a:extLst>
-                <a:ext uri="{FF2B5EF4-FFF2-40B4-BE49-F238E27FC236}">
-                  <a16:creationId xmlns:a16="http://schemas.microsoft.com/office/drawing/2014/main" id="{2C16EBCF-2E2B-46FC-91F3-5A93B63C72CF}"/>
-                </a:ext>
-              </a:extLst>
-            </p:cNvPr>
-            <p:cNvSpPr/>
-            <p:nvPr/>
-          </p:nvSpPr>
-          <p:spPr>
-            <a:xfrm>
-              <a:off x="3784931" y="2666999"/>
-              <a:ext cx="208548" cy="264695"/>
-            </a:xfrm>
-            <a:prstGeom prst="downArrow">
-              <a:avLst/>
-            </a:prstGeom>
-            <a:solidFill>
-              <a:schemeClr val="bg1"/>
-            </a:solidFill>
-            <a:ln>
-              <a:solidFill>
-                <a:schemeClr val="bg1">
-                  <a:lumMod val="75000"/>
-                </a:schemeClr>
-              </a:solidFill>
-            </a:ln>
-          </p:spPr>
-          <p:style>
-            <a:lnRef idx="2">
-              <a:schemeClr val="accent1">
-                <a:shade val="50000"/>
-              </a:schemeClr>
-            </a:lnRef>
-            <a:fillRef idx="1">
-              <a:schemeClr val="accent1"/>
-            </a:fillRef>
-            <a:effectRef idx="0">
-              <a:schemeClr val="accent1"/>
-            </a:effectRef>
-            <a:fontRef idx="minor">
-              <a:schemeClr val="lt1"/>
-            </a:fontRef>
-          </p:style>
-          <p:txBody>
-            <a:bodyPr rtlCol="0" anchor="ctr"/>
-            <a:lstStyle/>
-            <a:p>
-              <a:pPr algn="ctr"/>
-              <a:endParaRPr lang="de-DE"/>
-            </a:p>
-          </p:txBody>
-        </p:sp>
-        <p:sp>
-          <p:nvSpPr>
-            <p:cNvPr id="11" name="Pfeil: nach unten 10">
-              <a:extLst>
-                <a:ext uri="{FF2B5EF4-FFF2-40B4-BE49-F238E27FC236}">
-                  <a16:creationId xmlns:a16="http://schemas.microsoft.com/office/drawing/2014/main" id="{FF8A1C6A-3032-4369-89F3-19E1F5A8DE46}"/>
-                </a:ext>
-              </a:extLst>
-            </p:cNvPr>
-            <p:cNvSpPr/>
-            <p:nvPr/>
-          </p:nvSpPr>
-          <p:spPr>
-            <a:xfrm>
-              <a:off x="3784931" y="3479926"/>
-              <a:ext cx="208548" cy="264695"/>
-            </a:xfrm>
-            <a:prstGeom prst="downArrow">
-              <a:avLst/>
-            </a:prstGeom>
-            <a:solidFill>
-              <a:schemeClr val="bg1"/>
-            </a:solidFill>
-            <a:ln>
-              <a:solidFill>
-                <a:schemeClr val="bg1">
-                  <a:lumMod val="75000"/>
-                </a:schemeClr>
-              </a:solidFill>
-            </a:ln>
-          </p:spPr>
-          <p:style>
-            <a:lnRef idx="2">
-              <a:schemeClr val="accent1">
-                <a:shade val="50000"/>
-              </a:schemeClr>
-            </a:lnRef>
-            <a:fillRef idx="1">
-              <a:schemeClr val="accent1"/>
-            </a:fillRef>
-            <a:effectRef idx="0">
-              <a:schemeClr val="accent1"/>
-            </a:effectRef>
-            <a:fontRef idx="minor">
-              <a:schemeClr val="lt1"/>
-            </a:fontRef>
-          </p:style>
-          <p:txBody>
-            <a:bodyPr rtlCol="0" anchor="ctr"/>
-            <a:lstStyle/>
-            <a:p>
-              <a:pPr algn="ctr"/>
-              <a:endParaRPr lang="de-DE"/>
-            </a:p>
-          </p:txBody>
-        </p:sp>
-        <p:sp>
-          <p:nvSpPr>
-            <p:cNvPr id="12" name="Pfeil: nach unten 11">
-              <a:extLst>
-                <a:ext uri="{FF2B5EF4-FFF2-40B4-BE49-F238E27FC236}">
-                  <a16:creationId xmlns:a16="http://schemas.microsoft.com/office/drawing/2014/main" id="{69232CC7-CBDE-42CB-96FD-4C1249EE33E6}"/>
-                </a:ext>
-              </a:extLst>
-            </p:cNvPr>
-            <p:cNvSpPr/>
-            <p:nvPr/>
-          </p:nvSpPr>
-          <p:spPr>
-            <a:xfrm>
-              <a:off x="8341895" y="2672513"/>
-              <a:ext cx="208548" cy="264695"/>
-            </a:xfrm>
-            <a:prstGeom prst="downArrow">
-              <a:avLst/>
-            </a:prstGeom>
-            <a:solidFill>
-              <a:schemeClr val="bg1"/>
-            </a:solidFill>
-            <a:ln>
-              <a:solidFill>
-                <a:schemeClr val="bg1">
-                  <a:lumMod val="75000"/>
-                </a:schemeClr>
-              </a:solidFill>
-            </a:ln>
-          </p:spPr>
-          <p:style>
-            <a:lnRef idx="2">
-              <a:schemeClr val="accent1">
-                <a:shade val="50000"/>
-              </a:schemeClr>
-            </a:lnRef>
-            <a:fillRef idx="1">
-              <a:schemeClr val="accent1"/>
-            </a:fillRef>
-            <a:effectRef idx="0">
-              <a:schemeClr val="accent1"/>
-            </a:effectRef>
-            <a:fontRef idx="minor">
-              <a:schemeClr val="lt1"/>
-            </a:fontRef>
-          </p:style>
-          <p:txBody>
-            <a:bodyPr rtlCol="0" anchor="ctr"/>
-            <a:lstStyle/>
-            <a:p>
-              <a:pPr algn="ctr"/>
-              <a:endParaRPr lang="de-DE"/>
-            </a:p>
-          </p:txBody>
-        </p:sp>
-        <p:sp>
-          <p:nvSpPr>
-            <p:cNvPr id="13" name="Pfeil: nach unten 12">
-              <a:extLst>
-                <a:ext uri="{FF2B5EF4-FFF2-40B4-BE49-F238E27FC236}">
-                  <a16:creationId xmlns:a16="http://schemas.microsoft.com/office/drawing/2014/main" id="{F8694B22-58F9-4685-88E6-545F3C1C0875}"/>
-                </a:ext>
-              </a:extLst>
-            </p:cNvPr>
-            <p:cNvSpPr/>
-            <p:nvPr/>
-          </p:nvSpPr>
-          <p:spPr>
-            <a:xfrm>
-              <a:off x="8356679" y="3476419"/>
-              <a:ext cx="208548" cy="264695"/>
-            </a:xfrm>
-            <a:prstGeom prst="downArrow">
-              <a:avLst/>
-            </a:prstGeom>
-            <a:solidFill>
-              <a:schemeClr val="bg1"/>
-            </a:solidFill>
-            <a:ln>
-              <a:solidFill>
-                <a:schemeClr val="bg1">
-                  <a:lumMod val="75000"/>
-                </a:schemeClr>
-              </a:solidFill>
-            </a:ln>
-          </p:spPr>
-          <p:style>
-            <a:lnRef idx="2">
-              <a:schemeClr val="accent1">
-                <a:shade val="50000"/>
-              </a:schemeClr>
-            </a:lnRef>
-            <a:fillRef idx="1">
-              <a:schemeClr val="accent1"/>
-            </a:fillRef>
-            <a:effectRef idx="0">
-              <a:schemeClr val="accent1"/>
-            </a:effectRef>
-            <a:fontRef idx="minor">
-              <a:schemeClr val="lt1"/>
-            </a:fontRef>
-          </p:style>
-          <p:txBody>
-            <a:bodyPr rtlCol="0" anchor="ctr"/>
-            <a:lstStyle/>
-            <a:p>
-              <a:pPr algn="ctr"/>
-              <a:endParaRPr lang="de-DE"/>
-            </a:p>
-          </p:txBody>
-        </p:sp>
-        <p:sp>
-          <p:nvSpPr>
-            <p:cNvPr id="14" name="Textfeld 13">
-              <a:extLst>
-                <a:ext uri="{FF2B5EF4-FFF2-40B4-BE49-F238E27FC236}">
-                  <a16:creationId xmlns:a16="http://schemas.microsoft.com/office/drawing/2014/main" id="{DF14B5B0-FAE2-4D58-B44F-BBA3294EE675}"/>
-                </a:ext>
-              </a:extLst>
-            </p:cNvPr>
-            <p:cNvSpPr txBox="1"/>
-            <p:nvPr/>
-          </p:nvSpPr>
-          <p:spPr>
-            <a:xfrm>
-              <a:off x="3569997" y="4118321"/>
-              <a:ext cx="866273" cy="307777"/>
-            </a:xfrm>
-            <a:prstGeom prst="rect">
-              <a:avLst/>
-            </a:prstGeom>
-            <a:noFill/>
-          </p:spPr>
-          <p:txBody>
-            <a:bodyPr wrap="square" rtlCol="0">
-              <a:spAutoFit/>
-            </a:bodyPr>
-            <a:lstStyle/>
-            <a:p>
-              <a:r>
-                <a:rPr lang="de-DE" sz="1400" dirty="0"/>
-                <a:t>„blau“</a:t>
-              </a:r>
-            </a:p>
-          </p:txBody>
-        </p:sp>
-        <p:sp>
-          <p:nvSpPr>
-            <p:cNvPr id="15" name="Textfeld 14">
-              <a:extLst>
-                <a:ext uri="{FF2B5EF4-FFF2-40B4-BE49-F238E27FC236}">
-                  <a16:creationId xmlns:a16="http://schemas.microsoft.com/office/drawing/2014/main" id="{9AFEFA15-3F26-42F7-867F-B5C97A0CB947}"/>
-                </a:ext>
-              </a:extLst>
-            </p:cNvPr>
-            <p:cNvSpPr txBox="1"/>
-            <p:nvPr/>
-          </p:nvSpPr>
-          <p:spPr>
-            <a:xfrm>
-              <a:off x="3566735" y="4388147"/>
-              <a:ext cx="866273" cy="307777"/>
-            </a:xfrm>
-            <a:prstGeom prst="rect">
-              <a:avLst/>
-            </a:prstGeom>
-            <a:noFill/>
-          </p:spPr>
-          <p:txBody>
-            <a:bodyPr wrap="square" rtlCol="0">
-              <a:spAutoFit/>
-            </a:bodyPr>
-            <a:lstStyle/>
-            <a:p>
-              <a:r>
-                <a:rPr lang="de-DE" sz="1400" dirty="0"/>
-                <a:t>„herr“</a:t>
-              </a:r>
-            </a:p>
-          </p:txBody>
-        </p:sp>
-        <p:sp>
-          <p:nvSpPr>
-            <p:cNvPr id="16" name="Textfeld 15">
-              <a:extLst>
-                <a:ext uri="{FF2B5EF4-FFF2-40B4-BE49-F238E27FC236}">
-                  <a16:creationId xmlns:a16="http://schemas.microsoft.com/office/drawing/2014/main" id="{7C3B4127-4232-4BCF-B747-574D97FCA728}"/>
-                </a:ext>
-              </a:extLst>
-            </p:cNvPr>
-            <p:cNvSpPr txBox="1"/>
-            <p:nvPr/>
-          </p:nvSpPr>
-          <p:spPr>
-            <a:xfrm>
-              <a:off x="3576640" y="4670687"/>
-              <a:ext cx="866273" cy="307777"/>
-            </a:xfrm>
-            <a:prstGeom prst="rect">
-              <a:avLst/>
-            </a:prstGeom>
-            <a:noFill/>
-          </p:spPr>
-          <p:txBody>
-            <a:bodyPr wrap="square" rtlCol="0">
-              <a:spAutoFit/>
-            </a:bodyPr>
-            <a:lstStyle/>
-            <a:p>
-              <a:r>
-                <a:rPr lang="de-DE" sz="1400" dirty="0"/>
-                <a:t>„hos“</a:t>
-              </a:r>
-            </a:p>
-          </p:txBody>
-        </p:sp>
-        <p:sp>
-          <p:nvSpPr>
-            <p:cNvPr id="17" name="Textfeld 16">
-              <a:extLst>
-                <a:ext uri="{FF2B5EF4-FFF2-40B4-BE49-F238E27FC236}">
-                  <a16:creationId xmlns:a16="http://schemas.microsoft.com/office/drawing/2014/main" id="{CE108506-6EF0-450A-9669-FF1CC0DB5BDB}"/>
-                </a:ext>
-              </a:extLst>
-            </p:cNvPr>
-            <p:cNvSpPr txBox="1"/>
-            <p:nvPr/>
-          </p:nvSpPr>
-          <p:spPr>
-            <a:xfrm>
-              <a:off x="3560342" y="4954791"/>
-              <a:ext cx="866273" cy="307777"/>
-            </a:xfrm>
-            <a:prstGeom prst="rect">
-              <a:avLst/>
-            </a:prstGeom>
-            <a:noFill/>
-          </p:spPr>
-          <p:txBody>
-            <a:bodyPr wrap="square" rtlCol="0">
-              <a:spAutoFit/>
-            </a:bodyPr>
-            <a:lstStyle/>
-            <a:p>
-              <a:r>
-                <a:rPr lang="de-DE" sz="1400" dirty="0"/>
-                <a:t>„levis“</a:t>
-              </a:r>
-            </a:p>
-          </p:txBody>
-        </p:sp>
-        <p:cxnSp>
-          <p:nvCxnSpPr>
-            <p:cNvPr id="19" name="Gerade Verbindung mit Pfeil 18">
-              <a:extLst>
-                <a:ext uri="{FF2B5EF4-FFF2-40B4-BE49-F238E27FC236}">
-                  <a16:creationId xmlns:a16="http://schemas.microsoft.com/office/drawing/2014/main" id="{3A48BAB5-0CA9-41E1-8267-7CF204E5963E}"/>
-                </a:ext>
-              </a:extLst>
-            </p:cNvPr>
-            <p:cNvCxnSpPr/>
-            <p:nvPr/>
-          </p:nvCxnSpPr>
-          <p:spPr>
-            <a:xfrm>
-              <a:off x="5148512" y="4272209"/>
-              <a:ext cx="1812757" cy="0"/>
-            </a:xfrm>
-            <a:prstGeom prst="straightConnector1">
-              <a:avLst/>
-            </a:prstGeom>
-            <a:ln w="19050">
-              <a:solidFill>
-                <a:schemeClr val="tx1"/>
-              </a:solidFill>
-              <a:headEnd type="arrow" w="med" len="med"/>
-              <a:tailEnd type="arrow" w="med" len="med"/>
-            </a:ln>
-          </p:spPr>
-          <p:style>
-            <a:lnRef idx="1">
-              <a:schemeClr val="accent1"/>
-            </a:lnRef>
-            <a:fillRef idx="0">
-              <a:schemeClr val="accent1"/>
-            </a:fillRef>
-            <a:effectRef idx="0">
-              <a:schemeClr val="accent1"/>
-            </a:effectRef>
-            <a:fontRef idx="minor">
-              <a:schemeClr val="tx1"/>
-            </a:fontRef>
-          </p:style>
-        </p:cxnSp>
-        <p:cxnSp>
-          <p:nvCxnSpPr>
-            <p:cNvPr id="20" name="Gerade Verbindung mit Pfeil 19">
-              <a:extLst>
-                <a:ext uri="{FF2B5EF4-FFF2-40B4-BE49-F238E27FC236}">
-                  <a16:creationId xmlns:a16="http://schemas.microsoft.com/office/drawing/2014/main" id="{90D5E827-96FA-44B0-9089-FA7F661CED06}"/>
-                </a:ext>
-              </a:extLst>
-            </p:cNvPr>
-            <p:cNvCxnSpPr/>
-            <p:nvPr/>
-          </p:nvCxnSpPr>
-          <p:spPr>
-            <a:xfrm>
-              <a:off x="5151393" y="4537968"/>
-              <a:ext cx="1812757" cy="0"/>
-            </a:xfrm>
-            <a:prstGeom prst="straightConnector1">
-              <a:avLst/>
-            </a:prstGeom>
-            <a:ln w="19050">
-              <a:solidFill>
-                <a:schemeClr val="tx1"/>
-              </a:solidFill>
-              <a:headEnd type="arrow" w="med" len="med"/>
-              <a:tailEnd type="arrow" w="med" len="med"/>
-            </a:ln>
-          </p:spPr>
-          <p:style>
-            <a:lnRef idx="1">
-              <a:schemeClr val="accent1"/>
-            </a:lnRef>
-            <a:fillRef idx="0">
-              <a:schemeClr val="accent1"/>
-            </a:fillRef>
-            <a:effectRef idx="0">
-              <a:schemeClr val="accent1"/>
-            </a:effectRef>
-            <a:fontRef idx="minor">
-              <a:schemeClr val="tx1"/>
-            </a:fontRef>
-          </p:style>
-        </p:cxnSp>
-        <p:cxnSp>
-          <p:nvCxnSpPr>
-            <p:cNvPr id="21" name="Gerade Verbindung mit Pfeil 20">
-              <a:extLst>
-                <a:ext uri="{FF2B5EF4-FFF2-40B4-BE49-F238E27FC236}">
-                  <a16:creationId xmlns:a16="http://schemas.microsoft.com/office/drawing/2014/main" id="{6B82DA9D-CBCC-49AC-8CA5-6BA217F4B5F1}"/>
-                </a:ext>
-              </a:extLst>
-            </p:cNvPr>
-            <p:cNvCxnSpPr/>
-            <p:nvPr/>
-          </p:nvCxnSpPr>
-          <p:spPr>
-            <a:xfrm>
-              <a:off x="5148511" y="4817517"/>
-              <a:ext cx="1812757" cy="0"/>
-            </a:xfrm>
-            <a:prstGeom prst="straightConnector1">
-              <a:avLst/>
-            </a:prstGeom>
-            <a:ln w="19050">
-              <a:solidFill>
-                <a:schemeClr val="tx1"/>
-              </a:solidFill>
-              <a:headEnd type="arrow" w="med" len="med"/>
-              <a:tailEnd type="arrow" w="med" len="med"/>
-            </a:ln>
-          </p:spPr>
-          <p:style>
-            <a:lnRef idx="1">
-              <a:schemeClr val="accent1"/>
-            </a:lnRef>
-            <a:fillRef idx="0">
-              <a:schemeClr val="accent1"/>
-            </a:fillRef>
-            <a:effectRef idx="0">
-              <a:schemeClr val="accent1"/>
-            </a:effectRef>
-            <a:fontRef idx="minor">
-              <a:schemeClr val="tx1"/>
-            </a:fontRef>
-          </p:style>
-        </p:cxnSp>
-        <p:cxnSp>
-          <p:nvCxnSpPr>
-            <p:cNvPr id="22" name="Gerade Verbindung mit Pfeil 21">
-              <a:extLst>
-                <a:ext uri="{FF2B5EF4-FFF2-40B4-BE49-F238E27FC236}">
-                  <a16:creationId xmlns:a16="http://schemas.microsoft.com/office/drawing/2014/main" id="{C7D3D354-5F5F-4746-B493-D24373ED2AD8}"/>
-                </a:ext>
-              </a:extLst>
-            </p:cNvPr>
-            <p:cNvCxnSpPr/>
-            <p:nvPr/>
-          </p:nvCxnSpPr>
-          <p:spPr>
-            <a:xfrm>
-              <a:off x="5148511" y="5090342"/>
-              <a:ext cx="1812757" cy="0"/>
-            </a:xfrm>
-            <a:prstGeom prst="straightConnector1">
-              <a:avLst/>
-            </a:prstGeom>
-            <a:ln w="19050">
-              <a:solidFill>
-                <a:schemeClr val="tx1"/>
-              </a:solidFill>
-              <a:headEnd type="arrow" w="med" len="med"/>
-              <a:tailEnd type="arrow" w="med" len="med"/>
-            </a:ln>
-          </p:spPr>
-          <p:style>
-            <a:lnRef idx="1">
-              <a:schemeClr val="accent1"/>
-            </a:lnRef>
-            <a:fillRef idx="0">
-              <a:schemeClr val="accent1"/>
-            </a:fillRef>
-            <a:effectRef idx="0">
-              <a:schemeClr val="accent1"/>
-            </a:effectRef>
-            <a:fontRef idx="minor">
-              <a:schemeClr val="tx1"/>
-            </a:fontRef>
-          </p:style>
-        </p:cxnSp>
-        <p:sp>
-          <p:nvSpPr>
-            <p:cNvPr id="25" name="Rechteck: abgerundete Ecken 24">
-              <a:extLst>
-                <a:ext uri="{FF2B5EF4-FFF2-40B4-BE49-F238E27FC236}">
-                  <a16:creationId xmlns:a16="http://schemas.microsoft.com/office/drawing/2014/main" id="{4045F874-1C67-4459-8A0F-1231F8BA428C}"/>
-                </a:ext>
-              </a:extLst>
-            </p:cNvPr>
-            <p:cNvSpPr/>
-            <p:nvPr/>
-          </p:nvSpPr>
-          <p:spPr>
-            <a:xfrm>
-              <a:off x="2678215" y="1809722"/>
-              <a:ext cx="2865335" cy="369332"/>
-            </a:xfrm>
-            <a:prstGeom prst="roundRect">
-              <a:avLst>
-                <a:gd name="adj" fmla="val 50000"/>
-              </a:avLst>
-            </a:prstGeom>
-            <a:noFill/>
-            <a:ln>
-              <a:solidFill>
-                <a:schemeClr val="bg1">
-                  <a:lumMod val="75000"/>
-                </a:schemeClr>
-              </a:solidFill>
-            </a:ln>
-          </p:spPr>
-          <p:style>
-            <a:lnRef idx="2">
-              <a:schemeClr val="accent1">
-                <a:shade val="50000"/>
-              </a:schemeClr>
-            </a:lnRef>
-            <a:fillRef idx="1">
-              <a:schemeClr val="accent1"/>
-            </a:fillRef>
-            <a:effectRef idx="0">
-              <a:schemeClr val="accent1"/>
-            </a:effectRef>
-            <a:fontRef idx="minor">
-              <a:schemeClr val="lt1"/>
-            </a:fontRef>
-          </p:style>
-          <p:txBody>
-            <a:bodyPr rtlCol="0" anchor="ctr"/>
-            <a:lstStyle/>
-            <a:p>
-              <a:pPr algn="ctr"/>
-              <a:endParaRPr lang="de-DE"/>
-            </a:p>
-          </p:txBody>
-        </p:sp>
-        <p:pic>
-          <p:nvPicPr>
-            <p:cNvPr id="28" name="Grafik 27" descr="Lupe mit einfarbiger Füllung">
-              <a:extLst>
-                <a:ext uri="{FF2B5EF4-FFF2-40B4-BE49-F238E27FC236}">
-                  <a16:creationId xmlns:a16="http://schemas.microsoft.com/office/drawing/2014/main" id="{A0E8925A-9136-4514-90C5-541A9E979082}"/>
-                </a:ext>
-              </a:extLst>
-            </p:cNvPr>
-            <p:cNvPicPr>
-              <a:picLocks noChangeAspect="1"/>
-            </p:cNvPicPr>
-            <p:nvPr/>
-          </p:nvPicPr>
-          <p:blipFill>
-            <a:blip r:embed="rId2">
-              <a:extLst>
-                <a:ext uri="{28A0092B-C50C-407E-A947-70E740481C1C}">
-                  <a14:useLocalDpi xmlns:a14="http://schemas.microsoft.com/office/drawing/2010/main" val="0"/>
-                </a:ext>
-                <a:ext uri="{96DAC541-7B7A-43D3-8B79-37D633B846F1}">
-                  <asvg:svgBlip xmlns:asvg="http://schemas.microsoft.com/office/drawing/2016/SVG/main" r:embed="rId3"/>
-                </a:ext>
-              </a:extLst>
-            </a:blip>
-            <a:stretch>
-              <a:fillRect/>
-            </a:stretch>
-          </p:blipFill>
-          <p:spPr>
-            <a:xfrm>
-              <a:off x="5092490" y="1837977"/>
-              <a:ext cx="312821" cy="312821"/>
-            </a:xfrm>
-            <a:prstGeom prst="rect">
-              <a:avLst/>
-            </a:prstGeom>
-          </p:spPr>
-        </p:pic>
-        <p:sp>
-          <p:nvSpPr>
-            <p:cNvPr id="29" name="Textfeld 28">
-              <a:extLst>
-                <a:ext uri="{FF2B5EF4-FFF2-40B4-BE49-F238E27FC236}">
-                  <a16:creationId xmlns:a16="http://schemas.microsoft.com/office/drawing/2014/main" id="{378EABF9-68D8-4C2A-BD85-54896A362DA5}"/>
-                </a:ext>
-              </a:extLst>
-            </p:cNvPr>
-            <p:cNvSpPr txBox="1"/>
-            <p:nvPr/>
-          </p:nvSpPr>
-          <p:spPr>
-            <a:xfrm>
-              <a:off x="2750028" y="1860274"/>
-              <a:ext cx="2477822" cy="307777"/>
-            </a:xfrm>
-            <a:prstGeom prst="rect">
-              <a:avLst/>
-            </a:prstGeom>
-            <a:noFill/>
-          </p:spPr>
-          <p:txBody>
-            <a:bodyPr wrap="square" rtlCol="0" anchor="ctr">
-              <a:spAutoFit/>
-            </a:bodyPr>
-            <a:lstStyle/>
-            <a:p>
-              <a:r>
-                <a:rPr lang="de-DE" sz="1400" dirty="0"/>
-                <a:t>blaue herrenhose levi‘s®</a:t>
-              </a:r>
-            </a:p>
-          </p:txBody>
-        </p:sp>
-        <p:sp>
-          <p:nvSpPr>
-            <p:cNvPr id="30" name="Flussdiagramm: Mehrere Dokumente 29">
-              <a:extLst>
-                <a:ext uri="{FF2B5EF4-FFF2-40B4-BE49-F238E27FC236}">
-                  <a16:creationId xmlns:a16="http://schemas.microsoft.com/office/drawing/2014/main" id="{D9480E90-D50F-4B0F-A5FD-7C3B955C119D}"/>
-                </a:ext>
-              </a:extLst>
-            </p:cNvPr>
-            <p:cNvSpPr/>
-            <p:nvPr/>
-          </p:nvSpPr>
-          <p:spPr>
-            <a:xfrm>
-              <a:off x="9086854" y="1387275"/>
-              <a:ext cx="1071174" cy="1412071"/>
-            </a:xfrm>
-            <a:prstGeom prst="flowChartMultidocument">
-              <a:avLst/>
-            </a:prstGeom>
-            <a:solidFill>
-              <a:schemeClr val="bg1"/>
-            </a:solidFill>
-            <a:ln w="19050">
-              <a:solidFill>
-                <a:schemeClr val="bg1">
-                  <a:lumMod val="50000"/>
-                </a:schemeClr>
-              </a:solidFill>
-            </a:ln>
-          </p:spPr>
-          <p:style>
-            <a:lnRef idx="2">
-              <a:schemeClr val="accent1">
-                <a:shade val="50000"/>
-              </a:schemeClr>
-            </a:lnRef>
-            <a:fillRef idx="1">
-              <a:schemeClr val="accent1"/>
-            </a:fillRef>
-            <a:effectRef idx="0">
-              <a:schemeClr val="accent1"/>
-            </a:effectRef>
-            <a:fontRef idx="minor">
-              <a:schemeClr val="lt1"/>
-            </a:fontRef>
-          </p:style>
-          <p:txBody>
-            <a:bodyPr rtlCol="0" anchor="ctr"/>
-            <a:lstStyle/>
-            <a:p>
-              <a:pPr algn="ctr"/>
-              <a:endParaRPr lang="de-DE"/>
-            </a:p>
-          </p:txBody>
-        </p:sp>
-        <p:sp>
-          <p:nvSpPr>
-            <p:cNvPr id="31" name="Flussdiagramm: Mehrere Dokumente 30">
-              <a:extLst>
-                <a:ext uri="{FF2B5EF4-FFF2-40B4-BE49-F238E27FC236}">
-                  <a16:creationId xmlns:a16="http://schemas.microsoft.com/office/drawing/2014/main" id="{695427EE-595F-4BED-8473-4BD94CBCE0F7}"/>
-                </a:ext>
-              </a:extLst>
-            </p:cNvPr>
-            <p:cNvSpPr/>
-            <p:nvPr/>
-          </p:nvSpPr>
-          <p:spPr>
-            <a:xfrm>
-              <a:off x="6843781" y="1387274"/>
-              <a:ext cx="1071174" cy="1412071"/>
-            </a:xfrm>
-            <a:prstGeom prst="flowChartMultidocument">
-              <a:avLst/>
-            </a:prstGeom>
-            <a:solidFill>
-              <a:schemeClr val="bg1">
-                <a:lumMod val="85000"/>
-              </a:schemeClr>
-            </a:solidFill>
-            <a:ln w="19050">
-              <a:solidFill>
-                <a:schemeClr val="bg1">
-                  <a:lumMod val="50000"/>
-                </a:schemeClr>
-              </a:solidFill>
-            </a:ln>
-          </p:spPr>
-          <p:style>
-            <a:lnRef idx="2">
-              <a:schemeClr val="accent1">
-                <a:shade val="50000"/>
-              </a:schemeClr>
-            </a:lnRef>
-            <a:fillRef idx="1">
-              <a:schemeClr val="accent1"/>
-            </a:fillRef>
-            <a:effectRef idx="0">
-              <a:schemeClr val="accent1"/>
-            </a:effectRef>
-            <a:fontRef idx="minor">
-              <a:schemeClr val="lt1"/>
-            </a:fontRef>
-          </p:style>
-          <p:txBody>
-            <a:bodyPr rtlCol="0" anchor="ctr"/>
-            <a:lstStyle/>
-            <a:p>
-              <a:pPr algn="ctr"/>
-              <a:endParaRPr lang="de-DE"/>
-            </a:p>
-          </p:txBody>
-        </p:sp>
-        <p:sp>
-          <p:nvSpPr>
-            <p:cNvPr id="32" name="Flussdiagramm: Mehrere Dokumente 31">
-              <a:extLst>
-                <a:ext uri="{FF2B5EF4-FFF2-40B4-BE49-F238E27FC236}">
-                  <a16:creationId xmlns:a16="http://schemas.microsoft.com/office/drawing/2014/main" id="{C485454D-EA0D-47E7-9F53-FFBA3F905F45}"/>
-                </a:ext>
-              </a:extLst>
-            </p:cNvPr>
-            <p:cNvSpPr/>
-            <p:nvPr/>
-          </p:nvSpPr>
-          <p:spPr>
-            <a:xfrm>
-              <a:off x="7060782" y="3880352"/>
-              <a:ext cx="1137739" cy="1560780"/>
-            </a:xfrm>
-            <a:prstGeom prst="flowChartMultidocument">
-              <a:avLst/>
-            </a:prstGeom>
-            <a:solidFill>
-              <a:schemeClr val="bg1">
-                <a:lumMod val="85000"/>
-              </a:schemeClr>
-            </a:solidFill>
-            <a:ln w="19050">
-              <a:solidFill>
-                <a:schemeClr val="bg1">
-                  <a:lumMod val="50000"/>
-                </a:schemeClr>
-              </a:solidFill>
-            </a:ln>
-          </p:spPr>
-          <p:style>
-            <a:lnRef idx="2">
-              <a:schemeClr val="accent1">
-                <a:shade val="50000"/>
-              </a:schemeClr>
-            </a:lnRef>
-            <a:fillRef idx="1">
-              <a:schemeClr val="accent1"/>
-            </a:fillRef>
-            <a:effectRef idx="0">
-              <a:schemeClr val="accent1"/>
-            </a:effectRef>
-            <a:fontRef idx="minor">
-              <a:schemeClr val="lt1"/>
-            </a:fontRef>
-          </p:style>
-          <p:txBody>
-            <a:bodyPr rtlCol="0" anchor="ctr"/>
-            <a:lstStyle/>
-            <a:p>
-              <a:pPr algn="ctr"/>
-              <a:endParaRPr lang="de-DE"/>
-            </a:p>
-          </p:txBody>
-        </p:sp>
-        <p:sp>
-          <p:nvSpPr>
-            <p:cNvPr id="33" name="Flussdiagramm: Mehrere Dokumente 32">
-              <a:extLst>
-                <a:ext uri="{FF2B5EF4-FFF2-40B4-BE49-F238E27FC236}">
-                  <a16:creationId xmlns:a16="http://schemas.microsoft.com/office/drawing/2014/main" id="{21BDA087-665C-4E03-8F7E-FC17B50527DC}"/>
-                </a:ext>
-              </a:extLst>
-            </p:cNvPr>
-            <p:cNvSpPr/>
-            <p:nvPr/>
-          </p:nvSpPr>
-          <p:spPr>
-            <a:xfrm>
-              <a:off x="8547434" y="3890298"/>
-              <a:ext cx="1137739" cy="1560780"/>
-            </a:xfrm>
-            <a:prstGeom prst="flowChartMultidocument">
-              <a:avLst/>
-            </a:prstGeom>
-            <a:solidFill>
-              <a:schemeClr val="bg1"/>
-            </a:solidFill>
-            <a:ln w="19050">
-              <a:solidFill>
-                <a:schemeClr val="bg1">
-                  <a:lumMod val="50000"/>
-                </a:schemeClr>
-              </a:solidFill>
-            </a:ln>
-          </p:spPr>
-          <p:style>
-            <a:lnRef idx="2">
-              <a:schemeClr val="accent1">
-                <a:shade val="50000"/>
-              </a:schemeClr>
-            </a:lnRef>
-            <a:fillRef idx="1">
-              <a:schemeClr val="accent1"/>
-            </a:fillRef>
-            <a:effectRef idx="0">
-              <a:schemeClr val="accent1"/>
-            </a:effectRef>
-            <a:fontRef idx="minor">
-              <a:schemeClr val="lt1"/>
-            </a:fontRef>
-          </p:style>
-          <p:txBody>
-            <a:bodyPr rtlCol="0" anchor="ctr"/>
-            <a:lstStyle/>
-            <a:p>
-              <a:pPr algn="ctr"/>
-              <a:endParaRPr lang="de-DE"/>
-            </a:p>
-          </p:txBody>
-        </p:sp>
-        <p:cxnSp>
-          <p:nvCxnSpPr>
-            <p:cNvPr id="35" name="Gerader Verbinder 34">
-              <a:extLst>
-                <a:ext uri="{FF2B5EF4-FFF2-40B4-BE49-F238E27FC236}">
-                  <a16:creationId xmlns:a16="http://schemas.microsoft.com/office/drawing/2014/main" id="{74F723C9-27EE-4449-B5C0-F81A967C6BF0}"/>
-                </a:ext>
-              </a:extLst>
-            </p:cNvPr>
-            <p:cNvCxnSpPr/>
-            <p:nvPr/>
-          </p:nvCxnSpPr>
-          <p:spPr>
-            <a:xfrm flipH="1">
-              <a:off x="6071185" y="510339"/>
-              <a:ext cx="49630" cy="5372100"/>
-            </a:xfrm>
-            <a:prstGeom prst="line">
-              <a:avLst/>
-            </a:prstGeom>
-            <a:ln w="28575">
-              <a:solidFill>
-                <a:schemeClr val="bg1">
-                  <a:lumMod val="50000"/>
-                </a:schemeClr>
-              </a:solidFill>
-              <a:prstDash val="dash"/>
-            </a:ln>
-          </p:spPr>
-          <p:style>
-            <a:lnRef idx="1">
-              <a:schemeClr val="accent1"/>
-            </a:lnRef>
-            <a:fillRef idx="0">
-              <a:schemeClr val="accent1"/>
-            </a:fillRef>
-            <a:effectRef idx="0">
-              <a:schemeClr val="accent1"/>
-            </a:effectRef>
-            <a:fontRef idx="minor">
-              <a:schemeClr val="tx1"/>
-            </a:fontRef>
-          </p:style>
-        </p:cxnSp>
-        <p:sp>
-          <p:nvSpPr>
-            <p:cNvPr id="38" name="Textfeld 37">
-              <a:extLst>
-                <a:ext uri="{FF2B5EF4-FFF2-40B4-BE49-F238E27FC236}">
-                  <a16:creationId xmlns:a16="http://schemas.microsoft.com/office/drawing/2014/main" id="{839CAEF5-09F5-466C-93B7-DF1539790899}"/>
-                </a:ext>
-              </a:extLst>
-            </p:cNvPr>
-            <p:cNvSpPr txBox="1"/>
-            <p:nvPr/>
-          </p:nvSpPr>
-          <p:spPr>
-            <a:xfrm>
-              <a:off x="7246018" y="4118321"/>
-              <a:ext cx="866273" cy="307777"/>
-            </a:xfrm>
-            <a:prstGeom prst="rect">
-              <a:avLst/>
-            </a:prstGeom>
-            <a:noFill/>
-          </p:spPr>
-          <p:txBody>
-            <a:bodyPr wrap="square" rtlCol="0">
-              <a:spAutoFit/>
-            </a:bodyPr>
-            <a:lstStyle/>
-            <a:p>
-              <a:r>
-                <a:rPr lang="de-DE" sz="1400" dirty="0"/>
-                <a:t>„blau“</a:t>
-              </a:r>
-            </a:p>
-          </p:txBody>
-        </p:sp>
-        <p:sp>
-          <p:nvSpPr>
-            <p:cNvPr id="40" name="Textfeld 39">
-              <a:extLst>
-                <a:ext uri="{FF2B5EF4-FFF2-40B4-BE49-F238E27FC236}">
-                  <a16:creationId xmlns:a16="http://schemas.microsoft.com/office/drawing/2014/main" id="{1B9B89D2-ACFA-490D-90F3-DBACE54F5D61}"/>
-                </a:ext>
-              </a:extLst>
-            </p:cNvPr>
-            <p:cNvSpPr txBox="1"/>
-            <p:nvPr/>
-          </p:nvSpPr>
-          <p:spPr>
-            <a:xfrm>
-              <a:off x="7226714" y="4380087"/>
-              <a:ext cx="866273" cy="307777"/>
-            </a:xfrm>
-            <a:prstGeom prst="rect">
-              <a:avLst/>
-            </a:prstGeom>
-            <a:noFill/>
-          </p:spPr>
-          <p:txBody>
-            <a:bodyPr wrap="square" rtlCol="0">
-              <a:spAutoFit/>
-            </a:bodyPr>
-            <a:lstStyle/>
-            <a:p>
-              <a:r>
-                <a:rPr lang="de-DE" sz="1400" dirty="0"/>
-                <a:t>„herr“</a:t>
-              </a:r>
-            </a:p>
-          </p:txBody>
-        </p:sp>
-        <p:sp>
-          <p:nvSpPr>
-            <p:cNvPr id="42" name="Textfeld 41">
-              <a:extLst>
-                <a:ext uri="{FF2B5EF4-FFF2-40B4-BE49-F238E27FC236}">
-                  <a16:creationId xmlns:a16="http://schemas.microsoft.com/office/drawing/2014/main" id="{38931ED6-7540-42D5-AE98-694F27C3102A}"/>
-                </a:ext>
-              </a:extLst>
-            </p:cNvPr>
-            <p:cNvSpPr txBox="1"/>
-            <p:nvPr/>
-          </p:nvSpPr>
-          <p:spPr>
-            <a:xfrm>
-              <a:off x="7246018" y="4670688"/>
-              <a:ext cx="866273" cy="307777"/>
-            </a:xfrm>
-            <a:prstGeom prst="rect">
-              <a:avLst/>
-            </a:prstGeom>
-            <a:noFill/>
-          </p:spPr>
-          <p:txBody>
-            <a:bodyPr wrap="square" rtlCol="0">
-              <a:spAutoFit/>
-            </a:bodyPr>
-            <a:lstStyle/>
-            <a:p>
-              <a:r>
-                <a:rPr lang="de-DE" sz="1400" dirty="0"/>
-                <a:t>„hos“</a:t>
-              </a:r>
-            </a:p>
-          </p:txBody>
-        </p:sp>
-        <p:sp>
-          <p:nvSpPr>
-            <p:cNvPr id="43" name="Textfeld 42">
-              <a:extLst>
-                <a:ext uri="{FF2B5EF4-FFF2-40B4-BE49-F238E27FC236}">
-                  <a16:creationId xmlns:a16="http://schemas.microsoft.com/office/drawing/2014/main" id="{E6F2128C-E2B6-408B-A2ED-B69AA537A7DD}"/>
-                </a:ext>
-              </a:extLst>
-            </p:cNvPr>
-            <p:cNvSpPr txBox="1"/>
-            <p:nvPr/>
-          </p:nvSpPr>
-          <p:spPr>
-            <a:xfrm>
-              <a:off x="7236237" y="4952380"/>
-              <a:ext cx="866273" cy="307777"/>
-            </a:xfrm>
-            <a:prstGeom prst="rect">
-              <a:avLst/>
-            </a:prstGeom>
-            <a:noFill/>
-          </p:spPr>
-          <p:txBody>
-            <a:bodyPr wrap="square" rtlCol="0">
-              <a:spAutoFit/>
-            </a:bodyPr>
-            <a:lstStyle/>
-            <a:p>
-              <a:r>
-                <a:rPr lang="de-DE" sz="1400" dirty="0"/>
-                <a:t>„levis“</a:t>
-              </a:r>
-            </a:p>
-          </p:txBody>
-        </p:sp>
-        <p:sp>
-          <p:nvSpPr>
-            <p:cNvPr id="44" name="Textfeld 43">
-              <a:extLst>
-                <a:ext uri="{FF2B5EF4-FFF2-40B4-BE49-F238E27FC236}">
-                  <a16:creationId xmlns:a16="http://schemas.microsoft.com/office/drawing/2014/main" id="{C434777C-FFE1-4A13-9068-7135E41BEE45}"/>
-                </a:ext>
-              </a:extLst>
-            </p:cNvPr>
-            <p:cNvSpPr txBox="1"/>
-            <p:nvPr/>
-          </p:nvSpPr>
-          <p:spPr>
-            <a:xfrm>
-              <a:off x="8741444" y="4123187"/>
-              <a:ext cx="866273" cy="307777"/>
-            </a:xfrm>
-            <a:prstGeom prst="rect">
-              <a:avLst/>
-            </a:prstGeom>
-            <a:noFill/>
-          </p:spPr>
-          <p:txBody>
-            <a:bodyPr wrap="square" rtlCol="0">
-              <a:spAutoFit/>
-            </a:bodyPr>
-            <a:lstStyle/>
-            <a:p>
-              <a:r>
-                <a:rPr lang="de-DE" sz="1400" dirty="0"/>
-                <a:t>„grau“</a:t>
-              </a:r>
-            </a:p>
-          </p:txBody>
-        </p:sp>
-        <p:sp>
-          <p:nvSpPr>
-            <p:cNvPr id="45" name="Textfeld 44">
-              <a:extLst>
-                <a:ext uri="{FF2B5EF4-FFF2-40B4-BE49-F238E27FC236}">
-                  <a16:creationId xmlns:a16="http://schemas.microsoft.com/office/drawing/2014/main" id="{8D96B217-1D45-457D-A63A-47BFF8382689}"/>
-                </a:ext>
-              </a:extLst>
-            </p:cNvPr>
-            <p:cNvSpPr txBox="1"/>
-            <p:nvPr/>
-          </p:nvSpPr>
-          <p:spPr>
-            <a:xfrm>
-              <a:off x="8722139" y="4384793"/>
-              <a:ext cx="866273" cy="307777"/>
-            </a:xfrm>
-            <a:prstGeom prst="rect">
-              <a:avLst/>
-            </a:prstGeom>
-            <a:noFill/>
-          </p:spPr>
-          <p:txBody>
-            <a:bodyPr wrap="square" rtlCol="0">
-              <a:spAutoFit/>
-            </a:bodyPr>
-            <a:lstStyle/>
-            <a:p>
-              <a:r>
-                <a:rPr lang="de-DE" sz="1400" dirty="0"/>
-                <a:t>„dam“</a:t>
-              </a:r>
-            </a:p>
-          </p:txBody>
-        </p:sp>
-        <p:sp>
-          <p:nvSpPr>
-            <p:cNvPr id="46" name="Textfeld 45">
-              <a:extLst>
-                <a:ext uri="{FF2B5EF4-FFF2-40B4-BE49-F238E27FC236}">
-                  <a16:creationId xmlns:a16="http://schemas.microsoft.com/office/drawing/2014/main" id="{FF3ACBE3-93A3-4482-B27A-84E67838E29B}"/>
-                </a:ext>
-              </a:extLst>
-            </p:cNvPr>
-            <p:cNvSpPr txBox="1"/>
-            <p:nvPr/>
-          </p:nvSpPr>
-          <p:spPr>
-            <a:xfrm>
-              <a:off x="8741444" y="4670688"/>
-              <a:ext cx="866273" cy="307777"/>
-            </a:xfrm>
-            <a:prstGeom prst="rect">
-              <a:avLst/>
-            </a:prstGeom>
-            <a:noFill/>
-          </p:spPr>
-          <p:txBody>
-            <a:bodyPr wrap="square" rtlCol="0">
-              <a:spAutoFit/>
-            </a:bodyPr>
-            <a:lstStyle/>
-            <a:p>
-              <a:r>
-                <a:rPr lang="de-DE" sz="1400" dirty="0"/>
-                <a:t>„blus“</a:t>
-              </a:r>
-            </a:p>
-          </p:txBody>
-        </p:sp>
-        <p:sp>
-          <p:nvSpPr>
-            <p:cNvPr id="47" name="Textfeld 46">
-              <a:extLst>
-                <a:ext uri="{FF2B5EF4-FFF2-40B4-BE49-F238E27FC236}">
-                  <a16:creationId xmlns:a16="http://schemas.microsoft.com/office/drawing/2014/main" id="{4CC17A17-9AC6-450C-BDD9-06414FC3B300}"/>
-                </a:ext>
-              </a:extLst>
-            </p:cNvPr>
-            <p:cNvSpPr txBox="1"/>
-            <p:nvPr/>
-          </p:nvSpPr>
-          <p:spPr>
-            <a:xfrm>
-              <a:off x="8722139" y="4952380"/>
-              <a:ext cx="866273" cy="307777"/>
-            </a:xfrm>
-            <a:prstGeom prst="rect">
-              <a:avLst/>
-            </a:prstGeom>
-            <a:noFill/>
-          </p:spPr>
-          <p:txBody>
-            <a:bodyPr wrap="square" rtlCol="0">
-              <a:spAutoFit/>
-            </a:bodyPr>
-            <a:lstStyle/>
-            <a:p>
-              <a:r>
-                <a:rPr lang="de-DE" sz="1400" dirty="0"/>
-                <a:t>„levis“</a:t>
-              </a:r>
-            </a:p>
-          </p:txBody>
-        </p:sp>
-        <p:sp>
-          <p:nvSpPr>
-            <p:cNvPr id="48" name="Textfeld 47">
-              <a:extLst>
-                <a:ext uri="{FF2B5EF4-FFF2-40B4-BE49-F238E27FC236}">
-                  <a16:creationId xmlns:a16="http://schemas.microsoft.com/office/drawing/2014/main" id="{E4DC86BC-2617-4DC6-93B6-621740128402}"/>
-                </a:ext>
-              </a:extLst>
-            </p:cNvPr>
-            <p:cNvSpPr txBox="1"/>
-            <p:nvPr/>
-          </p:nvSpPr>
-          <p:spPr>
-            <a:xfrm>
-              <a:off x="6988085" y="1643456"/>
-              <a:ext cx="866273" cy="261610"/>
-            </a:xfrm>
-            <a:prstGeom prst="rect">
-              <a:avLst/>
-            </a:prstGeom>
-            <a:noFill/>
-          </p:spPr>
-          <p:txBody>
-            <a:bodyPr wrap="square" rtlCol="0">
-              <a:spAutoFit/>
-            </a:bodyPr>
-            <a:lstStyle/>
-            <a:p>
-              <a:r>
-                <a:rPr lang="de-DE" sz="1100" dirty="0"/>
-                <a:t>„blau“</a:t>
-              </a:r>
-            </a:p>
-          </p:txBody>
-        </p:sp>
-        <p:sp>
-          <p:nvSpPr>
-            <p:cNvPr id="49" name="Textfeld 48">
-              <a:extLst>
-                <a:ext uri="{FF2B5EF4-FFF2-40B4-BE49-F238E27FC236}">
-                  <a16:creationId xmlns:a16="http://schemas.microsoft.com/office/drawing/2014/main" id="{E0B14B28-0D35-4E74-8D7F-A1E104CC5D15}"/>
-                </a:ext>
-              </a:extLst>
-            </p:cNvPr>
-            <p:cNvSpPr txBox="1"/>
-            <p:nvPr/>
-          </p:nvSpPr>
-          <p:spPr>
-            <a:xfrm>
-              <a:off x="6968781" y="1867122"/>
-              <a:ext cx="866273" cy="261610"/>
-            </a:xfrm>
-            <a:prstGeom prst="rect">
-              <a:avLst/>
-            </a:prstGeom>
-            <a:noFill/>
-          </p:spPr>
-          <p:txBody>
-            <a:bodyPr wrap="square" rtlCol="0">
-              <a:spAutoFit/>
-            </a:bodyPr>
-            <a:lstStyle/>
-            <a:p>
-              <a:r>
-                <a:rPr lang="de-DE" sz="1100" dirty="0"/>
-                <a:t>„Herren“</a:t>
-              </a:r>
-            </a:p>
-          </p:txBody>
-        </p:sp>
-        <p:sp>
-          <p:nvSpPr>
-            <p:cNvPr id="50" name="Textfeld 49">
-              <a:extLst>
-                <a:ext uri="{FF2B5EF4-FFF2-40B4-BE49-F238E27FC236}">
-                  <a16:creationId xmlns:a16="http://schemas.microsoft.com/office/drawing/2014/main" id="{1A3AF519-192B-4F74-B86D-811B3E415161}"/>
-                </a:ext>
-              </a:extLst>
-            </p:cNvPr>
-            <p:cNvSpPr txBox="1"/>
-            <p:nvPr/>
-          </p:nvSpPr>
-          <p:spPr>
-            <a:xfrm>
-              <a:off x="6988085" y="2129148"/>
-              <a:ext cx="866273" cy="261610"/>
-            </a:xfrm>
-            <a:prstGeom prst="rect">
-              <a:avLst/>
-            </a:prstGeom>
-            <a:noFill/>
-          </p:spPr>
-          <p:txBody>
-            <a:bodyPr wrap="square" rtlCol="0">
-              <a:spAutoFit/>
-            </a:bodyPr>
-            <a:lstStyle/>
-            <a:p>
-              <a:r>
-                <a:rPr lang="de-DE" sz="1100" dirty="0"/>
-                <a:t>„Hosen“</a:t>
-              </a:r>
-            </a:p>
-          </p:txBody>
-        </p:sp>
-        <p:sp>
-          <p:nvSpPr>
-            <p:cNvPr id="51" name="Textfeld 50">
-              <a:extLst>
-                <a:ext uri="{FF2B5EF4-FFF2-40B4-BE49-F238E27FC236}">
-                  <a16:creationId xmlns:a16="http://schemas.microsoft.com/office/drawing/2014/main" id="{7F746909-B7BC-42BF-82D0-8261941E2E80}"/>
-                </a:ext>
-              </a:extLst>
-            </p:cNvPr>
-            <p:cNvSpPr txBox="1"/>
-            <p:nvPr/>
-          </p:nvSpPr>
-          <p:spPr>
-            <a:xfrm>
-              <a:off x="6964150" y="2378425"/>
-              <a:ext cx="866273" cy="261610"/>
-            </a:xfrm>
-            <a:prstGeom prst="rect">
-              <a:avLst/>
-            </a:prstGeom>
-            <a:noFill/>
-          </p:spPr>
-          <p:txBody>
-            <a:bodyPr wrap="square" rtlCol="0">
-              <a:spAutoFit/>
-            </a:bodyPr>
-            <a:lstStyle/>
-            <a:p>
-              <a:r>
-                <a:rPr lang="de-DE" sz="1100" dirty="0"/>
-                <a:t>„Levi‘s“</a:t>
-              </a:r>
-            </a:p>
-          </p:txBody>
-        </p:sp>
-        <p:sp>
-          <p:nvSpPr>
-            <p:cNvPr id="52" name="Textfeld 51">
-              <a:extLst>
-                <a:ext uri="{FF2B5EF4-FFF2-40B4-BE49-F238E27FC236}">
-                  <a16:creationId xmlns:a16="http://schemas.microsoft.com/office/drawing/2014/main" id="{69A9B7FF-CCC2-4718-8B77-976C9F25295E}"/>
-                </a:ext>
-              </a:extLst>
-            </p:cNvPr>
-            <p:cNvSpPr txBox="1"/>
-            <p:nvPr/>
-          </p:nvSpPr>
-          <p:spPr>
-            <a:xfrm>
-              <a:off x="9246140" y="1636608"/>
-              <a:ext cx="866273" cy="261610"/>
-            </a:xfrm>
-            <a:prstGeom prst="rect">
-              <a:avLst/>
-            </a:prstGeom>
-            <a:noFill/>
-          </p:spPr>
-          <p:txBody>
-            <a:bodyPr wrap="square" rtlCol="0">
-              <a:spAutoFit/>
-            </a:bodyPr>
-            <a:lstStyle/>
-            <a:p>
-              <a:r>
-                <a:rPr lang="de-DE" sz="1100" dirty="0"/>
-                <a:t>„grau“</a:t>
-              </a:r>
-            </a:p>
-          </p:txBody>
-        </p:sp>
-        <p:sp>
-          <p:nvSpPr>
-            <p:cNvPr id="53" name="Textfeld 52">
-              <a:extLst>
-                <a:ext uri="{FF2B5EF4-FFF2-40B4-BE49-F238E27FC236}">
-                  <a16:creationId xmlns:a16="http://schemas.microsoft.com/office/drawing/2014/main" id="{84174574-BB3C-451A-B858-D06777713923}"/>
-                </a:ext>
-              </a:extLst>
-            </p:cNvPr>
-            <p:cNvSpPr txBox="1"/>
-            <p:nvPr/>
-          </p:nvSpPr>
-          <p:spPr>
-            <a:xfrm>
-              <a:off x="9226836" y="1860274"/>
-              <a:ext cx="866273" cy="261610"/>
-            </a:xfrm>
-            <a:prstGeom prst="rect">
-              <a:avLst/>
-            </a:prstGeom>
-            <a:noFill/>
-          </p:spPr>
-          <p:txBody>
-            <a:bodyPr wrap="square" rtlCol="0">
-              <a:spAutoFit/>
-            </a:bodyPr>
-            <a:lstStyle/>
-            <a:p>
-              <a:r>
-                <a:rPr lang="de-DE" sz="1100" dirty="0"/>
-                <a:t>„Damen“</a:t>
-              </a:r>
-            </a:p>
-          </p:txBody>
-        </p:sp>
-        <p:sp>
-          <p:nvSpPr>
-            <p:cNvPr id="54" name="Textfeld 53">
-              <a:extLst>
-                <a:ext uri="{FF2B5EF4-FFF2-40B4-BE49-F238E27FC236}">
-                  <a16:creationId xmlns:a16="http://schemas.microsoft.com/office/drawing/2014/main" id="{20973450-C77B-4ABB-A588-A5351739478A}"/>
-                </a:ext>
-              </a:extLst>
-            </p:cNvPr>
-            <p:cNvSpPr txBox="1"/>
-            <p:nvPr/>
-          </p:nvSpPr>
-          <p:spPr>
-            <a:xfrm>
-              <a:off x="9246140" y="2122300"/>
-              <a:ext cx="866273" cy="261610"/>
-            </a:xfrm>
-            <a:prstGeom prst="rect">
-              <a:avLst/>
-            </a:prstGeom>
-            <a:noFill/>
-          </p:spPr>
-          <p:txBody>
-            <a:bodyPr wrap="square" rtlCol="0">
-              <a:spAutoFit/>
-            </a:bodyPr>
-            <a:lstStyle/>
-            <a:p>
-              <a:r>
-                <a:rPr lang="de-DE" sz="1100" dirty="0"/>
-                <a:t>„Blusen“</a:t>
-              </a:r>
-            </a:p>
-          </p:txBody>
-        </p:sp>
-        <p:sp>
-          <p:nvSpPr>
-            <p:cNvPr id="55" name="Textfeld 54">
-              <a:extLst>
-                <a:ext uri="{FF2B5EF4-FFF2-40B4-BE49-F238E27FC236}">
-                  <a16:creationId xmlns:a16="http://schemas.microsoft.com/office/drawing/2014/main" id="{73942919-D1E6-4757-A1A5-FFFD28BEE734}"/>
-                </a:ext>
-              </a:extLst>
-            </p:cNvPr>
-            <p:cNvSpPr txBox="1"/>
-            <p:nvPr/>
-          </p:nvSpPr>
-          <p:spPr>
-            <a:xfrm>
-              <a:off x="9222205" y="2371577"/>
-              <a:ext cx="866273" cy="261610"/>
-            </a:xfrm>
-            <a:prstGeom prst="rect">
-              <a:avLst/>
-            </a:prstGeom>
-            <a:noFill/>
-          </p:spPr>
-          <p:txBody>
-            <a:bodyPr wrap="square" rtlCol="0">
-              <a:spAutoFit/>
-            </a:bodyPr>
-            <a:lstStyle/>
-            <a:p>
-              <a:r>
-                <a:rPr lang="de-DE" sz="1100" dirty="0"/>
-                <a:t>„Levi‘s“</a:t>
-              </a:r>
-            </a:p>
-          </p:txBody>
-        </p:sp>
-      </p:grpSp>
-    </p:spTree>
-    <p:extLst>
-      <p:ext uri="{BB962C8B-B14F-4D97-AF65-F5344CB8AC3E}">
-        <p14:creationId xmlns:p14="http://schemas.microsoft.com/office/powerpoint/2010/main" val="1841519366"/>
-      </p:ext>
-    </p:extLst>
-  </p:cSld>
-  <p:clrMapOvr>
-    <a:masterClrMapping/>
-  </p:clrMapOvr>
-</p:sld>
-</file>
-
-<file path=ppt/slides/slide4.xml><?xml version="1.0" encoding="utf-8"?>
 <p:sld xmlns:a="http://schemas.openxmlformats.org/drawingml/2006/main" xmlns:r="http://schemas.openxmlformats.org/officeDocument/2006/relationships" xmlns:p="http://schemas.openxmlformats.org/presentationml/2006/main">
   <p:cSld>
     <p:spTree>
@@ -8766,6 +6858,949 @@
 </p:sld>
 </file>
 
+<file path=ppt/slides/slide4.xml><?xml version="1.0" encoding="utf-8"?>
+<p:sld xmlns:a="http://schemas.openxmlformats.org/drawingml/2006/main" xmlns:r="http://schemas.openxmlformats.org/officeDocument/2006/relationships" xmlns:p="http://schemas.openxmlformats.org/presentationml/2006/main">
+  <p:cSld>
+    <p:spTree>
+      <p:nvGrpSpPr>
+        <p:cNvPr id="1" name=""/>
+        <p:cNvGrpSpPr/>
+        <p:nvPr/>
+      </p:nvGrpSpPr>
+      <p:grpSpPr>
+        <a:xfrm>
+          <a:off x="0" y="0"/>
+          <a:ext cx="0" cy="0"/>
+          <a:chOff x="0" y="0"/>
+          <a:chExt cx="0" cy="0"/>
+        </a:xfrm>
+      </p:grpSpPr>
+      <p:sp>
+        <p:nvSpPr>
+          <p:cNvPr id="4" name="Rechteck 3">
+            <a:extLst>
+              <a:ext uri="{FF2B5EF4-FFF2-40B4-BE49-F238E27FC236}">
+                <a16:creationId xmlns:a16="http://schemas.microsoft.com/office/drawing/2014/main" id="{B537B749-4E80-450F-A7FA-EEC27B74B0F2}"/>
+              </a:ext>
+            </a:extLst>
+          </p:cNvPr>
+          <p:cNvSpPr/>
+          <p:nvPr/>
+        </p:nvSpPr>
+        <p:spPr>
+          <a:xfrm>
+            <a:off x="705394" y="4689535"/>
+            <a:ext cx="9818518" cy="1196699"/>
+          </a:xfrm>
+          <a:prstGeom prst="rect">
+            <a:avLst/>
+          </a:prstGeom>
+          <a:solidFill>
+            <a:schemeClr val="accent6">
+              <a:lumMod val="75000"/>
+            </a:schemeClr>
+          </a:solidFill>
+          <a:ln>
+            <a:noFill/>
+          </a:ln>
+        </p:spPr>
+        <p:style>
+          <a:lnRef idx="2">
+            <a:schemeClr val="accent1">
+              <a:shade val="50000"/>
+            </a:schemeClr>
+          </a:lnRef>
+          <a:fillRef idx="1">
+            <a:schemeClr val="accent1"/>
+          </a:fillRef>
+          <a:effectRef idx="0">
+            <a:schemeClr val="accent1"/>
+          </a:effectRef>
+          <a:fontRef idx="minor">
+            <a:schemeClr val="lt1"/>
+          </a:fontRef>
+        </p:style>
+        <p:txBody>
+          <a:bodyPr rtlCol="0" anchor="ctr"/>
+          <a:lstStyle/>
+          <a:p>
+            <a:pPr algn="ctr"/>
+            <a:r>
+              <a:rPr lang="de-DE" sz="4000" dirty="0"/>
+              <a:t>MCC Platform</a:t>
+            </a:r>
+          </a:p>
+        </p:txBody>
+      </p:sp>
+      <p:sp>
+        <p:nvSpPr>
+          <p:cNvPr id="5" name="Rechteck 4">
+            <a:extLst>
+              <a:ext uri="{FF2B5EF4-FFF2-40B4-BE49-F238E27FC236}">
+                <a16:creationId xmlns:a16="http://schemas.microsoft.com/office/drawing/2014/main" id="{56F21ECB-1DFA-43E4-B07E-C44A5D4C9546}"/>
+              </a:ext>
+            </a:extLst>
+          </p:cNvPr>
+          <p:cNvSpPr/>
+          <p:nvPr/>
+        </p:nvSpPr>
+        <p:spPr>
+          <a:xfrm>
+            <a:off x="892825" y="3051170"/>
+            <a:ext cx="6343998" cy="1213240"/>
+          </a:xfrm>
+          <a:prstGeom prst="rect">
+            <a:avLst/>
+          </a:prstGeom>
+          <a:solidFill>
+            <a:schemeClr val="accent6">
+              <a:lumMod val="75000"/>
+            </a:schemeClr>
+          </a:solidFill>
+          <a:ln>
+            <a:noFill/>
+          </a:ln>
+        </p:spPr>
+        <p:style>
+          <a:lnRef idx="2">
+            <a:schemeClr val="accent1">
+              <a:shade val="50000"/>
+            </a:schemeClr>
+          </a:lnRef>
+          <a:fillRef idx="1">
+            <a:schemeClr val="accent1"/>
+          </a:fillRef>
+          <a:effectRef idx="0">
+            <a:schemeClr val="accent1"/>
+          </a:effectRef>
+          <a:fontRef idx="minor">
+            <a:schemeClr val="lt1"/>
+          </a:fontRef>
+        </p:style>
+        <p:txBody>
+          <a:bodyPr rtlCol="0" anchor="ctr"/>
+          <a:lstStyle/>
+          <a:p>
+            <a:pPr algn="ctr"/>
+            <a:r>
+              <a:rPr lang="de-DE" sz="4000" dirty="0"/>
+              <a:t>Core Services - Production</a:t>
+            </a:r>
+          </a:p>
+        </p:txBody>
+      </p:sp>
+      <p:sp>
+        <p:nvSpPr>
+          <p:cNvPr id="6" name="Rechteck 5">
+            <a:extLst>
+              <a:ext uri="{FF2B5EF4-FFF2-40B4-BE49-F238E27FC236}">
+                <a16:creationId xmlns:a16="http://schemas.microsoft.com/office/drawing/2014/main" id="{9363A760-ED18-4053-9CC8-40DF552AEA7F}"/>
+              </a:ext>
+            </a:extLst>
+          </p:cNvPr>
+          <p:cNvSpPr/>
+          <p:nvPr/>
+        </p:nvSpPr>
+        <p:spPr>
+          <a:xfrm>
+            <a:off x="892825" y="1988171"/>
+            <a:ext cx="1484615" cy="775855"/>
+          </a:xfrm>
+          <a:prstGeom prst="rect">
+            <a:avLst/>
+          </a:prstGeom>
+          <a:solidFill>
+            <a:schemeClr val="accent6">
+              <a:lumMod val="75000"/>
+            </a:schemeClr>
+          </a:solidFill>
+          <a:ln>
+            <a:noFill/>
+          </a:ln>
+        </p:spPr>
+        <p:style>
+          <a:lnRef idx="2">
+            <a:schemeClr val="accent1">
+              <a:shade val="50000"/>
+            </a:schemeClr>
+          </a:lnRef>
+          <a:fillRef idx="1">
+            <a:schemeClr val="accent1"/>
+          </a:fillRef>
+          <a:effectRef idx="0">
+            <a:schemeClr val="accent1"/>
+          </a:effectRef>
+          <a:fontRef idx="minor">
+            <a:schemeClr val="lt1"/>
+          </a:fontRef>
+        </p:style>
+        <p:txBody>
+          <a:bodyPr rtlCol="0" anchor="ctr"/>
+          <a:lstStyle/>
+          <a:p>
+            <a:pPr algn="ctr"/>
+            <a:r>
+              <a:rPr lang="de-DE" sz="4000" dirty="0"/>
+              <a:t>PCS</a:t>
+            </a:r>
+          </a:p>
+        </p:txBody>
+      </p:sp>
+      <p:sp>
+        <p:nvSpPr>
+          <p:cNvPr id="7" name="Rechteck 6">
+            <a:extLst>
+              <a:ext uri="{FF2B5EF4-FFF2-40B4-BE49-F238E27FC236}">
+                <a16:creationId xmlns:a16="http://schemas.microsoft.com/office/drawing/2014/main" id="{1DEF0FA6-E785-4F58-9D8B-C8A46392424E}"/>
+              </a:ext>
+            </a:extLst>
+          </p:cNvPr>
+          <p:cNvSpPr/>
+          <p:nvPr/>
+        </p:nvSpPr>
+        <p:spPr>
+          <a:xfrm>
+            <a:off x="2592234" y="1988170"/>
+            <a:ext cx="1805595" cy="775855"/>
+          </a:xfrm>
+          <a:prstGeom prst="rect">
+            <a:avLst/>
+          </a:prstGeom>
+          <a:solidFill>
+            <a:schemeClr val="accent6">
+              <a:lumMod val="75000"/>
+            </a:schemeClr>
+          </a:solidFill>
+          <a:ln>
+            <a:noFill/>
+          </a:ln>
+        </p:spPr>
+        <p:style>
+          <a:lnRef idx="2">
+            <a:schemeClr val="accent1">
+              <a:shade val="50000"/>
+            </a:schemeClr>
+          </a:lnRef>
+          <a:fillRef idx="1">
+            <a:schemeClr val="accent1"/>
+          </a:fillRef>
+          <a:effectRef idx="0">
+            <a:schemeClr val="accent1"/>
+          </a:effectRef>
+          <a:fontRef idx="minor">
+            <a:schemeClr val="lt1"/>
+          </a:fontRef>
+        </p:style>
+        <p:txBody>
+          <a:bodyPr rtlCol="0" anchor="ctr"/>
+          <a:lstStyle/>
+          <a:p>
+            <a:pPr algn="ctr"/>
+            <a:r>
+              <a:rPr lang="de-DE" sz="4000" dirty="0"/>
+              <a:t>SCADA</a:t>
+            </a:r>
+          </a:p>
+        </p:txBody>
+      </p:sp>
+      <p:sp>
+        <p:nvSpPr>
+          <p:cNvPr id="8" name="Rechteck 7">
+            <a:extLst>
+              <a:ext uri="{FF2B5EF4-FFF2-40B4-BE49-F238E27FC236}">
+                <a16:creationId xmlns:a16="http://schemas.microsoft.com/office/drawing/2014/main" id="{41F2A3AC-AEDB-4002-8058-2C3129AA983C}"/>
+              </a:ext>
+            </a:extLst>
+          </p:cNvPr>
+          <p:cNvSpPr/>
+          <p:nvPr/>
+        </p:nvSpPr>
+        <p:spPr>
+          <a:xfrm>
+            <a:off x="705394" y="1421732"/>
+            <a:ext cx="9818518" cy="3058260"/>
+          </a:xfrm>
+          <a:prstGeom prst="rect">
+            <a:avLst/>
+          </a:prstGeom>
+          <a:noFill/>
+          <a:ln w="38100">
+            <a:solidFill>
+              <a:schemeClr val="tx1"/>
+            </a:solidFill>
+            <a:prstDash val="dash"/>
+          </a:ln>
+        </p:spPr>
+        <p:style>
+          <a:lnRef idx="2">
+            <a:schemeClr val="accent1">
+              <a:shade val="50000"/>
+            </a:schemeClr>
+          </a:lnRef>
+          <a:fillRef idx="1">
+            <a:schemeClr val="accent1"/>
+          </a:fillRef>
+          <a:effectRef idx="0">
+            <a:schemeClr val="accent1"/>
+          </a:effectRef>
+          <a:fontRef idx="minor">
+            <a:schemeClr val="lt1"/>
+          </a:fontRef>
+        </p:style>
+        <p:txBody>
+          <a:bodyPr rtlCol="0" anchor="ctr"/>
+          <a:lstStyle/>
+          <a:p>
+            <a:pPr algn="ctr"/>
+            <a:endParaRPr lang="de-DE"/>
+          </a:p>
+        </p:txBody>
+      </p:sp>
+      <p:sp>
+        <p:nvSpPr>
+          <p:cNvPr id="9" name="Textfeld 8">
+            <a:extLst>
+              <a:ext uri="{FF2B5EF4-FFF2-40B4-BE49-F238E27FC236}">
+                <a16:creationId xmlns:a16="http://schemas.microsoft.com/office/drawing/2014/main" id="{DF9564BE-FC1C-4273-B3EE-305A4E5C9325}"/>
+              </a:ext>
+            </a:extLst>
+          </p:cNvPr>
+          <p:cNvSpPr txBox="1"/>
+          <p:nvPr/>
+        </p:nvSpPr>
+        <p:spPr>
+          <a:xfrm>
+            <a:off x="3934294" y="1421732"/>
+            <a:ext cx="3360717" cy="461665"/>
+          </a:xfrm>
+          <a:prstGeom prst="rect">
+            <a:avLst/>
+          </a:prstGeom>
+          <a:noFill/>
+        </p:spPr>
+        <p:txBody>
+          <a:bodyPr wrap="square" rtlCol="0">
+            <a:spAutoFit/>
+          </a:bodyPr>
+          <a:lstStyle/>
+          <a:p>
+            <a:pPr algn="ctr"/>
+            <a:r>
+              <a:rPr lang="de-DE" sz="2400" b="1" dirty="0"/>
+              <a:t>Anwendungen</a:t>
+            </a:r>
+          </a:p>
+        </p:txBody>
+      </p:sp>
+      <p:sp>
+        <p:nvSpPr>
+          <p:cNvPr id="10" name="Rechteck 9">
+            <a:extLst>
+              <a:ext uri="{FF2B5EF4-FFF2-40B4-BE49-F238E27FC236}">
+                <a16:creationId xmlns:a16="http://schemas.microsoft.com/office/drawing/2014/main" id="{7B554AB0-21A4-4B49-ADC4-39E0EBA495E2}"/>
+              </a:ext>
+            </a:extLst>
+          </p:cNvPr>
+          <p:cNvSpPr/>
+          <p:nvPr/>
+        </p:nvSpPr>
+        <p:spPr>
+          <a:xfrm>
+            <a:off x="4612624" y="1988169"/>
+            <a:ext cx="2624200" cy="775855"/>
+          </a:xfrm>
+          <a:prstGeom prst="rect">
+            <a:avLst/>
+          </a:prstGeom>
+          <a:solidFill>
+            <a:schemeClr val="bg1">
+              <a:lumMod val="75000"/>
+            </a:schemeClr>
+          </a:solidFill>
+          <a:ln>
+            <a:noFill/>
+          </a:ln>
+        </p:spPr>
+        <p:style>
+          <a:lnRef idx="2">
+            <a:schemeClr val="accent1">
+              <a:shade val="50000"/>
+            </a:schemeClr>
+          </a:lnRef>
+          <a:fillRef idx="1">
+            <a:schemeClr val="accent1"/>
+          </a:fillRef>
+          <a:effectRef idx="0">
+            <a:schemeClr val="accent1"/>
+          </a:effectRef>
+          <a:fontRef idx="minor">
+            <a:schemeClr val="lt1"/>
+          </a:fontRef>
+        </p:style>
+        <p:txBody>
+          <a:bodyPr rtlCol="0" anchor="ctr"/>
+          <a:lstStyle/>
+          <a:p>
+            <a:pPr algn="ctr"/>
+            <a:r>
+              <a:rPr lang="de-DE" sz="4000" dirty="0"/>
+              <a:t>…</a:t>
+            </a:r>
+          </a:p>
+        </p:txBody>
+      </p:sp>
+      <p:sp>
+        <p:nvSpPr>
+          <p:cNvPr id="11" name="Rechteck 10">
+            <a:extLst>
+              <a:ext uri="{FF2B5EF4-FFF2-40B4-BE49-F238E27FC236}">
+                <a16:creationId xmlns:a16="http://schemas.microsoft.com/office/drawing/2014/main" id="{E49885CE-12D8-4050-8FAA-9D63EBBFF7C6}"/>
+              </a:ext>
+            </a:extLst>
+          </p:cNvPr>
+          <p:cNvSpPr/>
+          <p:nvPr/>
+        </p:nvSpPr>
+        <p:spPr>
+          <a:xfrm>
+            <a:off x="7451618" y="1988169"/>
+            <a:ext cx="2859332" cy="2266143"/>
+          </a:xfrm>
+          <a:prstGeom prst="rect">
+            <a:avLst/>
+          </a:prstGeom>
+          <a:solidFill>
+            <a:schemeClr val="bg1">
+              <a:lumMod val="75000"/>
+            </a:schemeClr>
+          </a:solidFill>
+          <a:ln>
+            <a:noFill/>
+          </a:ln>
+        </p:spPr>
+        <p:style>
+          <a:lnRef idx="2">
+            <a:schemeClr val="accent1">
+              <a:shade val="50000"/>
+            </a:schemeClr>
+          </a:lnRef>
+          <a:fillRef idx="1">
+            <a:schemeClr val="accent1"/>
+          </a:fillRef>
+          <a:effectRef idx="0">
+            <a:schemeClr val="accent1"/>
+          </a:effectRef>
+          <a:fontRef idx="minor">
+            <a:schemeClr val="lt1"/>
+          </a:fontRef>
+        </p:style>
+        <p:txBody>
+          <a:bodyPr rtlCol="0" anchor="ctr"/>
+          <a:lstStyle/>
+          <a:p>
+            <a:pPr algn="ctr"/>
+            <a:r>
+              <a:rPr lang="de-DE" sz="4000" dirty="0"/>
+              <a:t>…</a:t>
+            </a:r>
+          </a:p>
+        </p:txBody>
+      </p:sp>
+    </p:spTree>
+    <p:extLst>
+      <p:ext uri="{BB962C8B-B14F-4D97-AF65-F5344CB8AC3E}">
+        <p14:creationId xmlns:p14="http://schemas.microsoft.com/office/powerpoint/2010/main" val="1475755777"/>
+      </p:ext>
+    </p:extLst>
+  </p:cSld>
+  <p:clrMapOvr>
+    <a:masterClrMapping/>
+  </p:clrMapOvr>
+</p:sld>
+</file>
+
+<file path=ppt/slides/slide5.xml><?xml version="1.0" encoding="utf-8"?>
+<p:sld xmlns:a="http://schemas.openxmlformats.org/drawingml/2006/main" xmlns:r="http://schemas.openxmlformats.org/officeDocument/2006/relationships" xmlns:p="http://schemas.openxmlformats.org/presentationml/2006/main">
+  <p:cSld>
+    <p:spTree>
+      <p:nvGrpSpPr>
+        <p:cNvPr id="1" name=""/>
+        <p:cNvGrpSpPr/>
+        <p:nvPr/>
+      </p:nvGrpSpPr>
+      <p:grpSpPr>
+        <a:xfrm>
+          <a:off x="0" y="0"/>
+          <a:ext cx="0" cy="0"/>
+          <a:chOff x="0" y="0"/>
+          <a:chExt cx="0" cy="0"/>
+        </a:xfrm>
+      </p:grpSpPr>
+      <p:grpSp>
+        <p:nvGrpSpPr>
+          <p:cNvPr id="2" name="Gruppieren 1">
+            <a:extLst>
+              <a:ext uri="{FF2B5EF4-FFF2-40B4-BE49-F238E27FC236}">
+                <a16:creationId xmlns:a16="http://schemas.microsoft.com/office/drawing/2014/main" id="{364E4F5F-22C2-45B9-B108-4FC4A7977268}"/>
+              </a:ext>
+            </a:extLst>
+          </p:cNvPr>
+          <p:cNvGrpSpPr/>
+          <p:nvPr/>
+        </p:nvGrpSpPr>
+        <p:grpSpPr>
+          <a:xfrm>
+            <a:off x="1010194" y="1021682"/>
+            <a:ext cx="9818518" cy="4464502"/>
+            <a:chOff x="705394" y="1421732"/>
+            <a:chExt cx="9818518" cy="4464502"/>
+          </a:xfrm>
+        </p:grpSpPr>
+        <p:sp>
+          <p:nvSpPr>
+            <p:cNvPr id="4" name="Rechteck 3">
+              <a:extLst>
+                <a:ext uri="{FF2B5EF4-FFF2-40B4-BE49-F238E27FC236}">
+                  <a16:creationId xmlns:a16="http://schemas.microsoft.com/office/drawing/2014/main" id="{B537B749-4E80-450F-A7FA-EEC27B74B0F2}"/>
+                </a:ext>
+              </a:extLst>
+            </p:cNvPr>
+            <p:cNvSpPr/>
+            <p:nvPr/>
+          </p:nvSpPr>
+          <p:spPr>
+            <a:xfrm>
+              <a:off x="705394" y="4689535"/>
+              <a:ext cx="9818518" cy="1196699"/>
+            </a:xfrm>
+            <a:prstGeom prst="rect">
+              <a:avLst/>
+            </a:prstGeom>
+            <a:solidFill>
+              <a:schemeClr val="accent6">
+                <a:lumMod val="75000"/>
+              </a:schemeClr>
+            </a:solidFill>
+            <a:ln>
+              <a:noFill/>
+            </a:ln>
+          </p:spPr>
+          <p:style>
+            <a:lnRef idx="2">
+              <a:schemeClr val="accent1">
+                <a:shade val="50000"/>
+              </a:schemeClr>
+            </a:lnRef>
+            <a:fillRef idx="1">
+              <a:schemeClr val="accent1"/>
+            </a:fillRef>
+            <a:effectRef idx="0">
+              <a:schemeClr val="accent1"/>
+            </a:effectRef>
+            <a:fontRef idx="minor">
+              <a:schemeClr val="lt1"/>
+            </a:fontRef>
+          </p:style>
+          <p:txBody>
+            <a:bodyPr rtlCol="0" anchor="ctr"/>
+            <a:lstStyle/>
+            <a:p>
+              <a:pPr algn="ctr"/>
+              <a:r>
+                <a:rPr lang="de-DE" sz="4000" dirty="0"/>
+                <a:t>MCC Platform</a:t>
+              </a:r>
+            </a:p>
+          </p:txBody>
+        </p:sp>
+        <p:sp>
+          <p:nvSpPr>
+            <p:cNvPr id="5" name="Rechteck 4">
+              <a:extLst>
+                <a:ext uri="{FF2B5EF4-FFF2-40B4-BE49-F238E27FC236}">
+                  <a16:creationId xmlns:a16="http://schemas.microsoft.com/office/drawing/2014/main" id="{56F21ECB-1DFA-43E4-B07E-C44A5D4C9546}"/>
+                </a:ext>
+              </a:extLst>
+            </p:cNvPr>
+            <p:cNvSpPr/>
+            <p:nvPr/>
+          </p:nvSpPr>
+          <p:spPr>
+            <a:xfrm>
+              <a:off x="892825" y="3051170"/>
+              <a:ext cx="6343998" cy="1213240"/>
+            </a:xfrm>
+            <a:prstGeom prst="rect">
+              <a:avLst/>
+            </a:prstGeom>
+            <a:solidFill>
+              <a:schemeClr val="accent6">
+                <a:lumMod val="75000"/>
+              </a:schemeClr>
+            </a:solidFill>
+            <a:ln>
+              <a:noFill/>
+            </a:ln>
+          </p:spPr>
+          <p:style>
+            <a:lnRef idx="2">
+              <a:schemeClr val="accent1">
+                <a:shade val="50000"/>
+              </a:schemeClr>
+            </a:lnRef>
+            <a:fillRef idx="1">
+              <a:schemeClr val="accent1"/>
+            </a:fillRef>
+            <a:effectRef idx="0">
+              <a:schemeClr val="accent1"/>
+            </a:effectRef>
+            <a:fontRef idx="minor">
+              <a:schemeClr val="lt1"/>
+            </a:fontRef>
+          </p:style>
+          <p:txBody>
+            <a:bodyPr rtlCol="0" anchor="ctr"/>
+            <a:lstStyle/>
+            <a:p>
+              <a:pPr algn="ctr"/>
+              <a:r>
+                <a:rPr lang="de-DE" sz="4000" dirty="0"/>
+                <a:t>Core Services - Production</a:t>
+              </a:r>
+            </a:p>
+          </p:txBody>
+        </p:sp>
+        <p:sp>
+          <p:nvSpPr>
+            <p:cNvPr id="6" name="Rechteck 5">
+              <a:extLst>
+                <a:ext uri="{FF2B5EF4-FFF2-40B4-BE49-F238E27FC236}">
+                  <a16:creationId xmlns:a16="http://schemas.microsoft.com/office/drawing/2014/main" id="{9363A760-ED18-4053-9CC8-40DF552AEA7F}"/>
+                </a:ext>
+              </a:extLst>
+            </p:cNvPr>
+            <p:cNvSpPr/>
+            <p:nvPr/>
+          </p:nvSpPr>
+          <p:spPr>
+            <a:xfrm>
+              <a:off x="892825" y="1988171"/>
+              <a:ext cx="1484615" cy="775855"/>
+            </a:xfrm>
+            <a:prstGeom prst="rect">
+              <a:avLst/>
+            </a:prstGeom>
+            <a:solidFill>
+              <a:schemeClr val="accent6">
+                <a:lumMod val="75000"/>
+              </a:schemeClr>
+            </a:solidFill>
+            <a:ln>
+              <a:noFill/>
+            </a:ln>
+          </p:spPr>
+          <p:style>
+            <a:lnRef idx="2">
+              <a:schemeClr val="accent1">
+                <a:shade val="50000"/>
+              </a:schemeClr>
+            </a:lnRef>
+            <a:fillRef idx="1">
+              <a:schemeClr val="accent1"/>
+            </a:fillRef>
+            <a:effectRef idx="0">
+              <a:schemeClr val="accent1"/>
+            </a:effectRef>
+            <a:fontRef idx="minor">
+              <a:schemeClr val="lt1"/>
+            </a:fontRef>
+          </p:style>
+          <p:txBody>
+            <a:bodyPr rtlCol="0" anchor="ctr"/>
+            <a:lstStyle/>
+            <a:p>
+              <a:pPr algn="ctr"/>
+              <a:r>
+                <a:rPr lang="de-DE" sz="4000" dirty="0"/>
+                <a:t>PCS</a:t>
+              </a:r>
+            </a:p>
+          </p:txBody>
+        </p:sp>
+        <p:sp>
+          <p:nvSpPr>
+            <p:cNvPr id="7" name="Rechteck 6">
+              <a:extLst>
+                <a:ext uri="{FF2B5EF4-FFF2-40B4-BE49-F238E27FC236}">
+                  <a16:creationId xmlns:a16="http://schemas.microsoft.com/office/drawing/2014/main" id="{1DEF0FA6-E785-4F58-9D8B-C8A46392424E}"/>
+                </a:ext>
+              </a:extLst>
+            </p:cNvPr>
+            <p:cNvSpPr/>
+            <p:nvPr/>
+          </p:nvSpPr>
+          <p:spPr>
+            <a:xfrm>
+              <a:off x="2592234" y="1988170"/>
+              <a:ext cx="1805595" cy="775855"/>
+            </a:xfrm>
+            <a:prstGeom prst="rect">
+              <a:avLst/>
+            </a:prstGeom>
+            <a:solidFill>
+              <a:schemeClr val="accent6">
+                <a:lumMod val="75000"/>
+              </a:schemeClr>
+            </a:solidFill>
+            <a:ln>
+              <a:noFill/>
+            </a:ln>
+          </p:spPr>
+          <p:style>
+            <a:lnRef idx="2">
+              <a:schemeClr val="accent1">
+                <a:shade val="50000"/>
+              </a:schemeClr>
+            </a:lnRef>
+            <a:fillRef idx="1">
+              <a:schemeClr val="accent1"/>
+            </a:fillRef>
+            <a:effectRef idx="0">
+              <a:schemeClr val="accent1"/>
+            </a:effectRef>
+            <a:fontRef idx="minor">
+              <a:schemeClr val="lt1"/>
+            </a:fontRef>
+          </p:style>
+          <p:txBody>
+            <a:bodyPr rtlCol="0" anchor="ctr"/>
+            <a:lstStyle/>
+            <a:p>
+              <a:pPr algn="ctr"/>
+              <a:r>
+                <a:rPr lang="de-DE" sz="4000" dirty="0"/>
+                <a:t>SCADA</a:t>
+              </a:r>
+            </a:p>
+          </p:txBody>
+        </p:sp>
+        <p:sp>
+          <p:nvSpPr>
+            <p:cNvPr id="8" name="Rechteck 7">
+              <a:extLst>
+                <a:ext uri="{FF2B5EF4-FFF2-40B4-BE49-F238E27FC236}">
+                  <a16:creationId xmlns:a16="http://schemas.microsoft.com/office/drawing/2014/main" id="{41F2A3AC-AEDB-4002-8058-2C3129AA983C}"/>
+                </a:ext>
+              </a:extLst>
+            </p:cNvPr>
+            <p:cNvSpPr/>
+            <p:nvPr/>
+          </p:nvSpPr>
+          <p:spPr>
+            <a:xfrm>
+              <a:off x="705394" y="1421732"/>
+              <a:ext cx="9818518" cy="3058260"/>
+            </a:xfrm>
+            <a:prstGeom prst="rect">
+              <a:avLst/>
+            </a:prstGeom>
+            <a:noFill/>
+            <a:ln w="38100">
+              <a:solidFill>
+                <a:schemeClr val="tx1"/>
+              </a:solidFill>
+              <a:prstDash val="dash"/>
+            </a:ln>
+          </p:spPr>
+          <p:style>
+            <a:lnRef idx="2">
+              <a:schemeClr val="accent1">
+                <a:shade val="50000"/>
+              </a:schemeClr>
+            </a:lnRef>
+            <a:fillRef idx="1">
+              <a:schemeClr val="accent1"/>
+            </a:fillRef>
+            <a:effectRef idx="0">
+              <a:schemeClr val="accent1"/>
+            </a:effectRef>
+            <a:fontRef idx="minor">
+              <a:schemeClr val="lt1"/>
+            </a:fontRef>
+          </p:style>
+          <p:txBody>
+            <a:bodyPr rtlCol="0" anchor="ctr"/>
+            <a:lstStyle/>
+            <a:p>
+              <a:pPr algn="ctr"/>
+              <a:endParaRPr lang="de-DE"/>
+            </a:p>
+          </p:txBody>
+        </p:sp>
+        <p:sp>
+          <p:nvSpPr>
+            <p:cNvPr id="9" name="Textfeld 8">
+              <a:extLst>
+                <a:ext uri="{FF2B5EF4-FFF2-40B4-BE49-F238E27FC236}">
+                  <a16:creationId xmlns:a16="http://schemas.microsoft.com/office/drawing/2014/main" id="{DF9564BE-FC1C-4273-B3EE-305A4E5C9325}"/>
+                </a:ext>
+              </a:extLst>
+            </p:cNvPr>
+            <p:cNvSpPr txBox="1"/>
+            <p:nvPr/>
+          </p:nvSpPr>
+          <p:spPr>
+            <a:xfrm>
+              <a:off x="3934294" y="1421732"/>
+              <a:ext cx="3360717" cy="461665"/>
+            </a:xfrm>
+            <a:prstGeom prst="rect">
+              <a:avLst/>
+            </a:prstGeom>
+            <a:noFill/>
+          </p:spPr>
+          <p:txBody>
+            <a:bodyPr wrap="square" rtlCol="0">
+              <a:spAutoFit/>
+            </a:bodyPr>
+            <a:lstStyle/>
+            <a:p>
+              <a:pPr algn="ctr"/>
+              <a:r>
+                <a:rPr lang="de-DE" sz="2400" b="1" dirty="0"/>
+                <a:t>Anwendungen</a:t>
+              </a:r>
+            </a:p>
+          </p:txBody>
+        </p:sp>
+        <p:sp>
+          <p:nvSpPr>
+            <p:cNvPr id="10" name="Rechteck 9">
+              <a:extLst>
+                <a:ext uri="{FF2B5EF4-FFF2-40B4-BE49-F238E27FC236}">
+                  <a16:creationId xmlns:a16="http://schemas.microsoft.com/office/drawing/2014/main" id="{7B554AB0-21A4-4B49-ADC4-39E0EBA495E2}"/>
+                </a:ext>
+              </a:extLst>
+            </p:cNvPr>
+            <p:cNvSpPr/>
+            <p:nvPr/>
+          </p:nvSpPr>
+          <p:spPr>
+            <a:xfrm>
+              <a:off x="4612624" y="1988169"/>
+              <a:ext cx="2624200" cy="775855"/>
+            </a:xfrm>
+            <a:prstGeom prst="rect">
+              <a:avLst/>
+            </a:prstGeom>
+            <a:solidFill>
+              <a:schemeClr val="bg1">
+                <a:lumMod val="75000"/>
+              </a:schemeClr>
+            </a:solidFill>
+            <a:ln>
+              <a:noFill/>
+            </a:ln>
+          </p:spPr>
+          <p:style>
+            <a:lnRef idx="2">
+              <a:schemeClr val="accent1">
+                <a:shade val="50000"/>
+              </a:schemeClr>
+            </a:lnRef>
+            <a:fillRef idx="1">
+              <a:schemeClr val="accent1"/>
+            </a:fillRef>
+            <a:effectRef idx="0">
+              <a:schemeClr val="accent1"/>
+            </a:effectRef>
+            <a:fontRef idx="minor">
+              <a:schemeClr val="lt1"/>
+            </a:fontRef>
+          </p:style>
+          <p:txBody>
+            <a:bodyPr rtlCol="0" anchor="ctr"/>
+            <a:lstStyle/>
+            <a:p>
+              <a:pPr algn="ctr"/>
+              <a:r>
+                <a:rPr lang="de-DE" sz="4000" dirty="0"/>
+                <a:t>…</a:t>
+              </a:r>
+            </a:p>
+          </p:txBody>
+        </p:sp>
+        <p:sp>
+          <p:nvSpPr>
+            <p:cNvPr id="11" name="Rechteck 10">
+              <a:extLst>
+                <a:ext uri="{FF2B5EF4-FFF2-40B4-BE49-F238E27FC236}">
+                  <a16:creationId xmlns:a16="http://schemas.microsoft.com/office/drawing/2014/main" id="{E49885CE-12D8-4050-8FAA-9D63EBBFF7C6}"/>
+                </a:ext>
+              </a:extLst>
+            </p:cNvPr>
+            <p:cNvSpPr/>
+            <p:nvPr/>
+          </p:nvSpPr>
+          <p:spPr>
+            <a:xfrm>
+              <a:off x="7451618" y="1988169"/>
+              <a:ext cx="2859332" cy="2266143"/>
+            </a:xfrm>
+            <a:prstGeom prst="rect">
+              <a:avLst/>
+            </a:prstGeom>
+            <a:solidFill>
+              <a:schemeClr val="bg1">
+                <a:lumMod val="75000"/>
+              </a:schemeClr>
+            </a:solidFill>
+            <a:ln>
+              <a:noFill/>
+            </a:ln>
+          </p:spPr>
+          <p:style>
+            <a:lnRef idx="2">
+              <a:schemeClr val="accent1">
+                <a:shade val="50000"/>
+              </a:schemeClr>
+            </a:lnRef>
+            <a:fillRef idx="1">
+              <a:schemeClr val="accent1"/>
+            </a:fillRef>
+            <a:effectRef idx="0">
+              <a:schemeClr val="accent1"/>
+            </a:effectRef>
+            <a:fontRef idx="minor">
+              <a:schemeClr val="lt1"/>
+            </a:fontRef>
+          </p:style>
+          <p:txBody>
+            <a:bodyPr rtlCol="0" anchor="ctr"/>
+            <a:lstStyle/>
+            <a:p>
+              <a:pPr algn="ctr"/>
+              <a:r>
+                <a:rPr lang="de-DE" sz="4000" dirty="0"/>
+                <a:t>…</a:t>
+              </a:r>
+            </a:p>
+          </p:txBody>
+        </p:sp>
+      </p:grpSp>
+    </p:spTree>
+    <p:extLst>
+      <p:ext uri="{BB962C8B-B14F-4D97-AF65-F5344CB8AC3E}">
+        <p14:creationId xmlns:p14="http://schemas.microsoft.com/office/powerpoint/2010/main" val="3340049051"/>
+      </p:ext>
+    </p:extLst>
+  </p:cSld>
+  <p:clrMapOvr>
+    <a:masterClrMapping/>
+  </p:clrMapOvr>
+</p:sld>
+</file>
+
 <file path=ppt/theme/theme1.xml><?xml version="1.0" encoding="utf-8"?>
 <a:theme xmlns:a="http://schemas.openxmlformats.org/drawingml/2006/main" name="Office">
   <a:themeElements>

</xml_diff>

<commit_message>
add some text for the Datenpipeline
</commit_message>
<xml_diff>
--- a/images/Bilder.pptx
+++ b/images/Bilder.pptx
@@ -9,7 +9,6 @@
     <p:sldId id="258" r:id="rId3"/>
     <p:sldId id="260" r:id="rId4"/>
     <p:sldId id="261" r:id="rId5"/>
-    <p:sldId id="262" r:id="rId6"/>
   </p:sldIdLst>
   <p:sldSz cx="12192000" cy="6858000"/>
   <p:notesSz cx="6858000" cy="9144000"/>
@@ -263,7 +262,7 @@
           <a:p>
             <a:fld id="{F01BEA2B-4EBC-4FDA-85C9-98F59DD415C0}" type="datetimeFigureOut">
               <a:rPr lang="de-DE" smtClean="0"/>
-              <a:t>04.08.2021</a:t>
+              <a:t>12.08.2021</a:t>
             </a:fld>
             <a:endParaRPr lang="de-DE"/>
           </a:p>
@@ -461,7 +460,7 @@
           <a:p>
             <a:fld id="{F01BEA2B-4EBC-4FDA-85C9-98F59DD415C0}" type="datetimeFigureOut">
               <a:rPr lang="de-DE" smtClean="0"/>
-              <a:t>04.08.2021</a:t>
+              <a:t>12.08.2021</a:t>
             </a:fld>
             <a:endParaRPr lang="de-DE"/>
           </a:p>
@@ -669,7 +668,7 @@
           <a:p>
             <a:fld id="{F01BEA2B-4EBC-4FDA-85C9-98F59DD415C0}" type="datetimeFigureOut">
               <a:rPr lang="de-DE" smtClean="0"/>
-              <a:t>04.08.2021</a:t>
+              <a:t>12.08.2021</a:t>
             </a:fld>
             <a:endParaRPr lang="de-DE"/>
           </a:p>
@@ -867,7 +866,7 @@
           <a:p>
             <a:fld id="{F01BEA2B-4EBC-4FDA-85C9-98F59DD415C0}" type="datetimeFigureOut">
               <a:rPr lang="de-DE" smtClean="0"/>
-              <a:t>04.08.2021</a:t>
+              <a:t>12.08.2021</a:t>
             </a:fld>
             <a:endParaRPr lang="de-DE"/>
           </a:p>
@@ -1142,7 +1141,7 @@
           <a:p>
             <a:fld id="{F01BEA2B-4EBC-4FDA-85C9-98F59DD415C0}" type="datetimeFigureOut">
               <a:rPr lang="de-DE" smtClean="0"/>
-              <a:t>04.08.2021</a:t>
+              <a:t>12.08.2021</a:t>
             </a:fld>
             <a:endParaRPr lang="de-DE"/>
           </a:p>
@@ -1407,7 +1406,7 @@
           <a:p>
             <a:fld id="{F01BEA2B-4EBC-4FDA-85C9-98F59DD415C0}" type="datetimeFigureOut">
               <a:rPr lang="de-DE" smtClean="0"/>
-              <a:t>04.08.2021</a:t>
+              <a:t>12.08.2021</a:t>
             </a:fld>
             <a:endParaRPr lang="de-DE"/>
           </a:p>
@@ -1819,7 +1818,7 @@
           <a:p>
             <a:fld id="{F01BEA2B-4EBC-4FDA-85C9-98F59DD415C0}" type="datetimeFigureOut">
               <a:rPr lang="de-DE" smtClean="0"/>
-              <a:t>04.08.2021</a:t>
+              <a:t>12.08.2021</a:t>
             </a:fld>
             <a:endParaRPr lang="de-DE"/>
           </a:p>
@@ -1960,7 +1959,7 @@
           <a:p>
             <a:fld id="{F01BEA2B-4EBC-4FDA-85C9-98F59DD415C0}" type="datetimeFigureOut">
               <a:rPr lang="de-DE" smtClean="0"/>
-              <a:t>04.08.2021</a:t>
+              <a:t>12.08.2021</a:t>
             </a:fld>
             <a:endParaRPr lang="de-DE"/>
           </a:p>
@@ -2073,7 +2072,7 @@
           <a:p>
             <a:fld id="{F01BEA2B-4EBC-4FDA-85C9-98F59DD415C0}" type="datetimeFigureOut">
               <a:rPr lang="de-DE" smtClean="0"/>
-              <a:t>04.08.2021</a:t>
+              <a:t>12.08.2021</a:t>
             </a:fld>
             <a:endParaRPr lang="de-DE"/>
           </a:p>
@@ -2384,7 +2383,7 @@
           <a:p>
             <a:fld id="{F01BEA2B-4EBC-4FDA-85C9-98F59DD415C0}" type="datetimeFigureOut">
               <a:rPr lang="de-DE" smtClean="0"/>
-              <a:t>04.08.2021</a:t>
+              <a:t>12.08.2021</a:t>
             </a:fld>
             <a:endParaRPr lang="de-DE"/>
           </a:p>
@@ -2672,7 +2671,7 @@
           <a:p>
             <a:fld id="{F01BEA2B-4EBC-4FDA-85C9-98F59DD415C0}" type="datetimeFigureOut">
               <a:rPr lang="de-DE" smtClean="0"/>
-              <a:t>04.08.2021</a:t>
+              <a:t>12.08.2021</a:t>
             </a:fld>
             <a:endParaRPr lang="de-DE"/>
           </a:p>
@@ -2913,7 +2912,7 @@
           <a:p>
             <a:fld id="{F01BEA2B-4EBC-4FDA-85C9-98F59DD415C0}" type="datetimeFigureOut">
               <a:rPr lang="de-DE" smtClean="0"/>
-              <a:t>04.08.2021</a:t>
+              <a:t>12.08.2021</a:t>
             </a:fld>
             <a:endParaRPr lang="de-DE"/>
           </a:p>
@@ -4905,7 +4904,7 @@
         </p:nvGrpSpPr>
         <p:grpSpPr>
           <a:xfrm>
-            <a:off x="1628775" y="548439"/>
+            <a:off x="1498147" y="742950"/>
             <a:ext cx="7943850" cy="5372100"/>
             <a:chOff x="1628775" y="548439"/>
             <a:chExt cx="7943850" cy="5372100"/>
@@ -7319,488 +7318,6 @@
 </p:sld>
 </file>
 
-<file path=ppt/slides/slide5.xml><?xml version="1.0" encoding="utf-8"?>
-<p:sld xmlns:a="http://schemas.openxmlformats.org/drawingml/2006/main" xmlns:r="http://schemas.openxmlformats.org/officeDocument/2006/relationships" xmlns:p="http://schemas.openxmlformats.org/presentationml/2006/main">
-  <p:cSld>
-    <p:spTree>
-      <p:nvGrpSpPr>
-        <p:cNvPr id="1" name=""/>
-        <p:cNvGrpSpPr/>
-        <p:nvPr/>
-      </p:nvGrpSpPr>
-      <p:grpSpPr>
-        <a:xfrm>
-          <a:off x="0" y="0"/>
-          <a:ext cx="0" cy="0"/>
-          <a:chOff x="0" y="0"/>
-          <a:chExt cx="0" cy="0"/>
-        </a:xfrm>
-      </p:grpSpPr>
-      <p:grpSp>
-        <p:nvGrpSpPr>
-          <p:cNvPr id="2" name="Gruppieren 1">
-            <a:extLst>
-              <a:ext uri="{FF2B5EF4-FFF2-40B4-BE49-F238E27FC236}">
-                <a16:creationId xmlns:a16="http://schemas.microsoft.com/office/drawing/2014/main" id="{364E4F5F-22C2-45B9-B108-4FC4A7977268}"/>
-              </a:ext>
-            </a:extLst>
-          </p:cNvPr>
-          <p:cNvGrpSpPr/>
-          <p:nvPr/>
-        </p:nvGrpSpPr>
-        <p:grpSpPr>
-          <a:xfrm>
-            <a:off x="1010194" y="1021682"/>
-            <a:ext cx="9818518" cy="4464502"/>
-            <a:chOff x="705394" y="1421732"/>
-            <a:chExt cx="9818518" cy="4464502"/>
-          </a:xfrm>
-        </p:grpSpPr>
-        <p:sp>
-          <p:nvSpPr>
-            <p:cNvPr id="4" name="Rechteck 3">
-              <a:extLst>
-                <a:ext uri="{FF2B5EF4-FFF2-40B4-BE49-F238E27FC236}">
-                  <a16:creationId xmlns:a16="http://schemas.microsoft.com/office/drawing/2014/main" id="{B537B749-4E80-450F-A7FA-EEC27B74B0F2}"/>
-                </a:ext>
-              </a:extLst>
-            </p:cNvPr>
-            <p:cNvSpPr/>
-            <p:nvPr/>
-          </p:nvSpPr>
-          <p:spPr>
-            <a:xfrm>
-              <a:off x="705394" y="4689535"/>
-              <a:ext cx="9818518" cy="1196699"/>
-            </a:xfrm>
-            <a:prstGeom prst="rect">
-              <a:avLst/>
-            </a:prstGeom>
-            <a:solidFill>
-              <a:schemeClr val="accent6">
-                <a:lumMod val="75000"/>
-              </a:schemeClr>
-            </a:solidFill>
-            <a:ln>
-              <a:noFill/>
-            </a:ln>
-          </p:spPr>
-          <p:style>
-            <a:lnRef idx="2">
-              <a:schemeClr val="accent1">
-                <a:shade val="50000"/>
-              </a:schemeClr>
-            </a:lnRef>
-            <a:fillRef idx="1">
-              <a:schemeClr val="accent1"/>
-            </a:fillRef>
-            <a:effectRef idx="0">
-              <a:schemeClr val="accent1"/>
-            </a:effectRef>
-            <a:fontRef idx="minor">
-              <a:schemeClr val="lt1"/>
-            </a:fontRef>
-          </p:style>
-          <p:txBody>
-            <a:bodyPr rtlCol="0" anchor="ctr"/>
-            <a:lstStyle/>
-            <a:p>
-              <a:pPr algn="ctr"/>
-              <a:r>
-                <a:rPr lang="de-DE" sz="4000" dirty="0"/>
-                <a:t>MCC Platform</a:t>
-              </a:r>
-            </a:p>
-          </p:txBody>
-        </p:sp>
-        <p:sp>
-          <p:nvSpPr>
-            <p:cNvPr id="5" name="Rechteck 4">
-              <a:extLst>
-                <a:ext uri="{FF2B5EF4-FFF2-40B4-BE49-F238E27FC236}">
-                  <a16:creationId xmlns:a16="http://schemas.microsoft.com/office/drawing/2014/main" id="{56F21ECB-1DFA-43E4-B07E-C44A5D4C9546}"/>
-                </a:ext>
-              </a:extLst>
-            </p:cNvPr>
-            <p:cNvSpPr/>
-            <p:nvPr/>
-          </p:nvSpPr>
-          <p:spPr>
-            <a:xfrm>
-              <a:off x="892825" y="3051170"/>
-              <a:ext cx="6343998" cy="1213240"/>
-            </a:xfrm>
-            <a:prstGeom prst="rect">
-              <a:avLst/>
-            </a:prstGeom>
-            <a:solidFill>
-              <a:schemeClr val="accent6">
-                <a:lumMod val="75000"/>
-              </a:schemeClr>
-            </a:solidFill>
-            <a:ln>
-              <a:noFill/>
-            </a:ln>
-          </p:spPr>
-          <p:style>
-            <a:lnRef idx="2">
-              <a:schemeClr val="accent1">
-                <a:shade val="50000"/>
-              </a:schemeClr>
-            </a:lnRef>
-            <a:fillRef idx="1">
-              <a:schemeClr val="accent1"/>
-            </a:fillRef>
-            <a:effectRef idx="0">
-              <a:schemeClr val="accent1"/>
-            </a:effectRef>
-            <a:fontRef idx="minor">
-              <a:schemeClr val="lt1"/>
-            </a:fontRef>
-          </p:style>
-          <p:txBody>
-            <a:bodyPr rtlCol="0" anchor="ctr"/>
-            <a:lstStyle/>
-            <a:p>
-              <a:pPr algn="ctr"/>
-              <a:r>
-                <a:rPr lang="de-DE" sz="4000" dirty="0"/>
-                <a:t>Core Services - Production</a:t>
-              </a:r>
-            </a:p>
-          </p:txBody>
-        </p:sp>
-        <p:sp>
-          <p:nvSpPr>
-            <p:cNvPr id="6" name="Rechteck 5">
-              <a:extLst>
-                <a:ext uri="{FF2B5EF4-FFF2-40B4-BE49-F238E27FC236}">
-                  <a16:creationId xmlns:a16="http://schemas.microsoft.com/office/drawing/2014/main" id="{9363A760-ED18-4053-9CC8-40DF552AEA7F}"/>
-                </a:ext>
-              </a:extLst>
-            </p:cNvPr>
-            <p:cNvSpPr/>
-            <p:nvPr/>
-          </p:nvSpPr>
-          <p:spPr>
-            <a:xfrm>
-              <a:off x="892825" y="1988171"/>
-              <a:ext cx="1484615" cy="775855"/>
-            </a:xfrm>
-            <a:prstGeom prst="rect">
-              <a:avLst/>
-            </a:prstGeom>
-            <a:solidFill>
-              <a:schemeClr val="accent6">
-                <a:lumMod val="75000"/>
-              </a:schemeClr>
-            </a:solidFill>
-            <a:ln>
-              <a:noFill/>
-            </a:ln>
-          </p:spPr>
-          <p:style>
-            <a:lnRef idx="2">
-              <a:schemeClr val="accent1">
-                <a:shade val="50000"/>
-              </a:schemeClr>
-            </a:lnRef>
-            <a:fillRef idx="1">
-              <a:schemeClr val="accent1"/>
-            </a:fillRef>
-            <a:effectRef idx="0">
-              <a:schemeClr val="accent1"/>
-            </a:effectRef>
-            <a:fontRef idx="minor">
-              <a:schemeClr val="lt1"/>
-            </a:fontRef>
-          </p:style>
-          <p:txBody>
-            <a:bodyPr rtlCol="0" anchor="ctr"/>
-            <a:lstStyle/>
-            <a:p>
-              <a:pPr algn="ctr"/>
-              <a:r>
-                <a:rPr lang="de-DE" sz="4000" dirty="0"/>
-                <a:t>PCS</a:t>
-              </a:r>
-            </a:p>
-          </p:txBody>
-        </p:sp>
-        <p:sp>
-          <p:nvSpPr>
-            <p:cNvPr id="7" name="Rechteck 6">
-              <a:extLst>
-                <a:ext uri="{FF2B5EF4-FFF2-40B4-BE49-F238E27FC236}">
-                  <a16:creationId xmlns:a16="http://schemas.microsoft.com/office/drawing/2014/main" id="{1DEF0FA6-E785-4F58-9D8B-C8A46392424E}"/>
-                </a:ext>
-              </a:extLst>
-            </p:cNvPr>
-            <p:cNvSpPr/>
-            <p:nvPr/>
-          </p:nvSpPr>
-          <p:spPr>
-            <a:xfrm>
-              <a:off x="2592234" y="1988170"/>
-              <a:ext cx="1805595" cy="775855"/>
-            </a:xfrm>
-            <a:prstGeom prst="rect">
-              <a:avLst/>
-            </a:prstGeom>
-            <a:solidFill>
-              <a:schemeClr val="accent6">
-                <a:lumMod val="75000"/>
-              </a:schemeClr>
-            </a:solidFill>
-            <a:ln>
-              <a:noFill/>
-            </a:ln>
-          </p:spPr>
-          <p:style>
-            <a:lnRef idx="2">
-              <a:schemeClr val="accent1">
-                <a:shade val="50000"/>
-              </a:schemeClr>
-            </a:lnRef>
-            <a:fillRef idx="1">
-              <a:schemeClr val="accent1"/>
-            </a:fillRef>
-            <a:effectRef idx="0">
-              <a:schemeClr val="accent1"/>
-            </a:effectRef>
-            <a:fontRef idx="minor">
-              <a:schemeClr val="lt1"/>
-            </a:fontRef>
-          </p:style>
-          <p:txBody>
-            <a:bodyPr rtlCol="0" anchor="ctr"/>
-            <a:lstStyle/>
-            <a:p>
-              <a:pPr algn="ctr"/>
-              <a:r>
-                <a:rPr lang="de-DE" sz="4000" dirty="0"/>
-                <a:t>SCADA</a:t>
-              </a:r>
-            </a:p>
-          </p:txBody>
-        </p:sp>
-        <p:sp>
-          <p:nvSpPr>
-            <p:cNvPr id="8" name="Rechteck 7">
-              <a:extLst>
-                <a:ext uri="{FF2B5EF4-FFF2-40B4-BE49-F238E27FC236}">
-                  <a16:creationId xmlns:a16="http://schemas.microsoft.com/office/drawing/2014/main" id="{41F2A3AC-AEDB-4002-8058-2C3129AA983C}"/>
-                </a:ext>
-              </a:extLst>
-            </p:cNvPr>
-            <p:cNvSpPr/>
-            <p:nvPr/>
-          </p:nvSpPr>
-          <p:spPr>
-            <a:xfrm>
-              <a:off x="705394" y="1421732"/>
-              <a:ext cx="9818518" cy="3058260"/>
-            </a:xfrm>
-            <a:prstGeom prst="rect">
-              <a:avLst/>
-            </a:prstGeom>
-            <a:noFill/>
-            <a:ln w="38100">
-              <a:solidFill>
-                <a:schemeClr val="tx1"/>
-              </a:solidFill>
-              <a:prstDash val="dash"/>
-            </a:ln>
-          </p:spPr>
-          <p:style>
-            <a:lnRef idx="2">
-              <a:schemeClr val="accent1">
-                <a:shade val="50000"/>
-              </a:schemeClr>
-            </a:lnRef>
-            <a:fillRef idx="1">
-              <a:schemeClr val="accent1"/>
-            </a:fillRef>
-            <a:effectRef idx="0">
-              <a:schemeClr val="accent1"/>
-            </a:effectRef>
-            <a:fontRef idx="minor">
-              <a:schemeClr val="lt1"/>
-            </a:fontRef>
-          </p:style>
-          <p:txBody>
-            <a:bodyPr rtlCol="0" anchor="ctr"/>
-            <a:lstStyle/>
-            <a:p>
-              <a:pPr algn="ctr"/>
-              <a:endParaRPr lang="de-DE"/>
-            </a:p>
-          </p:txBody>
-        </p:sp>
-        <p:sp>
-          <p:nvSpPr>
-            <p:cNvPr id="9" name="Textfeld 8">
-              <a:extLst>
-                <a:ext uri="{FF2B5EF4-FFF2-40B4-BE49-F238E27FC236}">
-                  <a16:creationId xmlns:a16="http://schemas.microsoft.com/office/drawing/2014/main" id="{DF9564BE-FC1C-4273-B3EE-305A4E5C9325}"/>
-                </a:ext>
-              </a:extLst>
-            </p:cNvPr>
-            <p:cNvSpPr txBox="1"/>
-            <p:nvPr/>
-          </p:nvSpPr>
-          <p:spPr>
-            <a:xfrm>
-              <a:off x="3934294" y="1421732"/>
-              <a:ext cx="3360717" cy="461665"/>
-            </a:xfrm>
-            <a:prstGeom prst="rect">
-              <a:avLst/>
-            </a:prstGeom>
-            <a:noFill/>
-          </p:spPr>
-          <p:txBody>
-            <a:bodyPr wrap="square" rtlCol="0">
-              <a:spAutoFit/>
-            </a:bodyPr>
-            <a:lstStyle/>
-            <a:p>
-              <a:pPr algn="ctr"/>
-              <a:r>
-                <a:rPr lang="de-DE" sz="2400" b="1" dirty="0"/>
-                <a:t>Anwendungen</a:t>
-              </a:r>
-            </a:p>
-          </p:txBody>
-        </p:sp>
-        <p:sp>
-          <p:nvSpPr>
-            <p:cNvPr id="10" name="Rechteck 9">
-              <a:extLst>
-                <a:ext uri="{FF2B5EF4-FFF2-40B4-BE49-F238E27FC236}">
-                  <a16:creationId xmlns:a16="http://schemas.microsoft.com/office/drawing/2014/main" id="{7B554AB0-21A4-4B49-ADC4-39E0EBA495E2}"/>
-                </a:ext>
-              </a:extLst>
-            </p:cNvPr>
-            <p:cNvSpPr/>
-            <p:nvPr/>
-          </p:nvSpPr>
-          <p:spPr>
-            <a:xfrm>
-              <a:off x="4612624" y="1988169"/>
-              <a:ext cx="2624200" cy="775855"/>
-            </a:xfrm>
-            <a:prstGeom prst="rect">
-              <a:avLst/>
-            </a:prstGeom>
-            <a:solidFill>
-              <a:schemeClr val="bg1">
-                <a:lumMod val="75000"/>
-              </a:schemeClr>
-            </a:solidFill>
-            <a:ln>
-              <a:noFill/>
-            </a:ln>
-          </p:spPr>
-          <p:style>
-            <a:lnRef idx="2">
-              <a:schemeClr val="accent1">
-                <a:shade val="50000"/>
-              </a:schemeClr>
-            </a:lnRef>
-            <a:fillRef idx="1">
-              <a:schemeClr val="accent1"/>
-            </a:fillRef>
-            <a:effectRef idx="0">
-              <a:schemeClr val="accent1"/>
-            </a:effectRef>
-            <a:fontRef idx="minor">
-              <a:schemeClr val="lt1"/>
-            </a:fontRef>
-          </p:style>
-          <p:txBody>
-            <a:bodyPr rtlCol="0" anchor="ctr"/>
-            <a:lstStyle/>
-            <a:p>
-              <a:pPr algn="ctr"/>
-              <a:r>
-                <a:rPr lang="de-DE" sz="4000" dirty="0"/>
-                <a:t>…</a:t>
-              </a:r>
-            </a:p>
-          </p:txBody>
-        </p:sp>
-        <p:sp>
-          <p:nvSpPr>
-            <p:cNvPr id="11" name="Rechteck 10">
-              <a:extLst>
-                <a:ext uri="{FF2B5EF4-FFF2-40B4-BE49-F238E27FC236}">
-                  <a16:creationId xmlns:a16="http://schemas.microsoft.com/office/drawing/2014/main" id="{E49885CE-12D8-4050-8FAA-9D63EBBFF7C6}"/>
-                </a:ext>
-              </a:extLst>
-            </p:cNvPr>
-            <p:cNvSpPr/>
-            <p:nvPr/>
-          </p:nvSpPr>
-          <p:spPr>
-            <a:xfrm>
-              <a:off x="7451618" y="1988169"/>
-              <a:ext cx="2859332" cy="2266143"/>
-            </a:xfrm>
-            <a:prstGeom prst="rect">
-              <a:avLst/>
-            </a:prstGeom>
-            <a:solidFill>
-              <a:schemeClr val="bg1">
-                <a:lumMod val="75000"/>
-              </a:schemeClr>
-            </a:solidFill>
-            <a:ln>
-              <a:noFill/>
-            </a:ln>
-          </p:spPr>
-          <p:style>
-            <a:lnRef idx="2">
-              <a:schemeClr val="accent1">
-                <a:shade val="50000"/>
-              </a:schemeClr>
-            </a:lnRef>
-            <a:fillRef idx="1">
-              <a:schemeClr val="accent1"/>
-            </a:fillRef>
-            <a:effectRef idx="0">
-              <a:schemeClr val="accent1"/>
-            </a:effectRef>
-            <a:fontRef idx="minor">
-              <a:schemeClr val="lt1"/>
-            </a:fontRef>
-          </p:style>
-          <p:txBody>
-            <a:bodyPr rtlCol="0" anchor="ctr"/>
-            <a:lstStyle/>
-            <a:p>
-              <a:pPr algn="ctr"/>
-              <a:r>
-                <a:rPr lang="de-DE" sz="4000" dirty="0"/>
-                <a:t>…</a:t>
-              </a:r>
-            </a:p>
-          </p:txBody>
-        </p:sp>
-      </p:grpSp>
-    </p:spTree>
-    <p:extLst>
-      <p:ext uri="{BB962C8B-B14F-4D97-AF65-F5344CB8AC3E}">
-        <p14:creationId xmlns:p14="http://schemas.microsoft.com/office/powerpoint/2010/main" val="3340049051"/>
-      </p:ext>
-    </p:extLst>
-  </p:cSld>
-  <p:clrMapOvr>
-    <a:masterClrMapping/>
-  </p:clrMapOvr>
-</p:sld>
-</file>
-
 <file path=ppt/theme/theme1.xml><?xml version="1.0" encoding="utf-8"?>
 <a:theme xmlns:a="http://schemas.openxmlformats.org/drawingml/2006/main" name="Office">
   <a:themeElements>

</xml_diff>